<commit_message>
Moved CollegeDatabase enums to external enum, not data field. UML ppt updated
</commit_message>
<xml_diff>
--- a/FinalProject_UML.pptx
+++ b/FinalProject_UML.pptx
@@ -105,6 +105,11 @@
       </a:defRPr>
     </a:lvl9pPr>
   </p:defaultTextStyle>
+  <p:extLst>
+    <p:ext uri="{EFAFB233-063F-42B5-8137-9DF3F51BA10A}">
+      <p15:sldGuideLst xmlns:p15="http://schemas.microsoft.com/office/powerpoint/2012/main"/>
+    </p:ext>
+  </p:extLst>
 </p:presentation>
 </file>
 
@@ -3337,20 +3342,20 @@
           <p:nvPr>
             <p:extLst>
               <p:ext uri="{D42A27DB-BD31-4B8C-83A1-F6EECF244321}">
-                <p14:modId xmlns:p14="http://schemas.microsoft.com/office/powerpoint/2010/main" val="3467695920"/>
+                <p14:modId xmlns:p14="http://schemas.microsoft.com/office/powerpoint/2010/main" val="670174645"/>
               </p:ext>
             </p:extLst>
           </p:nvPr>
         </p:nvGraphicFramePr>
         <p:xfrm>
           <a:off x="2460594" y="2450681"/>
-          <a:ext cx="2353569" cy="1112520"/>
+          <a:ext cx="2353569" cy="1442720"/>
         </p:xfrm>
         <a:graphic>
           <a:graphicData uri="http://schemas.openxmlformats.org/drawingml/2006/table">
             <a:tbl>
               <a:tblPr firstRow="1" bandRow="1">
-                <a:tableStyleId>{93296810-A885-4BE3-A3E7-6D5BEEA58F35}</a:tableStyleId>
+                <a:tableStyleId>{5C22544A-7EE6-4342-B048-85BDC9FD1C3A}</a:tableStyleId>
               </a:tblPr>
               <a:tblGrid>
                 <a:gridCol w="2353569">
@@ -3367,12 +3372,120 @@
                     <a:bodyPr/>
                     <a:lstStyle/>
                     <a:p>
-                      <a:r>
-                        <a:rPr lang="en-US" b="0" dirty="0">
+                      <a:pPr marL="0" marR="0" lvl="0" indent="0" algn="ctr" defTabSz="914400" rtl="0" eaLnBrk="1" fontAlgn="auto" latinLnBrk="0" hangingPunct="1">
+                        <a:lnSpc>
+                          <a:spcPct val="100000"/>
+                        </a:lnSpc>
+                        <a:spcBef>
+                          <a:spcPts val="0"/>
+                        </a:spcBef>
+                        <a:spcAft>
+                          <a:spcPts val="0"/>
+                        </a:spcAft>
+                        <a:buClrTx/>
+                        <a:buSzTx/>
+                        <a:buFontTx/>
+                        <a:buNone/>
+                        <a:tabLst/>
+                        <a:defRPr/>
+                      </a:pPr>
+                      <a:r>
+                        <a:rPr kumimoji="0" lang="en-US" sz="1100" b="0" u="none" strike="noStrike" kern="1200" cap="none" spc="0" normalizeH="0" baseline="0" noProof="0" dirty="0">
+                          <a:ln>
+                            <a:noFill/>
+                          </a:ln>
+                          <a:effectLst/>
+                          <a:uLnTx/>
+                          <a:uFillTx/>
+                          <a:latin typeface="Consolas" panose="020B0609020204030204" pitchFamily="49" charset="0"/>
+                        </a:rPr>
+                        <a:t>&lt;&lt;Java Class&gt;&gt;</a:t>
+                      </a:r>
+                      <a:endParaRPr kumimoji="0" lang="en-US" sz="1800" b="0" u="none" strike="noStrike" kern="1200" cap="none" spc="0" normalizeH="0" baseline="0" noProof="0" dirty="0">
+                        <a:ln>
+                          <a:noFill/>
+                        </a:ln>
+                        <a:effectLst/>
+                        <a:uLnTx/>
+                        <a:uFillTx/>
+                        <a:latin typeface="Consolas" panose="020B0609020204030204" pitchFamily="49" charset="0"/>
+                      </a:endParaRPr>
+                    </a:p>
+                    <a:p>
+                      <a:pPr marL="0" marR="0" lvl="0" indent="0" algn="ctr" defTabSz="914400" rtl="0" eaLnBrk="1" fontAlgn="auto" latinLnBrk="0" hangingPunct="1">
+                        <a:lnSpc>
+                          <a:spcPct val="100000"/>
+                        </a:lnSpc>
+                        <a:spcBef>
+                          <a:spcPts val="0"/>
+                        </a:spcBef>
+                        <a:spcAft>
+                          <a:spcPts val="0"/>
+                        </a:spcAft>
+                        <a:buClrTx/>
+                        <a:buSzTx/>
+                        <a:buFontTx/>
+                        <a:buNone/>
+                        <a:tabLst/>
+                        <a:defRPr/>
+                      </a:pPr>
+                      <a:r>
+                        <a:rPr kumimoji="0" lang="en-US" sz="1800" b="0" u="none" strike="noStrike" kern="1200" cap="none" spc="0" normalizeH="0" baseline="0" noProof="0" dirty="0">
+                          <a:ln>
+                            <a:noFill/>
+                          </a:ln>
+                          <a:effectLst/>
+                          <a:uLnTx/>
+                          <a:uFillTx/>
                           <a:latin typeface="Consolas" panose="020B0609020204030204" pitchFamily="49" charset="0"/>
                         </a:rPr>
                         <a:t>Employee</a:t>
                       </a:r>
+                    </a:p>
+                    <a:p>
+                      <a:pPr marL="0" marR="0" lvl="0" indent="0" algn="ctr" defTabSz="914400" rtl="0" eaLnBrk="1" fontAlgn="auto" latinLnBrk="0" hangingPunct="1">
+                        <a:lnSpc>
+                          <a:spcPct val="100000"/>
+                        </a:lnSpc>
+                        <a:spcBef>
+                          <a:spcPts val="0"/>
+                        </a:spcBef>
+                        <a:spcAft>
+                          <a:spcPts val="0"/>
+                        </a:spcAft>
+                        <a:buClrTx/>
+                        <a:buSzTx/>
+                        <a:buFontTx/>
+                        <a:buNone/>
+                        <a:tabLst/>
+                        <a:defRPr/>
+                      </a:pPr>
+                      <a:r>
+                        <a:rPr kumimoji="0" lang="en-US" sz="1100" b="0" u="none" strike="noStrike" kern="1200" cap="none" spc="0" normalizeH="0" baseline="0" noProof="0" dirty="0">
+                          <a:ln>
+                            <a:noFill/>
+                          </a:ln>
+                          <a:effectLst/>
+                          <a:uLnTx/>
+                          <a:uFillTx/>
+                          <a:latin typeface="Consolas" panose="020B0609020204030204" pitchFamily="49" charset="0"/>
+                        </a:rPr>
+                        <a:t>people package</a:t>
+                      </a:r>
+                      <a:endParaRPr kumimoji="0" lang="en-US" sz="1100" b="0" i="0" u="none" strike="noStrike" kern="1200" cap="none" spc="0" normalizeH="0" baseline="0" noProof="0" dirty="0">
+                        <a:ln>
+                          <a:noFill/>
+                        </a:ln>
+                        <a:solidFill>
+                          <a:prstClr val="white"/>
+                        </a:solidFill>
+                        <a:effectLst/>
+                        <a:uLnTx/>
+                        <a:uFillTx/>
+                        <a:latin typeface="Consolas" panose="020B0609020204030204" pitchFamily="49" charset="0"/>
+                        <a:ea typeface="+mn-ea"/>
+                        <a:cs typeface="+mn-cs"/>
+                      </a:endParaRPr>
                     </a:p>
                   </a:txBody>
                   <a:tcPr/>
@@ -3389,7 +3502,10 @@
                     <a:bodyPr/>
                     <a:lstStyle/>
                     <a:p>
-                      <a:endParaRPr lang="en-US" dirty="0"/>
+                      <a:r>
+                        <a:rPr lang="en-US" dirty="0"/>
+                        <a:t>-</a:t>
+                      </a:r>
                     </a:p>
                   </a:txBody>
                   <a:tcPr/>
@@ -3436,20 +3552,20 @@
           <p:nvPr>
             <p:extLst>
               <p:ext uri="{D42A27DB-BD31-4B8C-83A1-F6EECF244321}">
-                <p14:modId xmlns:p14="http://schemas.microsoft.com/office/powerpoint/2010/main" val="2208381196"/>
+                <p14:modId xmlns:p14="http://schemas.microsoft.com/office/powerpoint/2010/main" val="3156320283"/>
               </p:ext>
             </p:extLst>
           </p:nvPr>
         </p:nvGraphicFramePr>
         <p:xfrm>
           <a:off x="7167732" y="2472653"/>
-          <a:ext cx="2353569" cy="1112520"/>
+          <a:ext cx="2353569" cy="1442720"/>
         </p:xfrm>
         <a:graphic>
           <a:graphicData uri="http://schemas.openxmlformats.org/drawingml/2006/table">
             <a:tbl>
               <a:tblPr firstRow="1" bandRow="1">
-                <a:tableStyleId>{93296810-A885-4BE3-A3E7-6D5BEEA58F35}</a:tableStyleId>
+                <a:tableStyleId>{5C22544A-7EE6-4342-B048-85BDC9FD1C3A}</a:tableStyleId>
               </a:tblPr>
               <a:tblGrid>
                 <a:gridCol w="2353569">
@@ -3466,12 +3582,120 @@
                     <a:bodyPr/>
                     <a:lstStyle/>
                     <a:p>
-                      <a:r>
-                        <a:rPr lang="en-US" b="0" dirty="0">
+                      <a:pPr marL="0" marR="0" lvl="0" indent="0" algn="ctr" defTabSz="914400" rtl="0" eaLnBrk="1" fontAlgn="auto" latinLnBrk="0" hangingPunct="1">
+                        <a:lnSpc>
+                          <a:spcPct val="100000"/>
+                        </a:lnSpc>
+                        <a:spcBef>
+                          <a:spcPts val="0"/>
+                        </a:spcBef>
+                        <a:spcAft>
+                          <a:spcPts val="0"/>
+                        </a:spcAft>
+                        <a:buClrTx/>
+                        <a:buSzTx/>
+                        <a:buFontTx/>
+                        <a:buNone/>
+                        <a:tabLst/>
+                        <a:defRPr/>
+                      </a:pPr>
+                      <a:r>
+                        <a:rPr kumimoji="0" lang="en-US" sz="1100" b="0" u="none" strike="noStrike" kern="1200" cap="none" spc="0" normalizeH="0" baseline="0" noProof="0" dirty="0">
+                          <a:ln>
+                            <a:noFill/>
+                          </a:ln>
+                          <a:effectLst/>
+                          <a:uLnTx/>
+                          <a:uFillTx/>
+                          <a:latin typeface="Consolas" panose="020B0609020204030204" pitchFamily="49" charset="0"/>
+                        </a:rPr>
+                        <a:t>&lt;&lt;Java Class&gt;&gt;</a:t>
+                      </a:r>
+                      <a:endParaRPr kumimoji="0" lang="en-US" sz="1800" b="0" u="none" strike="noStrike" kern="1200" cap="none" spc="0" normalizeH="0" baseline="0" noProof="0" dirty="0">
+                        <a:ln>
+                          <a:noFill/>
+                        </a:ln>
+                        <a:effectLst/>
+                        <a:uLnTx/>
+                        <a:uFillTx/>
+                        <a:latin typeface="Consolas" panose="020B0609020204030204" pitchFamily="49" charset="0"/>
+                      </a:endParaRPr>
+                    </a:p>
+                    <a:p>
+                      <a:pPr marL="0" marR="0" lvl="0" indent="0" algn="ctr" defTabSz="914400" rtl="0" eaLnBrk="1" fontAlgn="auto" latinLnBrk="0" hangingPunct="1">
+                        <a:lnSpc>
+                          <a:spcPct val="100000"/>
+                        </a:lnSpc>
+                        <a:spcBef>
+                          <a:spcPts val="0"/>
+                        </a:spcBef>
+                        <a:spcAft>
+                          <a:spcPts val="0"/>
+                        </a:spcAft>
+                        <a:buClrTx/>
+                        <a:buSzTx/>
+                        <a:buFontTx/>
+                        <a:buNone/>
+                        <a:tabLst/>
+                        <a:defRPr/>
+                      </a:pPr>
+                      <a:r>
+                        <a:rPr kumimoji="0" lang="en-US" sz="1800" b="0" u="none" strike="noStrike" kern="1200" cap="none" spc="0" normalizeH="0" baseline="0" noProof="0" dirty="0">
+                          <a:ln>
+                            <a:noFill/>
+                          </a:ln>
+                          <a:effectLst/>
+                          <a:uLnTx/>
+                          <a:uFillTx/>
                           <a:latin typeface="Consolas" panose="020B0609020204030204" pitchFamily="49" charset="0"/>
                         </a:rPr>
                         <a:t>Student</a:t>
                       </a:r>
+                    </a:p>
+                    <a:p>
+                      <a:pPr marL="0" marR="0" lvl="0" indent="0" algn="ctr" defTabSz="914400" rtl="0" eaLnBrk="1" fontAlgn="auto" latinLnBrk="0" hangingPunct="1">
+                        <a:lnSpc>
+                          <a:spcPct val="100000"/>
+                        </a:lnSpc>
+                        <a:spcBef>
+                          <a:spcPts val="0"/>
+                        </a:spcBef>
+                        <a:spcAft>
+                          <a:spcPts val="0"/>
+                        </a:spcAft>
+                        <a:buClrTx/>
+                        <a:buSzTx/>
+                        <a:buFontTx/>
+                        <a:buNone/>
+                        <a:tabLst/>
+                        <a:defRPr/>
+                      </a:pPr>
+                      <a:r>
+                        <a:rPr kumimoji="0" lang="en-US" sz="1100" b="0" u="none" strike="noStrike" kern="1200" cap="none" spc="0" normalizeH="0" baseline="0" noProof="0" dirty="0">
+                          <a:ln>
+                            <a:noFill/>
+                          </a:ln>
+                          <a:effectLst/>
+                          <a:uLnTx/>
+                          <a:uFillTx/>
+                          <a:latin typeface="Consolas" panose="020B0609020204030204" pitchFamily="49" charset="0"/>
+                        </a:rPr>
+                        <a:t>people package</a:t>
+                      </a:r>
+                      <a:endParaRPr kumimoji="0" lang="en-US" sz="1100" b="0" i="0" u="none" strike="noStrike" kern="1200" cap="none" spc="0" normalizeH="0" baseline="0" noProof="0" dirty="0">
+                        <a:ln>
+                          <a:noFill/>
+                        </a:ln>
+                        <a:solidFill>
+                          <a:prstClr val="white"/>
+                        </a:solidFill>
+                        <a:effectLst/>
+                        <a:uLnTx/>
+                        <a:uFillTx/>
+                        <a:latin typeface="Consolas" panose="020B0609020204030204" pitchFamily="49" charset="0"/>
+                        <a:ea typeface="+mn-ea"/>
+                        <a:cs typeface="+mn-cs"/>
+                      </a:endParaRPr>
                     </a:p>
                   </a:txBody>
                   <a:tcPr/>
@@ -3535,14 +3759,14 @@
           <p:nvPr>
             <p:extLst>
               <p:ext uri="{D42A27DB-BD31-4B8C-83A1-F6EECF244321}">
-                <p14:modId xmlns:p14="http://schemas.microsoft.com/office/powerpoint/2010/main" val="4131721092"/>
+                <p14:modId xmlns:p14="http://schemas.microsoft.com/office/powerpoint/2010/main" val="390888733"/>
               </p:ext>
             </p:extLst>
           </p:nvPr>
         </p:nvGraphicFramePr>
         <p:xfrm>
           <a:off x="4814163" y="616628"/>
-          <a:ext cx="2353569" cy="1112520"/>
+          <a:ext cx="2353569" cy="1498600"/>
         </p:xfrm>
         <a:graphic>
           <a:graphicData uri="http://schemas.openxmlformats.org/drawingml/2006/table">
@@ -3565,15 +3789,135 @@
                     <a:bodyPr/>
                     <a:lstStyle/>
                     <a:p>
-                      <a:r>
-                        <a:rPr lang="en-US" b="0" dirty="0">
-                          <a:latin typeface="Consolas" panose="020B0609020204030204" pitchFamily="49" charset="0"/>
+                      <a:pPr marL="0" marR="0" lvl="0" indent="0" algn="ctr" defTabSz="914400" rtl="0" eaLnBrk="1" fontAlgn="auto" latinLnBrk="0" hangingPunct="1">
+                        <a:lnSpc>
+                          <a:spcPct val="100000"/>
+                        </a:lnSpc>
+                        <a:spcBef>
+                          <a:spcPts val="0"/>
+                        </a:spcBef>
+                        <a:spcAft>
+                          <a:spcPts val="0"/>
+                        </a:spcAft>
+                        <a:buClrTx/>
+                        <a:buSzTx/>
+                        <a:buFontTx/>
+                        <a:buNone/>
+                        <a:tabLst/>
+                        <a:defRPr/>
+                      </a:pPr>
+                      <a:r>
+                        <a:rPr kumimoji="0" lang="en-US" sz="1100" b="0" i="0" u="none" strike="noStrike" kern="1200" cap="none" spc="0" normalizeH="0" baseline="0" noProof="0" dirty="0">
+                          <a:ln>
+                            <a:noFill/>
+                          </a:ln>
+                          <a:solidFill>
+                            <a:prstClr val="white"/>
+                          </a:solidFill>
+                          <a:effectLst/>
+                          <a:uLnTx/>
+                          <a:uFillTx/>
+                          <a:latin typeface="Consolas" panose="020B0609020204030204" pitchFamily="49" charset="0"/>
+                          <a:ea typeface="+mn-ea"/>
+                          <a:cs typeface="+mn-cs"/>
+                        </a:rPr>
+                        <a:t>&lt;&lt;Java Class&gt;&gt;</a:t>
+                      </a:r>
+                      <a:endParaRPr kumimoji="0" lang="en-US" sz="1800" b="0" i="0" u="none" strike="noStrike" kern="1200" cap="none" spc="0" normalizeH="0" baseline="0" noProof="0" dirty="0">
+                        <a:ln>
+                          <a:noFill/>
+                        </a:ln>
+                        <a:solidFill>
+                          <a:prstClr val="white"/>
+                        </a:solidFill>
+                        <a:effectLst/>
+                        <a:uLnTx/>
+                        <a:uFillTx/>
+                        <a:latin typeface="Consolas" panose="020B0609020204030204" pitchFamily="49" charset="0"/>
+                        <a:ea typeface="+mn-ea"/>
+                        <a:cs typeface="+mn-cs"/>
+                      </a:endParaRPr>
+                    </a:p>
+                    <a:p>
+                      <a:pPr marL="0" marR="0" lvl="0" indent="0" algn="ctr" defTabSz="914400" rtl="0" eaLnBrk="1" fontAlgn="auto" latinLnBrk="0" hangingPunct="1">
+                        <a:lnSpc>
+                          <a:spcPct val="100000"/>
+                        </a:lnSpc>
+                        <a:spcBef>
+                          <a:spcPts val="0"/>
+                        </a:spcBef>
+                        <a:spcAft>
+                          <a:spcPts val="0"/>
+                        </a:spcAft>
+                        <a:buClrTx/>
+                        <a:buSzTx/>
+                        <a:buFontTx/>
+                        <a:buNone/>
+                        <a:tabLst/>
+                        <a:defRPr/>
+                      </a:pPr>
+                      <a:r>
+                        <a:rPr kumimoji="0" lang="en-US" sz="1800" b="0" i="0" u="none" strike="noStrike" kern="1200" cap="none" spc="0" normalizeH="0" baseline="0" noProof="0" dirty="0">
+                          <a:ln>
+                            <a:noFill/>
+                          </a:ln>
+                          <a:solidFill>
+                            <a:prstClr val="white"/>
+                          </a:solidFill>
+                          <a:effectLst/>
+                          <a:uLnTx/>
+                          <a:uFillTx/>
+                          <a:latin typeface="Consolas" panose="020B0609020204030204" pitchFamily="49" charset="0"/>
+                          <a:ea typeface="+mn-ea"/>
+                          <a:cs typeface="+mn-cs"/>
                         </a:rPr>
                         <a:t>Person</a:t>
+                      </a:r>
+                    </a:p>
+                    <a:p>
+                      <a:pPr marL="0" marR="0" lvl="0" indent="0" algn="ctr" defTabSz="914400" rtl="0" eaLnBrk="1" fontAlgn="auto" latinLnBrk="0" hangingPunct="1">
+                        <a:lnSpc>
+                          <a:spcPct val="100000"/>
+                        </a:lnSpc>
+                        <a:spcBef>
+                          <a:spcPts val="0"/>
+                        </a:spcBef>
+                        <a:spcAft>
+                          <a:spcPts val="0"/>
+                        </a:spcAft>
+                        <a:buClrTx/>
+                        <a:buSzTx/>
+                        <a:buFontTx/>
+                        <a:buNone/>
+                        <a:tabLst/>
+                        <a:defRPr/>
+                      </a:pPr>
+                      <a:r>
+                        <a:rPr kumimoji="0" lang="en-US" sz="1100" b="0" i="0" u="none" strike="noStrike" kern="1200" cap="none" spc="0" normalizeH="0" baseline="0" noProof="0" dirty="0">
+                          <a:ln>
+                            <a:noFill/>
+                          </a:ln>
+                          <a:solidFill>
+                            <a:prstClr val="white"/>
+                          </a:solidFill>
+                          <a:effectLst/>
+                          <a:uLnTx/>
+                          <a:uFillTx/>
+                          <a:latin typeface="Consolas" panose="020B0609020204030204" pitchFamily="49" charset="0"/>
+                          <a:ea typeface="+mn-ea"/>
+                          <a:cs typeface="+mn-cs"/>
+                        </a:rPr>
+                        <a:t>people package</a:t>
                       </a:r>
                     </a:p>
                   </a:txBody>
-                  <a:tcPr/>
+                  <a:tcPr>
+                    <a:solidFill>
+                      <a:schemeClr val="accent1">
+                        <a:lumMod val="75000"/>
+                      </a:schemeClr>
+                    </a:solidFill>
+                  </a:tcPr>
                 </a:tc>
                 <a:extLst>
                   <a:ext uri="{0D108BD9-81ED-4DB2-BD59-A6C34878D82A}">
@@ -3587,7 +3931,28 @@
                     <a:bodyPr/>
                     <a:lstStyle/>
                     <a:p>
-                      <a:endParaRPr lang="en-US" dirty="0"/>
+                      <a:pPr marL="171450" indent="-171450">
+                        <a:buFontTx/>
+                        <a:buChar char="-"/>
+                      </a:pPr>
+                      <a:r>
+                        <a:rPr lang="en-US" sz="1100" dirty="0">
+                          <a:latin typeface="Consolas" panose="020B0609020204030204" pitchFamily="49" charset="0"/>
+                        </a:rPr>
+                        <a:t>age : int</a:t>
+                      </a:r>
+                    </a:p>
+                    <a:p>
+                      <a:pPr marL="171450" indent="-171450">
+                        <a:buFontTx/>
+                        <a:buChar char="-"/>
+                      </a:pPr>
+                      <a:r>
+                        <a:rPr lang="en-US" sz="1100" dirty="0">
+                          <a:latin typeface="Consolas" panose="020B0609020204030204" pitchFamily="49" charset="0"/>
+                        </a:rPr>
+                        <a:t>name : String</a:t>
+                      </a:r>
                     </a:p>
                   </a:txBody>
                   <a:tcPr/>
@@ -3619,44 +3984,6 @@
           </a:graphicData>
         </a:graphic>
       </p:graphicFrame>
-      <p:sp>
-        <p:nvSpPr>
-          <p:cNvPr id="12" name="TextBox 11">
-            <a:extLst>
-              <a:ext uri="{FF2B5EF4-FFF2-40B4-BE49-F238E27FC236}">
-                <a16:creationId xmlns:a16="http://schemas.microsoft.com/office/drawing/2014/main" id="{C0CA374D-8CCB-48C2-A8E5-8AB050D40873}"/>
-              </a:ext>
-            </a:extLst>
-          </p:cNvPr>
-          <p:cNvSpPr txBox="1"/>
-          <p:nvPr/>
-        </p:nvSpPr>
-        <p:spPr>
-          <a:xfrm>
-            <a:off x="4193219" y="115949"/>
-            <a:ext cx="3595456" cy="369332"/>
-          </a:xfrm>
-          <a:prstGeom prst="rect">
-            <a:avLst/>
-          </a:prstGeom>
-          <a:noFill/>
-        </p:spPr>
-        <p:txBody>
-          <a:bodyPr wrap="square" rtlCol="0">
-            <a:spAutoFit/>
-          </a:bodyPr>
-          <a:lstStyle/>
-          <a:p>
-            <a:pPr algn="ctr"/>
-            <a:r>
-              <a:rPr lang="en-US" dirty="0">
-                <a:latin typeface="Consolas" panose="020B0609020204030204" pitchFamily="49" charset="0"/>
-              </a:rPr>
-              <a:t>Person package</a:t>
-            </a:r>
-          </a:p>
-        </p:txBody>
-      </p:sp>
     </p:spTree>
     <p:extLst>
       <p:ext uri="{BB962C8B-B14F-4D97-AF65-F5344CB8AC3E}">
@@ -3702,14 +4029,14 @@
           <p:nvPr>
             <p:extLst>
               <p:ext uri="{D42A27DB-BD31-4B8C-83A1-F6EECF244321}">
-                <p14:modId xmlns:p14="http://schemas.microsoft.com/office/powerpoint/2010/main" val="3705633736"/>
+                <p14:modId xmlns:p14="http://schemas.microsoft.com/office/powerpoint/2010/main" val="46940998"/>
               </p:ext>
             </p:extLst>
           </p:nvPr>
         </p:nvGraphicFramePr>
         <p:xfrm>
-          <a:off x="9709133" y="245641"/>
-          <a:ext cx="2353569" cy="1442720"/>
+          <a:off x="8358878" y="245641"/>
+          <a:ext cx="3703825" cy="2336800"/>
         </p:xfrm>
         <a:graphic>
           <a:graphicData uri="http://schemas.openxmlformats.org/drawingml/2006/table">
@@ -3718,7 +4045,7 @@
                 <a:tableStyleId>{5C22544A-7EE6-4342-B048-85BDC9FD1C3A}</a:tableStyleId>
               </a:tblPr>
               <a:tblGrid>
-                <a:gridCol w="2353569">
+                <a:gridCol w="3703825">
                   <a:extLst>
                     <a:ext uri="{9D8B030D-6E8A-4147-A177-3AD203B41FA5}">
                       <a16:colId xmlns:a16="http://schemas.microsoft.com/office/drawing/2014/main" val="1362394583"/>
@@ -3859,7 +4186,525 @@
                     <a:bodyPr/>
                     <a:lstStyle/>
                     <a:p>
-                      <a:endParaRPr lang="en-US" dirty="0"/>
+                      <a:pPr marL="0" marR="0" lvl="0" indent="0" algn="l" defTabSz="914400" rtl="0" eaLnBrk="1" fontAlgn="auto" latinLnBrk="0" hangingPunct="1">
+                        <a:lnSpc>
+                          <a:spcPct val="100000"/>
+                        </a:lnSpc>
+                        <a:spcBef>
+                          <a:spcPts val="0"/>
+                        </a:spcBef>
+                        <a:spcAft>
+                          <a:spcPts val="0"/>
+                        </a:spcAft>
+                        <a:buClrTx/>
+                        <a:buSzTx/>
+                        <a:buFontTx/>
+                        <a:buNone/>
+                        <a:tabLst/>
+                        <a:defRPr/>
+                      </a:pPr>
+                      <a:r>
+                        <a:rPr kumimoji="0" lang="en-US" sz="1100" b="0" i="0" u="none" strike="noStrike" kern="1200" cap="none" spc="0" normalizeH="0" baseline="0" noProof="0" dirty="0">
+                          <a:ln>
+                            <a:noFill/>
+                          </a:ln>
+                          <a:solidFill>
+                            <a:prstClr val="black"/>
+                          </a:solidFill>
+                          <a:effectLst/>
+                          <a:uLnTx/>
+                          <a:uFillTx/>
+                          <a:latin typeface="Consolas" panose="020B0609020204030204" pitchFamily="49" charset="0"/>
+                          <a:ea typeface="+mn-ea"/>
+                          <a:cs typeface="+mn-cs"/>
+                        </a:rPr>
+                        <a:t>+ </a:t>
+                      </a:r>
+                      <a:r>
+                        <a:rPr kumimoji="0" lang="en-US" sz="1100" b="0" i="0" u="none" strike="noStrike" kern="1200" cap="none" spc="0" normalizeH="0" baseline="0" noProof="0" dirty="0" err="1">
+                          <a:ln>
+                            <a:noFill/>
+                          </a:ln>
+                          <a:solidFill>
+                            <a:prstClr val="black"/>
+                          </a:solidFill>
+                          <a:effectLst/>
+                          <a:uLnTx/>
+                          <a:uFillTx/>
+                          <a:latin typeface="Consolas" panose="020B0609020204030204" pitchFamily="49" charset="0"/>
+                          <a:ea typeface="+mn-ea"/>
+                          <a:cs typeface="+mn-cs"/>
+                        </a:rPr>
+                        <a:t>DatabaseStorage</a:t>
+                      </a:r>
+                      <a:r>
+                        <a:rPr kumimoji="0" lang="en-US" sz="1100" b="0" i="0" u="none" strike="noStrike" kern="1200" cap="none" spc="0" normalizeH="0" baseline="0" noProof="0" dirty="0">
+                          <a:ln>
+                            <a:noFill/>
+                          </a:ln>
+                          <a:solidFill>
+                            <a:prstClr val="black"/>
+                          </a:solidFill>
+                          <a:effectLst/>
+                          <a:uLnTx/>
+                          <a:uFillTx/>
+                          <a:latin typeface="Consolas" panose="020B0609020204030204" pitchFamily="49" charset="0"/>
+                          <a:ea typeface="+mn-ea"/>
+                          <a:cs typeface="+mn-cs"/>
+                        </a:rPr>
+                        <a:t>()</a:t>
+                      </a:r>
+                    </a:p>
+                    <a:p>
+                      <a:pPr marL="0" marR="0" lvl="0" indent="0" algn="l" defTabSz="914400" rtl="0" eaLnBrk="1" fontAlgn="auto" latinLnBrk="0" hangingPunct="1">
+                        <a:lnSpc>
+                          <a:spcPct val="100000"/>
+                        </a:lnSpc>
+                        <a:spcBef>
+                          <a:spcPts val="0"/>
+                        </a:spcBef>
+                        <a:spcAft>
+                          <a:spcPts val="0"/>
+                        </a:spcAft>
+                        <a:buClrTx/>
+                        <a:buSzTx/>
+                        <a:buFontTx/>
+                        <a:buNone/>
+                        <a:tabLst/>
+                        <a:defRPr/>
+                      </a:pPr>
+                      <a:r>
+                        <a:rPr kumimoji="0" lang="en-US" sz="1100" b="0" i="0" u="none" strike="noStrike" kern="1200" cap="none" spc="0" normalizeH="0" baseline="0" noProof="0" dirty="0">
+                          <a:ln>
+                            <a:noFill/>
+                          </a:ln>
+                          <a:solidFill>
+                            <a:prstClr val="black"/>
+                          </a:solidFill>
+                          <a:effectLst/>
+                          <a:uLnTx/>
+                          <a:uFillTx/>
+                          <a:latin typeface="Consolas" panose="020B0609020204030204" pitchFamily="49" charset="0"/>
+                          <a:ea typeface="+mn-ea"/>
+                          <a:cs typeface="+mn-cs"/>
+                        </a:rPr>
+                        <a:t>+ </a:t>
+                      </a:r>
+                      <a:r>
+                        <a:rPr kumimoji="0" lang="en-US" sz="1100" b="0" i="0" u="none" strike="noStrike" kern="1200" cap="none" spc="0" normalizeH="0" baseline="0" noProof="0" dirty="0" err="1">
+                          <a:ln>
+                            <a:noFill/>
+                          </a:ln>
+                          <a:solidFill>
+                            <a:prstClr val="black"/>
+                          </a:solidFill>
+                          <a:effectLst/>
+                          <a:uLnTx/>
+                          <a:uFillTx/>
+                          <a:latin typeface="Consolas" panose="020B0609020204030204" pitchFamily="49" charset="0"/>
+                          <a:ea typeface="+mn-ea"/>
+                          <a:cs typeface="+mn-cs"/>
+                        </a:rPr>
+                        <a:t>DatabaseStorage</a:t>
+                      </a:r>
+                      <a:r>
+                        <a:rPr kumimoji="0" lang="en-US" sz="1100" b="0" i="0" u="none" strike="noStrike" kern="1200" cap="none" spc="0" normalizeH="0" baseline="0" noProof="0" dirty="0">
+                          <a:ln>
+                            <a:noFill/>
+                          </a:ln>
+                          <a:solidFill>
+                            <a:prstClr val="black"/>
+                          </a:solidFill>
+                          <a:effectLst/>
+                          <a:uLnTx/>
+                          <a:uFillTx/>
+                          <a:latin typeface="Consolas" panose="020B0609020204030204" pitchFamily="49" charset="0"/>
+                          <a:ea typeface="+mn-ea"/>
+                          <a:cs typeface="+mn-cs"/>
+                        </a:rPr>
+                        <a:t>(String)</a:t>
+                      </a:r>
+                    </a:p>
+                    <a:p>
+                      <a:pPr marL="0" marR="0" lvl="0" indent="0" algn="l" defTabSz="914400" rtl="0" eaLnBrk="1" fontAlgn="auto" latinLnBrk="0" hangingPunct="1">
+                        <a:lnSpc>
+                          <a:spcPct val="100000"/>
+                        </a:lnSpc>
+                        <a:spcBef>
+                          <a:spcPts val="0"/>
+                        </a:spcBef>
+                        <a:spcAft>
+                          <a:spcPts val="0"/>
+                        </a:spcAft>
+                        <a:buClrTx/>
+                        <a:buSzTx/>
+                        <a:buFontTx/>
+                        <a:buNone/>
+                        <a:tabLst/>
+                        <a:defRPr/>
+                      </a:pPr>
+                      <a:r>
+                        <a:rPr kumimoji="0" lang="en-US" sz="1100" b="0" i="0" u="none" strike="noStrike" kern="1200" cap="none" spc="0" normalizeH="0" baseline="0" noProof="0" dirty="0">
+                          <a:ln>
+                            <a:noFill/>
+                          </a:ln>
+                          <a:solidFill>
+                            <a:prstClr val="black"/>
+                          </a:solidFill>
+                          <a:effectLst/>
+                          <a:uLnTx/>
+                          <a:uFillTx/>
+                          <a:latin typeface="Consolas" panose="020B0609020204030204" pitchFamily="49" charset="0"/>
+                          <a:ea typeface="+mn-ea"/>
+                          <a:cs typeface="+mn-cs"/>
+                        </a:rPr>
+                        <a:t>+ </a:t>
+                      </a:r>
+                      <a:r>
+                        <a:rPr kumimoji="0" lang="en-US" sz="1100" b="0" i="0" u="none" strike="noStrike" kern="1200" cap="none" spc="0" normalizeH="0" baseline="0" noProof="0" dirty="0" err="1">
+                          <a:ln>
+                            <a:noFill/>
+                          </a:ln>
+                          <a:solidFill>
+                            <a:prstClr val="black"/>
+                          </a:solidFill>
+                          <a:effectLst/>
+                          <a:uLnTx/>
+                          <a:uFillTx/>
+                          <a:latin typeface="Consolas" panose="020B0609020204030204" pitchFamily="49" charset="0"/>
+                          <a:ea typeface="+mn-ea"/>
+                          <a:cs typeface="+mn-cs"/>
+                        </a:rPr>
+                        <a:t>parsePerson</a:t>
+                      </a:r>
+                      <a:r>
+                        <a:rPr kumimoji="0" lang="en-US" sz="1100" b="0" i="0" u="none" strike="noStrike" kern="1200" cap="none" spc="0" normalizeH="0" baseline="0" noProof="0" dirty="0">
+                          <a:ln>
+                            <a:noFill/>
+                          </a:ln>
+                          <a:solidFill>
+                            <a:prstClr val="black"/>
+                          </a:solidFill>
+                          <a:effectLst/>
+                          <a:uLnTx/>
+                          <a:uFillTx/>
+                          <a:latin typeface="Consolas" panose="020B0609020204030204" pitchFamily="49" charset="0"/>
+                          <a:ea typeface="+mn-ea"/>
+                          <a:cs typeface="+mn-cs"/>
+                        </a:rPr>
+                        <a:t>(String) : Person</a:t>
+                      </a:r>
+                    </a:p>
+                    <a:p>
+                      <a:pPr marL="0" marR="0" lvl="0" indent="0" algn="l" defTabSz="914400" rtl="0" eaLnBrk="1" fontAlgn="auto" latinLnBrk="0" hangingPunct="1">
+                        <a:lnSpc>
+                          <a:spcPct val="100000"/>
+                        </a:lnSpc>
+                        <a:spcBef>
+                          <a:spcPts val="0"/>
+                        </a:spcBef>
+                        <a:spcAft>
+                          <a:spcPts val="0"/>
+                        </a:spcAft>
+                        <a:buClrTx/>
+                        <a:buSzTx/>
+                        <a:buFontTx/>
+                        <a:buNone/>
+                        <a:tabLst/>
+                        <a:defRPr/>
+                      </a:pPr>
+                      <a:r>
+                        <a:rPr kumimoji="0" lang="en-US" sz="1100" b="0" i="0" u="none" strike="noStrike" kern="1200" cap="none" spc="0" normalizeH="0" baseline="0" noProof="0" dirty="0">
+                          <a:ln>
+                            <a:noFill/>
+                          </a:ln>
+                          <a:solidFill>
+                            <a:prstClr val="black"/>
+                          </a:solidFill>
+                          <a:effectLst/>
+                          <a:uLnTx/>
+                          <a:uFillTx/>
+                          <a:latin typeface="Consolas" panose="020B0609020204030204" pitchFamily="49" charset="0"/>
+                          <a:ea typeface="+mn-ea"/>
+                          <a:cs typeface="+mn-cs"/>
+                        </a:rPr>
+                        <a:t>+ read() : </a:t>
+                      </a:r>
+                      <a:r>
+                        <a:rPr kumimoji="0" lang="en-US" sz="1100" b="0" i="0" u="none" strike="noStrike" kern="1200" cap="none" spc="0" normalizeH="0" baseline="0" noProof="0" dirty="0" err="1">
+                          <a:ln>
+                            <a:noFill/>
+                          </a:ln>
+                          <a:solidFill>
+                            <a:prstClr val="black"/>
+                          </a:solidFill>
+                          <a:effectLst/>
+                          <a:uLnTx/>
+                          <a:uFillTx/>
+                          <a:latin typeface="Consolas" panose="020B0609020204030204" pitchFamily="49" charset="0"/>
+                          <a:ea typeface="+mn-ea"/>
+                          <a:cs typeface="+mn-cs"/>
+                        </a:rPr>
+                        <a:t>CollegeDatabase</a:t>
+                      </a:r>
+                      <a:endParaRPr kumimoji="0" lang="en-US" sz="1100" b="0" i="0" u="none" strike="noStrike" kern="1200" cap="none" spc="0" normalizeH="0" baseline="0" noProof="0" dirty="0">
+                        <a:ln>
+                          <a:noFill/>
+                        </a:ln>
+                        <a:solidFill>
+                          <a:prstClr val="black"/>
+                        </a:solidFill>
+                        <a:effectLst/>
+                        <a:uLnTx/>
+                        <a:uFillTx/>
+                        <a:latin typeface="Consolas" panose="020B0609020204030204" pitchFamily="49" charset="0"/>
+                        <a:ea typeface="+mn-ea"/>
+                        <a:cs typeface="+mn-cs"/>
+                      </a:endParaRPr>
+                    </a:p>
+                    <a:p>
+                      <a:pPr marL="0" marR="0" lvl="0" indent="0" algn="l" defTabSz="914400" rtl="0" eaLnBrk="1" fontAlgn="auto" latinLnBrk="0" hangingPunct="1">
+                        <a:lnSpc>
+                          <a:spcPct val="100000"/>
+                        </a:lnSpc>
+                        <a:spcBef>
+                          <a:spcPts val="0"/>
+                        </a:spcBef>
+                        <a:spcAft>
+                          <a:spcPts val="0"/>
+                        </a:spcAft>
+                        <a:buClrTx/>
+                        <a:buSzTx/>
+                        <a:buFontTx/>
+                        <a:buNone/>
+                        <a:tabLst/>
+                        <a:defRPr/>
+                      </a:pPr>
+                      <a:r>
+                        <a:rPr kumimoji="0" lang="en-US" sz="1100" b="0" i="0" u="none" strike="noStrike" kern="1200" cap="none" spc="0" normalizeH="0" baseline="0" noProof="0" dirty="0">
+                          <a:ln>
+                            <a:noFill/>
+                          </a:ln>
+                          <a:solidFill>
+                            <a:prstClr val="black"/>
+                          </a:solidFill>
+                          <a:effectLst/>
+                          <a:uLnTx/>
+                          <a:uFillTx/>
+                          <a:latin typeface="Consolas" panose="020B0609020204030204" pitchFamily="49" charset="0"/>
+                          <a:ea typeface="+mn-ea"/>
+                          <a:cs typeface="+mn-cs"/>
+                        </a:rPr>
+                        <a:t>+ </a:t>
+                      </a:r>
+                      <a:r>
+                        <a:rPr kumimoji="0" lang="en-US" sz="1100" b="0" i="0" u="none" strike="noStrike" kern="1200" cap="none" spc="0" normalizeH="0" baseline="0" noProof="0" dirty="0" err="1">
+                          <a:ln>
+                            <a:noFill/>
+                          </a:ln>
+                          <a:solidFill>
+                            <a:prstClr val="black"/>
+                          </a:solidFill>
+                          <a:effectLst/>
+                          <a:uLnTx/>
+                          <a:uFillTx/>
+                          <a:latin typeface="Consolas" panose="020B0609020204030204" pitchFamily="49" charset="0"/>
+                          <a:ea typeface="+mn-ea"/>
+                          <a:cs typeface="+mn-cs"/>
+                        </a:rPr>
+                        <a:t>setFile</a:t>
+                      </a:r>
+                      <a:r>
+                        <a:rPr kumimoji="0" lang="en-US" sz="1100" b="0" i="0" u="none" strike="noStrike" kern="1200" cap="none" spc="0" normalizeH="0" baseline="0" noProof="0" dirty="0">
+                          <a:ln>
+                            <a:noFill/>
+                          </a:ln>
+                          <a:solidFill>
+                            <a:prstClr val="black"/>
+                          </a:solidFill>
+                          <a:effectLst/>
+                          <a:uLnTx/>
+                          <a:uFillTx/>
+                          <a:latin typeface="Consolas" panose="020B0609020204030204" pitchFamily="49" charset="0"/>
+                          <a:ea typeface="+mn-ea"/>
+                          <a:cs typeface="+mn-cs"/>
+                        </a:rPr>
+                        <a:t>(String) : void</a:t>
+                      </a:r>
+                    </a:p>
+                    <a:p>
+                      <a:pPr marL="0" marR="0" lvl="0" indent="0" algn="l" defTabSz="914400" rtl="0" eaLnBrk="1" fontAlgn="auto" latinLnBrk="0" hangingPunct="1">
+                        <a:lnSpc>
+                          <a:spcPct val="100000"/>
+                        </a:lnSpc>
+                        <a:spcBef>
+                          <a:spcPts val="0"/>
+                        </a:spcBef>
+                        <a:spcAft>
+                          <a:spcPts val="0"/>
+                        </a:spcAft>
+                        <a:buClrTx/>
+                        <a:buSzTx/>
+                        <a:buFontTx/>
+                        <a:buNone/>
+                        <a:tabLst/>
+                        <a:defRPr/>
+                      </a:pPr>
+                      <a:r>
+                        <a:rPr kumimoji="0" lang="en-US" sz="1100" b="0" i="0" u="none" strike="noStrike" kern="1200" cap="none" spc="0" normalizeH="0" baseline="0" noProof="0" dirty="0">
+                          <a:ln>
+                            <a:noFill/>
+                          </a:ln>
+                          <a:solidFill>
+                            <a:prstClr val="black"/>
+                          </a:solidFill>
+                          <a:effectLst/>
+                          <a:uLnTx/>
+                          <a:uFillTx/>
+                          <a:latin typeface="Consolas" panose="020B0609020204030204" pitchFamily="49" charset="0"/>
+                          <a:ea typeface="+mn-ea"/>
+                          <a:cs typeface="+mn-cs"/>
+                        </a:rPr>
+                        <a:t>+ write(</a:t>
+                      </a:r>
+                      <a:r>
+                        <a:rPr kumimoji="0" lang="en-US" sz="1100" b="0" i="0" u="none" strike="noStrike" kern="1200" cap="none" spc="0" normalizeH="0" baseline="0" noProof="0" dirty="0" err="1">
+                          <a:ln>
+                            <a:noFill/>
+                          </a:ln>
+                          <a:solidFill>
+                            <a:prstClr val="black"/>
+                          </a:solidFill>
+                          <a:effectLst/>
+                          <a:uLnTx/>
+                          <a:uFillTx/>
+                          <a:latin typeface="Consolas" panose="020B0609020204030204" pitchFamily="49" charset="0"/>
+                          <a:ea typeface="+mn-ea"/>
+                          <a:cs typeface="+mn-cs"/>
+                        </a:rPr>
+                        <a:t>CollegeDatabase</a:t>
+                      </a:r>
+                      <a:r>
+                        <a:rPr kumimoji="0" lang="en-US" sz="1100" b="0" i="0" u="none" strike="noStrike" kern="1200" cap="none" spc="0" normalizeH="0" baseline="0" noProof="0" dirty="0">
+                          <a:ln>
+                            <a:noFill/>
+                          </a:ln>
+                          <a:solidFill>
+                            <a:prstClr val="black"/>
+                          </a:solidFill>
+                          <a:effectLst/>
+                          <a:uLnTx/>
+                          <a:uFillTx/>
+                          <a:latin typeface="Consolas" panose="020B0609020204030204" pitchFamily="49" charset="0"/>
+                          <a:ea typeface="+mn-ea"/>
+                          <a:cs typeface="+mn-cs"/>
+                        </a:rPr>
+                        <a:t>) : void</a:t>
+                      </a:r>
+                    </a:p>
+                    <a:p>
+                      <a:pPr marL="0" marR="0" lvl="0" indent="0" algn="l" defTabSz="914400" rtl="0" eaLnBrk="1" fontAlgn="auto" latinLnBrk="0" hangingPunct="1">
+                        <a:lnSpc>
+                          <a:spcPct val="100000"/>
+                        </a:lnSpc>
+                        <a:spcBef>
+                          <a:spcPts val="0"/>
+                        </a:spcBef>
+                        <a:spcAft>
+                          <a:spcPts val="0"/>
+                        </a:spcAft>
+                        <a:buClrTx/>
+                        <a:buSzTx/>
+                        <a:buFontTx/>
+                        <a:buNone/>
+                        <a:tabLst/>
+                        <a:defRPr/>
+                      </a:pPr>
+                      <a:r>
+                        <a:rPr kumimoji="0" lang="en-US" sz="1100" b="0" i="0" u="none" strike="noStrike" kern="1200" cap="none" spc="0" normalizeH="0" baseline="0" noProof="0" dirty="0">
+                          <a:ln>
+                            <a:noFill/>
+                          </a:ln>
+                          <a:solidFill>
+                            <a:prstClr val="black"/>
+                          </a:solidFill>
+                          <a:effectLst/>
+                          <a:uLnTx/>
+                          <a:uFillTx/>
+                          <a:latin typeface="Consolas" panose="020B0609020204030204" pitchFamily="49" charset="0"/>
+                          <a:ea typeface="+mn-ea"/>
+                          <a:cs typeface="+mn-cs"/>
+                        </a:rPr>
+                        <a:t>+ </a:t>
+                      </a:r>
+                      <a:r>
+                        <a:rPr kumimoji="0" lang="en-US" sz="1100" b="0" i="0" u="none" strike="noStrike" kern="1200" cap="none" spc="0" normalizeH="0" baseline="0" noProof="0" dirty="0" err="1">
+                          <a:ln>
+                            <a:noFill/>
+                          </a:ln>
+                          <a:solidFill>
+                            <a:prstClr val="black"/>
+                          </a:solidFill>
+                          <a:effectLst/>
+                          <a:uLnTx/>
+                          <a:uFillTx/>
+                          <a:latin typeface="Consolas" panose="020B0609020204030204" pitchFamily="49" charset="0"/>
+                          <a:ea typeface="+mn-ea"/>
+                          <a:cs typeface="+mn-cs"/>
+                        </a:rPr>
+                        <a:t>writeCommaSeparated</a:t>
+                      </a:r>
+                      <a:r>
+                        <a:rPr kumimoji="0" lang="en-US" sz="1100" b="0" i="0" u="none" strike="noStrike" kern="1200" cap="none" spc="0" normalizeH="0" baseline="0" noProof="0" dirty="0">
+                          <a:ln>
+                            <a:noFill/>
+                          </a:ln>
+                          <a:solidFill>
+                            <a:prstClr val="black"/>
+                          </a:solidFill>
+                          <a:effectLst/>
+                          <a:uLnTx/>
+                          <a:uFillTx/>
+                          <a:latin typeface="Consolas" panose="020B0609020204030204" pitchFamily="49" charset="0"/>
+                          <a:ea typeface="+mn-ea"/>
+                          <a:cs typeface="+mn-cs"/>
+                        </a:rPr>
+                        <a:t>(</a:t>
+                      </a:r>
+                      <a:r>
+                        <a:rPr kumimoji="0" lang="en-US" sz="1100" b="0" i="0" u="none" strike="noStrike" kern="1200" cap="none" spc="0" normalizeH="0" baseline="0" noProof="0" dirty="0" err="1">
+                          <a:ln>
+                            <a:noFill/>
+                          </a:ln>
+                          <a:solidFill>
+                            <a:prstClr val="black"/>
+                          </a:solidFill>
+                          <a:effectLst/>
+                          <a:uLnTx/>
+                          <a:uFillTx/>
+                          <a:latin typeface="Consolas" panose="020B0609020204030204" pitchFamily="49" charset="0"/>
+                          <a:ea typeface="+mn-ea"/>
+                          <a:cs typeface="+mn-cs"/>
+                        </a:rPr>
+                        <a:t>CollegeDatabase</a:t>
+                      </a:r>
+                      <a:r>
+                        <a:rPr kumimoji="0" lang="en-US" sz="1100" b="0" i="0" u="none" strike="noStrike" kern="1200" cap="none" spc="0" normalizeH="0" baseline="0" noProof="0" dirty="0">
+                          <a:ln>
+                            <a:noFill/>
+                          </a:ln>
+                          <a:solidFill>
+                            <a:prstClr val="black"/>
+                          </a:solidFill>
+                          <a:effectLst/>
+                          <a:uLnTx/>
+                          <a:uFillTx/>
+                          <a:latin typeface="Consolas" panose="020B0609020204030204" pitchFamily="49" charset="0"/>
+                          <a:ea typeface="+mn-ea"/>
+                          <a:cs typeface="+mn-cs"/>
+                        </a:rPr>
+                        <a:t>) : void</a:t>
+                      </a:r>
                     </a:p>
                   </a:txBody>
                   <a:tcPr/>
@@ -3889,14 +4734,14 @@
           <p:nvPr>
             <p:extLst>
               <p:ext uri="{D42A27DB-BD31-4B8C-83A1-F6EECF244321}">
-                <p14:modId xmlns:p14="http://schemas.microsoft.com/office/powerpoint/2010/main" val="3580298742"/>
+                <p14:modId xmlns:p14="http://schemas.microsoft.com/office/powerpoint/2010/main" val="479683064"/>
               </p:ext>
             </p:extLst>
           </p:nvPr>
         </p:nvGraphicFramePr>
         <p:xfrm>
           <a:off x="129297" y="245641"/>
-          <a:ext cx="4557003" cy="4404360"/>
+          <a:ext cx="4671303" cy="6248400"/>
         </p:xfrm>
         <a:graphic>
           <a:graphicData uri="http://schemas.openxmlformats.org/drawingml/2006/table">
@@ -3905,7 +4750,7 @@
                 <a:tableStyleId>{5C22544A-7EE6-4342-B048-85BDC9FD1C3A}</a:tableStyleId>
               </a:tblPr>
               <a:tblGrid>
-                <a:gridCol w="4557003">
+                <a:gridCol w="4671303">
                   <a:extLst>
                     <a:ext uri="{9D8B030D-6E8A-4147-A177-3AD203B41FA5}">
                       <a16:colId xmlns:a16="http://schemas.microsoft.com/office/drawing/2014/main" val="1362394583"/>
@@ -4069,7 +4914,19 @@
                     <a:bodyPr/>
                     <a:lstStyle/>
                     <a:p>
-                      <a:pPr marL="171450" indent="-171450" algn="l">
+                      <a:pPr marL="0" indent="0">
+                        <a:buFontTx/>
+                        <a:buNone/>
+                      </a:pPr>
+                      <a:r>
+                        <a:rPr lang="en-US" sz="1100" dirty="0">
+                          <a:latin typeface="Consolas" panose="020B0609020204030204" pitchFamily="49" charset="0"/>
+                        </a:rPr>
+                        <a:t>+ DEFAULT_SIZE : int</a:t>
+                      </a:r>
+                    </a:p>
+                    <a:p>
+                      <a:pPr marL="171450" indent="-171450">
                         <a:buFontTx/>
                         <a:buChar char="-"/>
                       </a:pPr>
@@ -4077,7 +4934,19 @@
                         <a:rPr lang="en-US" sz="1100" dirty="0">
                           <a:latin typeface="Consolas" panose="020B0609020204030204" pitchFamily="49" charset="0"/>
                         </a:rPr>
-                        <a:t>Size : int</a:t>
+                        <a:t>entry : Person[]</a:t>
+                      </a:r>
+                    </a:p>
+                    <a:p>
+                      <a:pPr marL="171450" indent="-171450">
+                        <a:buFontTx/>
+                        <a:buChar char="-"/>
+                      </a:pPr>
+                      <a:r>
+                        <a:rPr lang="en-US" sz="1100" dirty="0">
+                          <a:latin typeface="Consolas" panose="020B0609020204030204" pitchFamily="49" charset="0"/>
+                        </a:rPr>
+                        <a:t>keyboard : Scanner</a:t>
                       </a:r>
                     </a:p>
                     <a:p>
@@ -4089,7 +4958,7 @@
                         <a:rPr lang="en-US" sz="1100" dirty="0">
                           <a:latin typeface="Consolas" panose="020B0609020204030204" pitchFamily="49" charset="0"/>
                         </a:rPr>
-                        <a:t>+ DEFAULT_SIZE : int</a:t>
+                        <a:t>+ NOT_FOUND : int</a:t>
                       </a:r>
                     </a:p>
                     <a:p>
@@ -4101,7 +4970,74 @@
                         <a:rPr lang="en-US" sz="1100" dirty="0">
                           <a:latin typeface="Consolas" panose="020B0609020204030204" pitchFamily="49" charset="0"/>
                         </a:rPr>
-                        <a:t>+ NOT_FOUND : int</a:t>
+                        <a:t>+ Operator : </a:t>
+                      </a:r>
+                      <a:r>
+                        <a:rPr lang="en-US" sz="1100" dirty="0" err="1">
+                          <a:latin typeface="Consolas" panose="020B0609020204030204" pitchFamily="49" charset="0"/>
+                        </a:rPr>
+                        <a:t>Enum</a:t>
+                      </a:r>
+                      <a:endParaRPr lang="en-US" sz="1100" dirty="0">
+                        <a:latin typeface="Consolas" panose="020B0609020204030204" pitchFamily="49" charset="0"/>
+                      </a:endParaRPr>
+                    </a:p>
+                    <a:p>
+                      <a:pPr marL="0" indent="0">
+                        <a:buFontTx/>
+                        <a:buNone/>
+                      </a:pPr>
+                      <a:r>
+                        <a:rPr lang="en-US" sz="1100" dirty="0">
+                          <a:latin typeface="Consolas" panose="020B0609020204030204" pitchFamily="49" charset="0"/>
+                        </a:rPr>
+                        <a:t>+ </a:t>
+                      </a:r>
+                      <a:r>
+                        <a:rPr lang="en-US" sz="1100" dirty="0" err="1">
+                          <a:latin typeface="Consolas" panose="020B0609020204030204" pitchFamily="49" charset="0"/>
+                        </a:rPr>
+                        <a:t>PersonType</a:t>
+                      </a:r>
+                      <a:r>
+                        <a:rPr lang="en-US" sz="1100" dirty="0">
+                          <a:latin typeface="Consolas" panose="020B0609020204030204" pitchFamily="49" charset="0"/>
+                        </a:rPr>
+                        <a:t> : </a:t>
+                      </a:r>
+                      <a:r>
+                        <a:rPr lang="en-US" sz="1100" dirty="0" err="1">
+                          <a:latin typeface="Consolas" panose="020B0609020204030204" pitchFamily="49" charset="0"/>
+                        </a:rPr>
+                        <a:t>Enum</a:t>
+                      </a:r>
+                      <a:endParaRPr lang="en-US" sz="1100" dirty="0">
+                        <a:latin typeface="Consolas" panose="020B0609020204030204" pitchFamily="49" charset="0"/>
+                      </a:endParaRPr>
+                    </a:p>
+                    <a:p>
+                      <a:pPr marL="0" marR="0" lvl="0" indent="0" algn="l" defTabSz="914400" rtl="0" eaLnBrk="1" fontAlgn="auto" latinLnBrk="0" hangingPunct="1">
+                        <a:lnSpc>
+                          <a:spcPct val="100000"/>
+                        </a:lnSpc>
+                        <a:spcBef>
+                          <a:spcPts val="0"/>
+                        </a:spcBef>
+                        <a:spcAft>
+                          <a:spcPts val="0"/>
+                        </a:spcAft>
+                        <a:buClrTx/>
+                        <a:buSzTx/>
+                        <a:buFontTx/>
+                        <a:buNone/>
+                        <a:tabLst/>
+                        <a:defRPr/>
+                      </a:pPr>
+                      <a:r>
+                        <a:rPr lang="en-US" sz="1100" dirty="0">
+                          <a:latin typeface="Consolas" panose="020B0609020204030204" pitchFamily="49" charset="0"/>
+                        </a:rPr>
+                        <a:t>- Size : int</a:t>
                       </a:r>
                     </a:p>
                   </a:txBody>
@@ -5295,6 +6231,182 @@
                         <a:tabLst/>
                         <a:defRPr/>
                       </a:pPr>
+                      <a:r>
+                        <a:rPr kumimoji="0" lang="en-US" sz="1100" b="0" i="0" u="none" strike="noStrike" kern="1200" cap="none" spc="0" normalizeH="0" baseline="0" noProof="0" dirty="0">
+                          <a:ln>
+                            <a:noFill/>
+                          </a:ln>
+                          <a:solidFill>
+                            <a:schemeClr val="tx1"/>
+                          </a:solidFill>
+                          <a:effectLst/>
+                          <a:uLnTx/>
+                          <a:uFillTx/>
+                          <a:latin typeface="Consolas" panose="020B0609020204030204" pitchFamily="49" charset="0"/>
+                          <a:ea typeface="+mn-ea"/>
+                          <a:cs typeface="+mn-cs"/>
+                        </a:rPr>
+                        <a:t>+ print() : void</a:t>
+                      </a:r>
+                    </a:p>
+                    <a:p>
+                      <a:pPr marL="0" marR="0" lvl="0" indent="0" algn="l" defTabSz="914400" rtl="0" eaLnBrk="1" fontAlgn="auto" latinLnBrk="0" hangingPunct="1">
+                        <a:lnSpc>
+                          <a:spcPct val="100000"/>
+                        </a:lnSpc>
+                        <a:spcBef>
+                          <a:spcPts val="0"/>
+                        </a:spcBef>
+                        <a:spcAft>
+                          <a:spcPts val="0"/>
+                        </a:spcAft>
+                        <a:buClrTx/>
+                        <a:buSzTx/>
+                        <a:buFontTx/>
+                        <a:buNone/>
+                        <a:tabLst/>
+                        <a:defRPr/>
+                      </a:pPr>
+                      <a:r>
+                        <a:rPr kumimoji="0" lang="en-US" sz="1100" b="0" i="0" u="none" strike="noStrike" kern="1200" cap="none" spc="0" normalizeH="0" baseline="0" noProof="0" dirty="0">
+                          <a:ln>
+                            <a:noFill/>
+                          </a:ln>
+                          <a:solidFill>
+                            <a:schemeClr val="tx1"/>
+                          </a:solidFill>
+                          <a:effectLst/>
+                          <a:uLnTx/>
+                          <a:uFillTx/>
+                          <a:latin typeface="Consolas" panose="020B0609020204030204" pitchFamily="49" charset="0"/>
+                          <a:ea typeface="+mn-ea"/>
+                          <a:cs typeface="+mn-cs"/>
+                        </a:rPr>
+                        <a:t>+ </a:t>
+                      </a:r>
+                      <a:r>
+                        <a:rPr kumimoji="0" lang="en-US" sz="1100" b="0" i="0" u="none" strike="noStrike" kern="1200" cap="none" spc="0" normalizeH="0" baseline="0" noProof="0" dirty="0" err="1">
+                          <a:ln>
+                            <a:noFill/>
+                          </a:ln>
+                          <a:solidFill>
+                            <a:schemeClr val="tx1"/>
+                          </a:solidFill>
+                          <a:effectLst/>
+                          <a:uLnTx/>
+                          <a:uFillTx/>
+                          <a:latin typeface="Consolas" panose="020B0609020204030204" pitchFamily="49" charset="0"/>
+                          <a:ea typeface="+mn-ea"/>
+                          <a:cs typeface="+mn-cs"/>
+                        </a:rPr>
+                        <a:t>printCommaSeparated</a:t>
+                      </a:r>
+                      <a:r>
+                        <a:rPr kumimoji="0" lang="en-US" sz="1100" b="0" i="0" u="none" strike="noStrike" kern="1200" cap="none" spc="0" normalizeH="0" baseline="0" noProof="0" dirty="0">
+                          <a:ln>
+                            <a:noFill/>
+                          </a:ln>
+                          <a:solidFill>
+                            <a:schemeClr val="tx1"/>
+                          </a:solidFill>
+                          <a:effectLst/>
+                          <a:uLnTx/>
+                          <a:uFillTx/>
+                          <a:latin typeface="Consolas" panose="020B0609020204030204" pitchFamily="49" charset="0"/>
+                          <a:ea typeface="+mn-ea"/>
+                          <a:cs typeface="+mn-cs"/>
+                        </a:rPr>
+                        <a:t>() : void</a:t>
+                      </a:r>
+                    </a:p>
+                    <a:p>
+                      <a:pPr marL="0" marR="0" lvl="0" indent="0" algn="l" defTabSz="914400" rtl="0" eaLnBrk="1" fontAlgn="auto" latinLnBrk="0" hangingPunct="1">
+                        <a:lnSpc>
+                          <a:spcPct val="100000"/>
+                        </a:lnSpc>
+                        <a:spcBef>
+                          <a:spcPts val="0"/>
+                        </a:spcBef>
+                        <a:spcAft>
+                          <a:spcPts val="0"/>
+                        </a:spcAft>
+                        <a:buClrTx/>
+                        <a:buSzTx/>
+                        <a:buFontTx/>
+                        <a:buNone/>
+                        <a:tabLst/>
+                        <a:defRPr/>
+                      </a:pPr>
+                      <a:r>
+                        <a:rPr kumimoji="0" lang="en-US" sz="1100" b="0" i="0" u="none" strike="noStrike" kern="1200" cap="none" spc="0" normalizeH="0" baseline="0" noProof="0" dirty="0">
+                          <a:ln>
+                            <a:noFill/>
+                          </a:ln>
+                          <a:solidFill>
+                            <a:schemeClr val="tx1"/>
+                          </a:solidFill>
+                          <a:effectLst/>
+                          <a:uLnTx/>
+                          <a:uFillTx/>
+                          <a:latin typeface="Consolas" panose="020B0609020204030204" pitchFamily="49" charset="0"/>
+                          <a:ea typeface="+mn-ea"/>
+                          <a:cs typeface="+mn-cs"/>
+                        </a:rPr>
+                        <a:t>+ search(String) : Person</a:t>
+                      </a:r>
+                    </a:p>
+                    <a:p>
+                      <a:pPr marL="0" marR="0" lvl="0" indent="0" algn="l" defTabSz="914400" rtl="0" eaLnBrk="1" fontAlgn="auto" latinLnBrk="0" hangingPunct="1">
+                        <a:lnSpc>
+                          <a:spcPct val="100000"/>
+                        </a:lnSpc>
+                        <a:spcBef>
+                          <a:spcPts val="0"/>
+                        </a:spcBef>
+                        <a:spcAft>
+                          <a:spcPts val="0"/>
+                        </a:spcAft>
+                        <a:buClrTx/>
+                        <a:buSzTx/>
+                        <a:buFontTx/>
+                        <a:buNone/>
+                        <a:tabLst/>
+                        <a:defRPr/>
+                      </a:pPr>
+                      <a:r>
+                        <a:rPr kumimoji="0" lang="en-US" sz="1100" b="0" i="0" u="none" strike="noStrike" kern="1200" cap="none" spc="0" normalizeH="0" baseline="0" noProof="0" dirty="0">
+                          <a:ln>
+                            <a:noFill/>
+                          </a:ln>
+                          <a:solidFill>
+                            <a:schemeClr val="tx1"/>
+                          </a:solidFill>
+                          <a:effectLst/>
+                          <a:uLnTx/>
+                          <a:uFillTx/>
+                          <a:latin typeface="Consolas" panose="020B0609020204030204" pitchFamily="49" charset="0"/>
+                          <a:ea typeface="+mn-ea"/>
+                          <a:cs typeface="+mn-cs"/>
+                        </a:rPr>
+                        <a:t>+ separate(int) : </a:t>
+                      </a:r>
+                      <a:r>
+                        <a:rPr kumimoji="0" lang="en-US" sz="1100" b="0" i="0" u="none" strike="noStrike" kern="1200" cap="none" spc="0" normalizeH="0" baseline="0" noProof="0" dirty="0" err="1">
+                          <a:ln>
+                            <a:noFill/>
+                          </a:ln>
+                          <a:solidFill>
+                            <a:schemeClr val="tx1"/>
+                          </a:solidFill>
+                          <a:effectLst/>
+                          <a:uLnTx/>
+                          <a:uFillTx/>
+                          <a:latin typeface="Consolas" panose="020B0609020204030204" pitchFamily="49" charset="0"/>
+                          <a:ea typeface="+mn-ea"/>
+                          <a:cs typeface="+mn-cs"/>
+                        </a:rPr>
+                        <a:t>CollegeDatabase</a:t>
+                      </a:r>
                       <a:endParaRPr kumimoji="0" lang="en-US" sz="1100" b="0" i="0" u="none" strike="noStrike" kern="1200" cap="none" spc="0" normalizeH="0" baseline="0" noProof="0" dirty="0">
                         <a:ln>
                           <a:noFill/>
@@ -5334,16 +6446,491 @@
                             <a:noFill/>
                           </a:ln>
                           <a:solidFill>
-                            <a:prstClr val="black"/>
-                          </a:solidFill>
-                          <a:effectLst/>
-                          <a:uLnTx/>
-                          <a:uFillTx/>
-                          <a:latin typeface="Consolas" panose="020B0609020204030204" pitchFamily="49" charset="0"/>
-                          <a:ea typeface="+mn-ea"/>
-                          <a:cs typeface="+mn-cs"/>
-                        </a:rPr>
-                        <a:t>+ search(String) : Person</a:t>
+                            <a:schemeClr val="tx1"/>
+                          </a:solidFill>
+                          <a:effectLst/>
+                          <a:uLnTx/>
+                          <a:uFillTx/>
+                          <a:latin typeface="Consolas" panose="020B0609020204030204" pitchFamily="49" charset="0"/>
+                          <a:ea typeface="+mn-ea"/>
+                          <a:cs typeface="+mn-cs"/>
+                        </a:rPr>
+                        <a:t>+ separate(int, </a:t>
+                      </a:r>
+                      <a:r>
+                        <a:rPr kumimoji="0" lang="en-US" sz="1100" b="0" i="1" u="none" strike="noStrike" kern="1200" cap="none" spc="0" normalizeH="0" baseline="0" noProof="0" dirty="0">
+                          <a:ln>
+                            <a:noFill/>
+                          </a:ln>
+                          <a:solidFill>
+                            <a:schemeClr val="tx1"/>
+                          </a:solidFill>
+                          <a:effectLst/>
+                          <a:uLnTx/>
+                          <a:uFillTx/>
+                          <a:latin typeface="Consolas" panose="020B0609020204030204" pitchFamily="49" charset="0"/>
+                          <a:ea typeface="+mn-ea"/>
+                          <a:cs typeface="+mn-cs"/>
+                        </a:rPr>
+                        <a:t>Operator</a:t>
+                      </a:r>
+                      <a:r>
+                        <a:rPr kumimoji="0" lang="en-US" sz="1100" b="0" i="0" u="none" strike="noStrike" kern="1200" cap="none" spc="0" normalizeH="0" baseline="0" noProof="0" dirty="0">
+                          <a:ln>
+                            <a:noFill/>
+                          </a:ln>
+                          <a:solidFill>
+                            <a:schemeClr val="tx1"/>
+                          </a:solidFill>
+                          <a:effectLst/>
+                          <a:uLnTx/>
+                          <a:uFillTx/>
+                          <a:latin typeface="Consolas" panose="020B0609020204030204" pitchFamily="49" charset="0"/>
+                          <a:ea typeface="+mn-ea"/>
+                          <a:cs typeface="+mn-cs"/>
+                        </a:rPr>
+                        <a:t>) : </a:t>
+                      </a:r>
+                      <a:r>
+                        <a:rPr kumimoji="0" lang="en-US" sz="1100" b="0" i="0" u="none" strike="noStrike" kern="1200" cap="none" spc="0" normalizeH="0" baseline="0" noProof="0" dirty="0" err="1">
+                          <a:ln>
+                            <a:noFill/>
+                          </a:ln>
+                          <a:solidFill>
+                            <a:schemeClr val="tx1"/>
+                          </a:solidFill>
+                          <a:effectLst/>
+                          <a:uLnTx/>
+                          <a:uFillTx/>
+                          <a:latin typeface="Consolas" panose="020B0609020204030204" pitchFamily="49" charset="0"/>
+                          <a:ea typeface="+mn-ea"/>
+                          <a:cs typeface="+mn-cs"/>
+                        </a:rPr>
+                        <a:t>CollegeDatabase</a:t>
+                      </a:r>
+                      <a:endParaRPr kumimoji="0" lang="en-US" sz="1100" b="0" i="0" u="none" strike="noStrike" kern="1200" cap="none" spc="0" normalizeH="0" baseline="0" noProof="0" dirty="0">
+                        <a:ln>
+                          <a:noFill/>
+                        </a:ln>
+                        <a:solidFill>
+                          <a:schemeClr val="tx1"/>
+                        </a:solidFill>
+                        <a:effectLst/>
+                        <a:uLnTx/>
+                        <a:uFillTx/>
+                        <a:latin typeface="Consolas" panose="020B0609020204030204" pitchFamily="49" charset="0"/>
+                        <a:ea typeface="+mn-ea"/>
+                        <a:cs typeface="+mn-cs"/>
+                      </a:endParaRPr>
+                    </a:p>
+                    <a:p>
+                      <a:pPr marL="0" marR="0" lvl="0" indent="0" algn="l" defTabSz="914400" rtl="0" eaLnBrk="1" fontAlgn="auto" latinLnBrk="0" hangingPunct="1">
+                        <a:lnSpc>
+                          <a:spcPct val="100000"/>
+                        </a:lnSpc>
+                        <a:spcBef>
+                          <a:spcPts val="0"/>
+                        </a:spcBef>
+                        <a:spcAft>
+                          <a:spcPts val="0"/>
+                        </a:spcAft>
+                        <a:buClrTx/>
+                        <a:buSzTx/>
+                        <a:buFontTx/>
+                        <a:buNone/>
+                        <a:tabLst/>
+                        <a:defRPr/>
+                      </a:pPr>
+                      <a:r>
+                        <a:rPr kumimoji="0" lang="en-US" sz="1100" b="0" i="0" u="none" strike="noStrike" kern="1200" cap="none" spc="0" normalizeH="0" baseline="0" noProof="0" dirty="0">
+                          <a:ln>
+                            <a:noFill/>
+                          </a:ln>
+                          <a:solidFill>
+                            <a:schemeClr val="tx1"/>
+                          </a:solidFill>
+                          <a:effectLst/>
+                          <a:uLnTx/>
+                          <a:uFillTx/>
+                          <a:latin typeface="Consolas" panose="020B0609020204030204" pitchFamily="49" charset="0"/>
+                          <a:ea typeface="+mn-ea"/>
+                          <a:cs typeface="+mn-cs"/>
+                        </a:rPr>
+                        <a:t>+ separate</a:t>
+                      </a:r>
+                      <a:r>
+                        <a:rPr kumimoji="0" lang="en-US" sz="1100" b="0" i="1" u="none" strike="noStrike" kern="1200" cap="none" spc="0" normalizeH="0" baseline="0" noProof="0" dirty="0">
+                          <a:ln>
+                            <a:noFill/>
+                          </a:ln>
+                          <a:solidFill>
+                            <a:schemeClr val="tx1"/>
+                          </a:solidFill>
+                          <a:effectLst/>
+                          <a:uLnTx/>
+                          <a:uFillTx/>
+                          <a:latin typeface="Consolas" panose="020B0609020204030204" pitchFamily="49" charset="0"/>
+                          <a:ea typeface="+mn-ea"/>
+                          <a:cs typeface="+mn-cs"/>
+                        </a:rPr>
+                        <a:t>(</a:t>
+                      </a:r>
+                      <a:r>
+                        <a:rPr kumimoji="0" lang="en-US" sz="1100" b="0" i="1" u="none" strike="noStrike" kern="1200" cap="none" spc="0" normalizeH="0" baseline="0" noProof="0" dirty="0" err="1">
+                          <a:ln>
+                            <a:noFill/>
+                          </a:ln>
+                          <a:solidFill>
+                            <a:schemeClr val="tx1"/>
+                          </a:solidFill>
+                          <a:effectLst/>
+                          <a:uLnTx/>
+                          <a:uFillTx/>
+                          <a:latin typeface="Consolas" panose="020B0609020204030204" pitchFamily="49" charset="0"/>
+                          <a:ea typeface="+mn-ea"/>
+                          <a:cs typeface="+mn-cs"/>
+                        </a:rPr>
+                        <a:t>PersonType</a:t>
+                      </a:r>
+                      <a:r>
+                        <a:rPr kumimoji="0" lang="en-US" sz="1100" b="0" i="1" u="none" strike="noStrike" kern="1200" cap="none" spc="0" normalizeH="0" baseline="0" noProof="0" dirty="0">
+                          <a:ln>
+                            <a:noFill/>
+                          </a:ln>
+                          <a:solidFill>
+                            <a:schemeClr val="tx1"/>
+                          </a:solidFill>
+                          <a:effectLst/>
+                          <a:uLnTx/>
+                          <a:uFillTx/>
+                          <a:latin typeface="Consolas" panose="020B0609020204030204" pitchFamily="49" charset="0"/>
+                          <a:ea typeface="+mn-ea"/>
+                          <a:cs typeface="+mn-cs"/>
+                        </a:rPr>
+                        <a:t>)</a:t>
+                      </a:r>
+                      <a:r>
+                        <a:rPr kumimoji="0" lang="en-US" sz="1100" b="0" i="0" u="none" strike="noStrike" kern="1200" cap="none" spc="0" normalizeH="0" baseline="0" noProof="0" dirty="0">
+                          <a:ln>
+                            <a:noFill/>
+                          </a:ln>
+                          <a:solidFill>
+                            <a:schemeClr val="tx1"/>
+                          </a:solidFill>
+                          <a:effectLst/>
+                          <a:uLnTx/>
+                          <a:uFillTx/>
+                          <a:latin typeface="Consolas" panose="020B0609020204030204" pitchFamily="49" charset="0"/>
+                          <a:ea typeface="+mn-ea"/>
+                          <a:cs typeface="+mn-cs"/>
+                        </a:rPr>
+                        <a:t> : </a:t>
+                      </a:r>
+                      <a:r>
+                        <a:rPr kumimoji="0" lang="en-US" sz="1100" b="0" i="0" u="none" strike="noStrike" kern="1200" cap="none" spc="0" normalizeH="0" baseline="0" noProof="0" dirty="0" err="1">
+                          <a:ln>
+                            <a:noFill/>
+                          </a:ln>
+                          <a:solidFill>
+                            <a:schemeClr val="tx1"/>
+                          </a:solidFill>
+                          <a:effectLst/>
+                          <a:uLnTx/>
+                          <a:uFillTx/>
+                          <a:latin typeface="Consolas" panose="020B0609020204030204" pitchFamily="49" charset="0"/>
+                          <a:ea typeface="+mn-ea"/>
+                          <a:cs typeface="+mn-cs"/>
+                        </a:rPr>
+                        <a:t>CollegeDatabase</a:t>
+                      </a:r>
+                      <a:endParaRPr kumimoji="0" lang="en-US" sz="1100" b="0" i="0" u="none" strike="noStrike" kern="1200" cap="none" spc="0" normalizeH="0" baseline="0" noProof="0" dirty="0">
+                        <a:ln>
+                          <a:noFill/>
+                        </a:ln>
+                        <a:solidFill>
+                          <a:schemeClr val="tx1"/>
+                        </a:solidFill>
+                        <a:effectLst/>
+                        <a:uLnTx/>
+                        <a:uFillTx/>
+                        <a:latin typeface="Consolas" panose="020B0609020204030204" pitchFamily="49" charset="0"/>
+                        <a:ea typeface="+mn-ea"/>
+                        <a:cs typeface="+mn-cs"/>
+                      </a:endParaRPr>
+                    </a:p>
+                    <a:p>
+                      <a:pPr marL="0" marR="0" lvl="0" indent="0" algn="l" defTabSz="914400" rtl="0" eaLnBrk="1" fontAlgn="auto" latinLnBrk="0" hangingPunct="1">
+                        <a:lnSpc>
+                          <a:spcPct val="100000"/>
+                        </a:lnSpc>
+                        <a:spcBef>
+                          <a:spcPts val="0"/>
+                        </a:spcBef>
+                        <a:spcAft>
+                          <a:spcPts val="0"/>
+                        </a:spcAft>
+                        <a:buClrTx/>
+                        <a:buSzTx/>
+                        <a:buFontTx/>
+                        <a:buNone/>
+                        <a:tabLst/>
+                        <a:defRPr/>
+                      </a:pPr>
+                      <a:r>
+                        <a:rPr kumimoji="0" lang="en-US" sz="1100" b="0" i="0" u="none" strike="noStrike" kern="1200" cap="none" spc="0" normalizeH="0" baseline="0" noProof="0" dirty="0">
+                          <a:ln>
+                            <a:noFill/>
+                          </a:ln>
+                          <a:solidFill>
+                            <a:schemeClr val="tx1"/>
+                          </a:solidFill>
+                          <a:effectLst/>
+                          <a:uLnTx/>
+                          <a:uFillTx/>
+                          <a:latin typeface="Consolas" panose="020B0609020204030204" pitchFamily="49" charset="0"/>
+                          <a:ea typeface="+mn-ea"/>
+                          <a:cs typeface="+mn-cs"/>
+                        </a:rPr>
+                        <a:t>+ separate(</a:t>
+                      </a:r>
+                      <a:r>
+                        <a:rPr kumimoji="0" lang="en-US" sz="1100" b="0" i="1" u="none" strike="noStrike" kern="1200" cap="none" spc="0" normalizeH="0" baseline="0" noProof="0" dirty="0" err="1">
+                          <a:ln>
+                            <a:noFill/>
+                          </a:ln>
+                          <a:solidFill>
+                            <a:schemeClr val="tx1"/>
+                          </a:solidFill>
+                          <a:effectLst/>
+                          <a:uLnTx/>
+                          <a:uFillTx/>
+                          <a:latin typeface="Consolas" panose="020B0609020204030204" pitchFamily="49" charset="0"/>
+                          <a:ea typeface="+mn-ea"/>
+                          <a:cs typeface="+mn-cs"/>
+                        </a:rPr>
+                        <a:t>PersonType</a:t>
+                      </a:r>
+                      <a:r>
+                        <a:rPr kumimoji="0" lang="en-US" sz="1100" b="0" i="0" u="none" strike="noStrike" kern="1200" cap="none" spc="0" normalizeH="0" baseline="0" noProof="0" dirty="0">
+                          <a:ln>
+                            <a:noFill/>
+                          </a:ln>
+                          <a:solidFill>
+                            <a:schemeClr val="tx1"/>
+                          </a:solidFill>
+                          <a:effectLst/>
+                          <a:uLnTx/>
+                          <a:uFillTx/>
+                          <a:latin typeface="Consolas" panose="020B0609020204030204" pitchFamily="49" charset="0"/>
+                          <a:ea typeface="+mn-ea"/>
+                          <a:cs typeface="+mn-cs"/>
+                        </a:rPr>
+                        <a:t>, double, </a:t>
+                      </a:r>
+                      <a:r>
+                        <a:rPr kumimoji="0" lang="en-US" sz="1100" b="0" i="1" u="none" strike="noStrike" kern="1200" cap="none" spc="0" normalizeH="0" baseline="0" noProof="0" dirty="0">
+                          <a:ln>
+                            <a:noFill/>
+                          </a:ln>
+                          <a:solidFill>
+                            <a:schemeClr val="tx1"/>
+                          </a:solidFill>
+                          <a:effectLst/>
+                          <a:uLnTx/>
+                          <a:uFillTx/>
+                          <a:latin typeface="Consolas" panose="020B0609020204030204" pitchFamily="49" charset="0"/>
+                          <a:ea typeface="+mn-ea"/>
+                          <a:cs typeface="+mn-cs"/>
+                        </a:rPr>
+                        <a:t>Operator</a:t>
+                      </a:r>
+                      <a:r>
+                        <a:rPr kumimoji="0" lang="en-US" sz="1100" b="0" i="0" u="none" strike="noStrike" kern="1200" cap="none" spc="0" normalizeH="0" baseline="0" noProof="0" dirty="0">
+                          <a:ln>
+                            <a:noFill/>
+                          </a:ln>
+                          <a:solidFill>
+                            <a:schemeClr val="tx1"/>
+                          </a:solidFill>
+                          <a:effectLst/>
+                          <a:uLnTx/>
+                          <a:uFillTx/>
+                          <a:latin typeface="Consolas" panose="020B0609020204030204" pitchFamily="49" charset="0"/>
+                          <a:ea typeface="+mn-ea"/>
+                          <a:cs typeface="+mn-cs"/>
+                        </a:rPr>
+                        <a:t>) : </a:t>
+                      </a:r>
+                      <a:r>
+                        <a:rPr kumimoji="0" lang="en-US" sz="1100" b="0" i="0" u="none" strike="noStrike" kern="1200" cap="none" spc="0" normalizeH="0" baseline="0" noProof="0" dirty="0" err="1">
+                          <a:ln>
+                            <a:noFill/>
+                          </a:ln>
+                          <a:solidFill>
+                            <a:schemeClr val="tx1"/>
+                          </a:solidFill>
+                          <a:effectLst/>
+                          <a:uLnTx/>
+                          <a:uFillTx/>
+                          <a:latin typeface="Consolas" panose="020B0609020204030204" pitchFamily="49" charset="0"/>
+                          <a:ea typeface="+mn-ea"/>
+                          <a:cs typeface="+mn-cs"/>
+                        </a:rPr>
+                        <a:t>CollegeDatabase</a:t>
+                      </a:r>
+                      <a:endParaRPr kumimoji="0" lang="en-US" sz="1100" b="0" i="0" u="none" strike="noStrike" kern="1200" cap="none" spc="0" normalizeH="0" baseline="0" noProof="0" dirty="0">
+                        <a:ln>
+                          <a:noFill/>
+                        </a:ln>
+                        <a:solidFill>
+                          <a:schemeClr val="tx1"/>
+                        </a:solidFill>
+                        <a:effectLst/>
+                        <a:uLnTx/>
+                        <a:uFillTx/>
+                        <a:latin typeface="Consolas" panose="020B0609020204030204" pitchFamily="49" charset="0"/>
+                        <a:ea typeface="+mn-ea"/>
+                        <a:cs typeface="+mn-cs"/>
+                      </a:endParaRPr>
+                    </a:p>
+                    <a:p>
+                      <a:pPr marL="0" marR="0" lvl="0" indent="0" algn="l" defTabSz="914400" rtl="0" eaLnBrk="1" fontAlgn="auto" latinLnBrk="0" hangingPunct="1">
+                        <a:lnSpc>
+                          <a:spcPct val="100000"/>
+                        </a:lnSpc>
+                        <a:spcBef>
+                          <a:spcPts val="0"/>
+                        </a:spcBef>
+                        <a:spcAft>
+                          <a:spcPts val="0"/>
+                        </a:spcAft>
+                        <a:buClrTx/>
+                        <a:buSzTx/>
+                        <a:buFontTx/>
+                        <a:buNone/>
+                        <a:tabLst/>
+                        <a:defRPr/>
+                      </a:pPr>
+                      <a:r>
+                        <a:rPr kumimoji="0" lang="en-US" sz="1100" b="0" i="0" u="none" strike="noStrike" kern="1200" cap="none" spc="0" normalizeH="0" baseline="0" noProof="0" dirty="0">
+                          <a:ln>
+                            <a:noFill/>
+                          </a:ln>
+                          <a:solidFill>
+                            <a:schemeClr val="tx1"/>
+                          </a:solidFill>
+                          <a:effectLst/>
+                          <a:uLnTx/>
+                          <a:uFillTx/>
+                          <a:latin typeface="Consolas" panose="020B0609020204030204" pitchFamily="49" charset="0"/>
+                          <a:ea typeface="+mn-ea"/>
+                          <a:cs typeface="+mn-cs"/>
+                        </a:rPr>
+                        <a:t>+ </a:t>
+                      </a:r>
+                      <a:r>
+                        <a:rPr kumimoji="0" lang="en-US" sz="1100" b="0" i="0" u="none" strike="noStrike" kern="1200" cap="none" spc="0" normalizeH="0" baseline="0" noProof="0" dirty="0" err="1">
+                          <a:ln>
+                            <a:noFill/>
+                          </a:ln>
+                          <a:solidFill>
+                            <a:schemeClr val="tx1"/>
+                          </a:solidFill>
+                          <a:effectLst/>
+                          <a:uLnTx/>
+                          <a:uFillTx/>
+                          <a:latin typeface="Consolas" panose="020B0609020204030204" pitchFamily="49" charset="0"/>
+                          <a:ea typeface="+mn-ea"/>
+                          <a:cs typeface="+mn-cs"/>
+                        </a:rPr>
+                        <a:t>toFile</a:t>
+                      </a:r>
+                      <a:r>
+                        <a:rPr kumimoji="0" lang="en-US" sz="1100" b="0" i="0" u="none" strike="noStrike" kern="1200" cap="none" spc="0" normalizeH="0" baseline="0" noProof="0" dirty="0">
+                          <a:ln>
+                            <a:noFill/>
+                          </a:ln>
+                          <a:solidFill>
+                            <a:schemeClr val="tx1"/>
+                          </a:solidFill>
+                          <a:effectLst/>
+                          <a:uLnTx/>
+                          <a:uFillTx/>
+                          <a:latin typeface="Consolas" panose="020B0609020204030204" pitchFamily="49" charset="0"/>
+                          <a:ea typeface="+mn-ea"/>
+                          <a:cs typeface="+mn-cs"/>
+                        </a:rPr>
+                        <a:t>() : String</a:t>
+                      </a:r>
+                    </a:p>
+                    <a:p>
+                      <a:pPr marL="0" marR="0" lvl="0" indent="0" algn="l" defTabSz="914400" rtl="0" eaLnBrk="1" fontAlgn="auto" latinLnBrk="0" hangingPunct="1">
+                        <a:lnSpc>
+                          <a:spcPct val="100000"/>
+                        </a:lnSpc>
+                        <a:spcBef>
+                          <a:spcPts val="0"/>
+                        </a:spcBef>
+                        <a:spcAft>
+                          <a:spcPts val="0"/>
+                        </a:spcAft>
+                        <a:buClrTx/>
+                        <a:buSzTx/>
+                        <a:buFontTx/>
+                        <a:buNone/>
+                        <a:tabLst/>
+                        <a:defRPr/>
+                      </a:pPr>
+                      <a:r>
+                        <a:rPr kumimoji="0" lang="en-US" sz="1100" b="0" i="0" u="none" strike="noStrike" kern="1200" cap="none" spc="0" normalizeH="0" baseline="0" noProof="0" dirty="0">
+                          <a:ln>
+                            <a:noFill/>
+                          </a:ln>
+                          <a:solidFill>
+                            <a:schemeClr val="tx1"/>
+                          </a:solidFill>
+                          <a:effectLst/>
+                          <a:uLnTx/>
+                          <a:uFillTx/>
+                          <a:latin typeface="Consolas" panose="020B0609020204030204" pitchFamily="49" charset="0"/>
+                          <a:ea typeface="+mn-ea"/>
+                          <a:cs typeface="+mn-cs"/>
+                        </a:rPr>
+                        <a:t>+ </a:t>
+                      </a:r>
+                      <a:r>
+                        <a:rPr kumimoji="0" lang="en-US" sz="1100" b="0" i="0" u="none" strike="noStrike" kern="1200" cap="none" spc="0" normalizeH="0" baseline="0" noProof="0" dirty="0" err="1">
+                          <a:ln>
+                            <a:noFill/>
+                          </a:ln>
+                          <a:solidFill>
+                            <a:schemeClr val="tx1"/>
+                          </a:solidFill>
+                          <a:effectLst/>
+                          <a:uLnTx/>
+                          <a:uFillTx/>
+                          <a:latin typeface="Consolas" panose="020B0609020204030204" pitchFamily="49" charset="0"/>
+                          <a:ea typeface="+mn-ea"/>
+                          <a:cs typeface="+mn-cs"/>
+                        </a:rPr>
+                        <a:t>toString</a:t>
+                      </a:r>
+                      <a:r>
+                        <a:rPr kumimoji="0" lang="en-US" sz="1100" b="0" i="0" u="none" strike="noStrike" kern="1200" cap="none" spc="0" normalizeH="0" baseline="0" noProof="0" dirty="0">
+                          <a:ln>
+                            <a:noFill/>
+                          </a:ln>
+                          <a:solidFill>
+                            <a:schemeClr val="tx1"/>
+                          </a:solidFill>
+                          <a:effectLst/>
+                          <a:uLnTx/>
+                          <a:uFillTx/>
+                          <a:latin typeface="Consolas" panose="020B0609020204030204" pitchFamily="49" charset="0"/>
+                          <a:ea typeface="+mn-ea"/>
+                          <a:cs typeface="+mn-cs"/>
+                        </a:rPr>
+                        <a:t>() : String</a:t>
                       </a:r>
                     </a:p>
                   </a:txBody>
@@ -5359,44 +6946,6 @@
           </a:graphicData>
         </a:graphic>
       </p:graphicFrame>
-      <p:sp>
-        <p:nvSpPr>
-          <p:cNvPr id="4" name="TextBox 3">
-            <a:extLst>
-              <a:ext uri="{FF2B5EF4-FFF2-40B4-BE49-F238E27FC236}">
-                <a16:creationId xmlns:a16="http://schemas.microsoft.com/office/drawing/2014/main" id="{4497A6B8-EF1C-4B79-A101-A61767A28747}"/>
-              </a:ext>
-            </a:extLst>
-          </p:cNvPr>
-          <p:cNvSpPr txBox="1"/>
-          <p:nvPr/>
-        </p:nvSpPr>
-        <p:spPr>
-          <a:xfrm>
-            <a:off x="4298272" y="15821"/>
-            <a:ext cx="3595456" cy="369332"/>
-          </a:xfrm>
-          <a:prstGeom prst="rect">
-            <a:avLst/>
-          </a:prstGeom>
-          <a:noFill/>
-        </p:spPr>
-        <p:txBody>
-          <a:bodyPr wrap="square" rtlCol="0">
-            <a:spAutoFit/>
-          </a:bodyPr>
-          <a:lstStyle/>
-          <a:p>
-            <a:pPr algn="ctr"/>
-            <a:r>
-              <a:rPr lang="en-US" dirty="0">
-                <a:latin typeface="Consolas" panose="020B0609020204030204" pitchFamily="49" charset="0"/>
-              </a:rPr>
-              <a:t>database package</a:t>
-            </a:r>
-          </a:p>
-        </p:txBody>
-      </p:sp>
       <p:graphicFrame>
         <p:nvGraphicFramePr>
           <p:cNvPr id="5" name="Table 4">
@@ -5412,13 +6961,13 @@
           <p:nvPr>
             <p:extLst>
               <p:ext uri="{D42A27DB-BD31-4B8C-83A1-F6EECF244321}">
-                <p14:modId xmlns:p14="http://schemas.microsoft.com/office/powerpoint/2010/main" val="1653023413"/>
+                <p14:modId xmlns:p14="http://schemas.microsoft.com/office/powerpoint/2010/main" val="2843994583"/>
               </p:ext>
             </p:extLst>
           </p:nvPr>
         </p:nvGraphicFramePr>
         <p:xfrm>
-          <a:off x="5103713" y="3679573"/>
+          <a:off x="5468828" y="4471566"/>
           <a:ext cx="2221822" cy="1666240"/>
         </p:xfrm>
         <a:graphic>
@@ -5469,7 +7018,14 @@
                       </a:r>
                     </a:p>
                   </a:txBody>
-                  <a:tcPr/>
+                  <a:tcPr>
+                    <a:solidFill>
+                      <a:schemeClr val="tx1">
+                        <a:lumMod val="50000"/>
+                        <a:lumOff val="50000"/>
+                      </a:schemeClr>
+                    </a:solidFill>
+                  </a:tcPr>
                 </a:tc>
                 <a:extLst>
                   <a:ext uri="{0D108BD9-81ED-4DB2-BD59-A6C34878D82A}">
@@ -5560,13 +7116,13 @@
           <p:nvPr>
             <p:extLst>
               <p:ext uri="{D42A27DB-BD31-4B8C-83A1-F6EECF244321}">
-                <p14:modId xmlns:p14="http://schemas.microsoft.com/office/powerpoint/2010/main" val="3844797005"/>
+                <p14:modId xmlns:p14="http://schemas.microsoft.com/office/powerpoint/2010/main" val="2808946712"/>
               </p:ext>
             </p:extLst>
           </p:nvPr>
         </p:nvGraphicFramePr>
         <p:xfrm>
-          <a:off x="5103713" y="2032363"/>
+          <a:off x="5575206" y="602828"/>
           <a:ext cx="2009066" cy="1498600"/>
         </p:xfrm>
         <a:graphic>
@@ -5752,13 +7308,13 @@
           <p:nvPr>
             <p:extLst>
               <p:ext uri="{D42A27DB-BD31-4B8C-83A1-F6EECF244321}">
-                <p14:modId xmlns:p14="http://schemas.microsoft.com/office/powerpoint/2010/main" val="2714915864"/>
+                <p14:modId xmlns:p14="http://schemas.microsoft.com/office/powerpoint/2010/main" val="1899347036"/>
               </p:ext>
             </p:extLst>
           </p:nvPr>
         </p:nvGraphicFramePr>
         <p:xfrm>
-          <a:off x="5103713" y="385153"/>
+          <a:off x="5575206" y="2537197"/>
           <a:ext cx="2009066" cy="1498600"/>
         </p:xfrm>
         <a:graphic>
@@ -5906,6 +7462,268 @@
           </a:graphicData>
         </a:graphic>
       </p:graphicFrame>
+      <p:sp>
+        <p:nvSpPr>
+          <p:cNvPr id="9" name="Flowchart: Summing Junction 8">
+            <a:extLst>
+              <a:ext uri="{FF2B5EF4-FFF2-40B4-BE49-F238E27FC236}">
+                <a16:creationId xmlns:a16="http://schemas.microsoft.com/office/drawing/2014/main" id="{BBF472CF-569C-45E0-8160-9C7DBCA6F4C3}"/>
+              </a:ext>
+            </a:extLst>
+          </p:cNvPr>
+          <p:cNvSpPr/>
+          <p:nvPr/>
+        </p:nvSpPr>
+        <p:spPr>
+          <a:xfrm>
+            <a:off x="4783216" y="1740137"/>
+            <a:ext cx="144262" cy="152862"/>
+          </a:xfrm>
+          <a:prstGeom prst="flowChartSummingJunction">
+            <a:avLst/>
+          </a:prstGeom>
+        </p:spPr>
+        <p:style>
+          <a:lnRef idx="2">
+            <a:schemeClr val="dk1"/>
+          </a:lnRef>
+          <a:fillRef idx="1">
+            <a:schemeClr val="lt1"/>
+          </a:fillRef>
+          <a:effectRef idx="0">
+            <a:schemeClr val="dk1"/>
+          </a:effectRef>
+          <a:fontRef idx="minor">
+            <a:schemeClr val="dk1"/>
+          </a:fontRef>
+        </p:style>
+        <p:txBody>
+          <a:bodyPr rtlCol="0" anchor="ctr"/>
+          <a:lstStyle/>
+          <a:p>
+            <a:pPr algn="ctr"/>
+            <a:endParaRPr lang="en-US">
+              <a:solidFill>
+                <a:schemeClr val="tx1"/>
+              </a:solidFill>
+            </a:endParaRPr>
+          </a:p>
+        </p:txBody>
+      </p:sp>
+      <p:sp>
+        <p:nvSpPr>
+          <p:cNvPr id="10" name="Flowchart: Summing Junction 9">
+            <a:extLst>
+              <a:ext uri="{FF2B5EF4-FFF2-40B4-BE49-F238E27FC236}">
+                <a16:creationId xmlns:a16="http://schemas.microsoft.com/office/drawing/2014/main" id="{CDC69D90-574F-4FFA-AB78-EFE63B5B5E02}"/>
+              </a:ext>
+            </a:extLst>
+          </p:cNvPr>
+          <p:cNvSpPr/>
+          <p:nvPr/>
+        </p:nvSpPr>
+        <p:spPr>
+          <a:xfrm>
+            <a:off x="4783216" y="1569519"/>
+            <a:ext cx="144262" cy="152862"/>
+          </a:xfrm>
+          <a:prstGeom prst="flowChartSummingJunction">
+            <a:avLst/>
+          </a:prstGeom>
+        </p:spPr>
+        <p:style>
+          <a:lnRef idx="2">
+            <a:schemeClr val="dk1"/>
+          </a:lnRef>
+          <a:fillRef idx="1">
+            <a:schemeClr val="lt1"/>
+          </a:fillRef>
+          <a:effectRef idx="0">
+            <a:schemeClr val="dk1"/>
+          </a:effectRef>
+          <a:fontRef idx="minor">
+            <a:schemeClr val="dk1"/>
+          </a:fontRef>
+        </p:style>
+        <p:txBody>
+          <a:bodyPr rtlCol="0" anchor="ctr"/>
+          <a:lstStyle/>
+          <a:p>
+            <a:pPr algn="ctr"/>
+            <a:endParaRPr lang="en-US">
+              <a:solidFill>
+                <a:schemeClr val="tx1"/>
+              </a:solidFill>
+            </a:endParaRPr>
+          </a:p>
+        </p:txBody>
+      </p:sp>
+      <p:sp>
+        <p:nvSpPr>
+          <p:cNvPr id="11" name="Isosceles Triangle 10">
+            <a:extLst>
+              <a:ext uri="{FF2B5EF4-FFF2-40B4-BE49-F238E27FC236}">
+                <a16:creationId xmlns:a16="http://schemas.microsoft.com/office/drawing/2014/main" id="{D75B0C41-0E69-4E9E-B7FA-EB0443B2DCD7}"/>
+              </a:ext>
+            </a:extLst>
+          </p:cNvPr>
+          <p:cNvSpPr/>
+          <p:nvPr/>
+        </p:nvSpPr>
+        <p:spPr>
+          <a:xfrm rot="5400000">
+            <a:off x="5320266" y="4820575"/>
+            <a:ext cx="144262" cy="152862"/>
+          </a:xfrm>
+          <a:prstGeom prst="triangle">
+            <a:avLst/>
+          </a:prstGeom>
+          <a:solidFill>
+            <a:schemeClr val="bg1"/>
+          </a:solidFill>
+        </p:spPr>
+        <p:style>
+          <a:lnRef idx="2">
+            <a:schemeClr val="accent1">
+              <a:shade val="50000"/>
+            </a:schemeClr>
+          </a:lnRef>
+          <a:fillRef idx="1">
+            <a:schemeClr val="accent1"/>
+          </a:fillRef>
+          <a:effectRef idx="0">
+            <a:schemeClr val="accent1"/>
+          </a:effectRef>
+          <a:fontRef idx="minor">
+            <a:schemeClr val="lt1"/>
+          </a:fontRef>
+        </p:style>
+        <p:txBody>
+          <a:bodyPr rtlCol="0" anchor="ctr"/>
+          <a:lstStyle/>
+          <a:p>
+            <a:pPr algn="ctr"/>
+            <a:endParaRPr lang="en-US"/>
+          </a:p>
+        </p:txBody>
+      </p:sp>
+      <p:cxnSp>
+        <p:nvCxnSpPr>
+          <p:cNvPr id="13" name="Straight Connector 12">
+            <a:extLst>
+              <a:ext uri="{FF2B5EF4-FFF2-40B4-BE49-F238E27FC236}">
+                <a16:creationId xmlns:a16="http://schemas.microsoft.com/office/drawing/2014/main" id="{98E4DC03-D345-43EF-9DAC-078E48992A2B}"/>
+              </a:ext>
+            </a:extLst>
+          </p:cNvPr>
+          <p:cNvCxnSpPr>
+            <a:stCxn id="10" idx="6"/>
+            <a:endCxn id="6" idx="1"/>
+          </p:cNvCxnSpPr>
+          <p:nvPr/>
+        </p:nvCxnSpPr>
+        <p:spPr>
+          <a:xfrm flipV="1">
+            <a:off x="4927478" y="1352128"/>
+            <a:ext cx="647728" cy="293822"/>
+          </a:xfrm>
+          <a:prstGeom prst="line">
+            <a:avLst/>
+          </a:prstGeom>
+        </p:spPr>
+        <p:style>
+          <a:lnRef idx="1">
+            <a:schemeClr val="dk1"/>
+          </a:lnRef>
+          <a:fillRef idx="0">
+            <a:schemeClr val="dk1"/>
+          </a:fillRef>
+          <a:effectRef idx="0">
+            <a:schemeClr val="dk1"/>
+          </a:effectRef>
+          <a:fontRef idx="minor">
+            <a:schemeClr val="tx1"/>
+          </a:fontRef>
+        </p:style>
+      </p:cxnSp>
+      <p:cxnSp>
+        <p:nvCxnSpPr>
+          <p:cNvPr id="15" name="Straight Connector 14">
+            <a:extLst>
+              <a:ext uri="{FF2B5EF4-FFF2-40B4-BE49-F238E27FC236}">
+                <a16:creationId xmlns:a16="http://schemas.microsoft.com/office/drawing/2014/main" id="{FC2C0D28-8B73-48CA-BEC3-655AC65FB957}"/>
+              </a:ext>
+            </a:extLst>
+          </p:cNvPr>
+          <p:cNvCxnSpPr>
+            <a:cxnSpLocks/>
+            <a:stCxn id="9" idx="5"/>
+            <a:endCxn id="7" idx="1"/>
+          </p:cNvCxnSpPr>
+          <p:nvPr/>
+        </p:nvCxnSpPr>
+        <p:spPr>
+          <a:xfrm>
+            <a:off x="4906351" y="1870613"/>
+            <a:ext cx="668855" cy="1415884"/>
+          </a:xfrm>
+          <a:prstGeom prst="line">
+            <a:avLst/>
+          </a:prstGeom>
+        </p:spPr>
+        <p:style>
+          <a:lnRef idx="1">
+            <a:schemeClr val="dk1"/>
+          </a:lnRef>
+          <a:fillRef idx="0">
+            <a:schemeClr val="dk1"/>
+          </a:fillRef>
+          <a:effectRef idx="0">
+            <a:schemeClr val="dk1"/>
+          </a:effectRef>
+          <a:fontRef idx="minor">
+            <a:schemeClr val="tx1"/>
+          </a:fontRef>
+        </p:style>
+      </p:cxnSp>
+      <p:cxnSp>
+        <p:nvCxnSpPr>
+          <p:cNvPr id="18" name="Straight Connector 17">
+            <a:extLst>
+              <a:ext uri="{FF2B5EF4-FFF2-40B4-BE49-F238E27FC236}">
+                <a16:creationId xmlns:a16="http://schemas.microsoft.com/office/drawing/2014/main" id="{C4E5EBE5-D08E-46E0-919F-9B26544FE442}"/>
+              </a:ext>
+            </a:extLst>
+          </p:cNvPr>
+          <p:cNvCxnSpPr>
+            <a:stCxn id="11" idx="3"/>
+          </p:cNvCxnSpPr>
+          <p:nvPr/>
+        </p:nvCxnSpPr>
+        <p:spPr>
+          <a:xfrm flipH="1">
+            <a:off x="4800600" y="4897006"/>
+            <a:ext cx="515366" cy="0"/>
+          </a:xfrm>
+          <a:prstGeom prst="line">
+            <a:avLst/>
+          </a:prstGeom>
+        </p:spPr>
+        <p:style>
+          <a:lnRef idx="1">
+            <a:schemeClr val="accent1"/>
+          </a:lnRef>
+          <a:fillRef idx="0">
+            <a:schemeClr val="accent1"/>
+          </a:fillRef>
+          <a:effectRef idx="0">
+            <a:schemeClr val="accent1"/>
+          </a:effectRef>
+          <a:fontRef idx="minor">
+            <a:schemeClr val="tx1"/>
+          </a:fontRef>
+        </p:style>
+      </p:cxnSp>
     </p:spTree>
     <p:extLst>
       <p:ext uri="{BB962C8B-B14F-4D97-AF65-F5344CB8AC3E}">

</xml_diff>

<commit_message>
Fixed setGPA(double) to take double, more UML ppt
</commit_message>
<xml_diff>
--- a/FinalProject_UML.pptx
+++ b/FinalProject_UML.pptx
@@ -3342,14 +3342,14 @@
           <p:nvPr>
             <p:extLst>
               <p:ext uri="{D42A27DB-BD31-4B8C-83A1-F6EECF244321}">
-                <p14:modId xmlns:p14="http://schemas.microsoft.com/office/powerpoint/2010/main" val="670174645"/>
+                <p14:modId xmlns:p14="http://schemas.microsoft.com/office/powerpoint/2010/main" val="1718159850"/>
               </p:ext>
             </p:extLst>
           </p:nvPr>
         </p:nvGraphicFramePr>
         <p:xfrm>
-          <a:off x="2460594" y="2450681"/>
-          <a:ext cx="2353569" cy="1442720"/>
+          <a:off x="344415" y="616628"/>
+          <a:ext cx="3398170" cy="3566160"/>
         </p:xfrm>
         <a:graphic>
           <a:graphicData uri="http://schemas.openxmlformats.org/drawingml/2006/table">
@@ -3358,7 +3358,7 @@
                 <a:tableStyleId>{5C22544A-7EE6-4342-B048-85BDC9FD1C3A}</a:tableStyleId>
               </a:tblPr>
               <a:tblGrid>
-                <a:gridCol w="2353569">
+                <a:gridCol w="3398170">
                   <a:extLst>
                     <a:ext uri="{9D8B030D-6E8A-4147-A177-3AD203B41FA5}">
                       <a16:colId xmlns:a16="http://schemas.microsoft.com/office/drawing/2014/main" val="1362394583"/>
@@ -3502,9 +3502,27 @@
                     <a:bodyPr/>
                     <a:lstStyle/>
                     <a:p>
-                      <a:r>
-                        <a:rPr lang="en-US" dirty="0"/>
-                        <a:t>-</a:t>
+                      <a:pPr marL="171450" indent="-171450">
+                        <a:buFontTx/>
+                        <a:buChar char="-"/>
+                      </a:pPr>
+                      <a:r>
+                        <a:rPr lang="en-US" sz="1100" dirty="0">
+                          <a:latin typeface="Consolas" panose="020B0609020204030204" pitchFamily="49" charset="0"/>
+                        </a:rPr>
+                        <a:t>office : String</a:t>
+                      </a:r>
+                    </a:p>
+                    <a:p>
+                      <a:pPr marL="171450" indent="-171450">
+                        <a:buFontTx/>
+                        <a:buChar char="-"/>
+                      </a:pPr>
+                      <a:r>
+                        <a:rPr lang="en-US" sz="1100" dirty="0">
+                          <a:latin typeface="Consolas" panose="020B0609020204030204" pitchFamily="49" charset="0"/>
+                        </a:rPr>
+                        <a:t>salary : double</a:t>
                       </a:r>
                     </a:p>
                   </a:txBody>
@@ -3522,7 +3540,409 @@
                     <a:bodyPr/>
                     <a:lstStyle/>
                     <a:p>
-                      <a:endParaRPr lang="en-US" dirty="0"/>
+                      <a:r>
+                        <a:rPr lang="en-US" sz="1100" dirty="0">
+                          <a:latin typeface="Consolas" panose="020B0609020204030204" pitchFamily="49" charset="0"/>
+                        </a:rPr>
+                        <a:t>+ Employee()</a:t>
+                      </a:r>
+                    </a:p>
+                    <a:p>
+                      <a:pPr marL="0" marR="0" lvl="0" indent="0" algn="l" defTabSz="914400" rtl="0" eaLnBrk="1" fontAlgn="auto" latinLnBrk="0" hangingPunct="1">
+                        <a:lnSpc>
+                          <a:spcPct val="100000"/>
+                        </a:lnSpc>
+                        <a:spcBef>
+                          <a:spcPts val="0"/>
+                        </a:spcBef>
+                        <a:spcAft>
+                          <a:spcPts val="0"/>
+                        </a:spcAft>
+                        <a:buClrTx/>
+                        <a:buSzTx/>
+                        <a:buFontTx/>
+                        <a:buNone/>
+                        <a:tabLst/>
+                        <a:defRPr/>
+                      </a:pPr>
+                      <a:r>
+                        <a:rPr lang="en-US" sz="1100" dirty="0">
+                          <a:latin typeface="Consolas" panose="020B0609020204030204" pitchFamily="49" charset="0"/>
+                        </a:rPr>
+                        <a:t>+ Employee(Person, String, double)</a:t>
+                      </a:r>
+                    </a:p>
+                    <a:p>
+                      <a:pPr marL="0" marR="0" lvl="0" indent="0" algn="l" defTabSz="914400" rtl="0" eaLnBrk="1" fontAlgn="auto" latinLnBrk="0" hangingPunct="1">
+                        <a:lnSpc>
+                          <a:spcPct val="100000"/>
+                        </a:lnSpc>
+                        <a:spcBef>
+                          <a:spcPts val="0"/>
+                        </a:spcBef>
+                        <a:spcAft>
+                          <a:spcPts val="0"/>
+                        </a:spcAft>
+                        <a:buClrTx/>
+                        <a:buSzTx/>
+                        <a:buFontTx/>
+                        <a:buNone/>
+                        <a:tabLst/>
+                        <a:defRPr/>
+                      </a:pPr>
+                      <a:r>
+                        <a:rPr lang="en-US" sz="1100" dirty="0">
+                          <a:latin typeface="Consolas" panose="020B0609020204030204" pitchFamily="49" charset="0"/>
+                        </a:rPr>
+                        <a:t>+ Employee(String, double)</a:t>
+                      </a:r>
+                    </a:p>
+                    <a:p>
+                      <a:pPr marL="0" marR="0" lvl="0" indent="0" algn="l" defTabSz="914400" rtl="0" eaLnBrk="1" fontAlgn="auto" latinLnBrk="0" hangingPunct="1">
+                        <a:lnSpc>
+                          <a:spcPct val="100000"/>
+                        </a:lnSpc>
+                        <a:spcBef>
+                          <a:spcPts val="0"/>
+                        </a:spcBef>
+                        <a:spcAft>
+                          <a:spcPts val="0"/>
+                        </a:spcAft>
+                        <a:buClrTx/>
+                        <a:buSzTx/>
+                        <a:buFontTx/>
+                        <a:buNone/>
+                        <a:tabLst/>
+                        <a:defRPr/>
+                      </a:pPr>
+                      <a:r>
+                        <a:rPr lang="en-US" sz="1100" dirty="0">
+                          <a:latin typeface="Consolas" panose="020B0609020204030204" pitchFamily="49" charset="0"/>
+                        </a:rPr>
+                        <a:t>+ Employee(String, int)</a:t>
+                      </a:r>
+                    </a:p>
+                    <a:p>
+                      <a:pPr marL="0" marR="0" lvl="0" indent="0" algn="l" defTabSz="914400" rtl="0" eaLnBrk="1" fontAlgn="auto" latinLnBrk="0" hangingPunct="1">
+                        <a:lnSpc>
+                          <a:spcPct val="100000"/>
+                        </a:lnSpc>
+                        <a:spcBef>
+                          <a:spcPts val="0"/>
+                        </a:spcBef>
+                        <a:spcAft>
+                          <a:spcPts val="0"/>
+                        </a:spcAft>
+                        <a:buClrTx/>
+                        <a:buSzTx/>
+                        <a:buFontTx/>
+                        <a:buNone/>
+                        <a:tabLst/>
+                        <a:defRPr/>
+                      </a:pPr>
+                      <a:r>
+                        <a:rPr lang="en-US" sz="1100" dirty="0">
+                          <a:latin typeface="Consolas" panose="020B0609020204030204" pitchFamily="49" charset="0"/>
+                        </a:rPr>
+                        <a:t>+ Employee(String, int, String, double)</a:t>
+                      </a:r>
+                    </a:p>
+                    <a:p>
+                      <a:pPr marL="0" marR="0" lvl="0" indent="0" algn="l" defTabSz="914400" rtl="0" eaLnBrk="1" fontAlgn="auto" latinLnBrk="0" hangingPunct="1">
+                        <a:lnSpc>
+                          <a:spcPct val="100000"/>
+                        </a:lnSpc>
+                        <a:spcBef>
+                          <a:spcPts val="0"/>
+                        </a:spcBef>
+                        <a:spcAft>
+                          <a:spcPts val="0"/>
+                        </a:spcAft>
+                        <a:buClrTx/>
+                        <a:buSzTx/>
+                        <a:buFontTx/>
+                        <a:buNone/>
+                        <a:tabLst/>
+                        <a:defRPr/>
+                      </a:pPr>
+                      <a:r>
+                        <a:rPr lang="en-US" sz="1100" dirty="0">
+                          <a:latin typeface="Consolas" panose="020B0609020204030204" pitchFamily="49" charset="0"/>
+                        </a:rPr>
+                        <a:t>+ </a:t>
+                      </a:r>
+                      <a:r>
+                        <a:rPr lang="en-US" sz="1100" dirty="0" err="1">
+                          <a:latin typeface="Consolas" panose="020B0609020204030204" pitchFamily="49" charset="0"/>
+                        </a:rPr>
+                        <a:t>getOffice</a:t>
+                      </a:r>
+                      <a:r>
+                        <a:rPr lang="en-US" sz="1100" dirty="0">
+                          <a:latin typeface="Consolas" panose="020B0609020204030204" pitchFamily="49" charset="0"/>
+                        </a:rPr>
+                        <a:t>() : String</a:t>
+                      </a:r>
+                    </a:p>
+                    <a:p>
+                      <a:pPr marL="0" marR="0" lvl="0" indent="0" algn="l" defTabSz="914400" rtl="0" eaLnBrk="1" fontAlgn="auto" latinLnBrk="0" hangingPunct="1">
+                        <a:lnSpc>
+                          <a:spcPct val="100000"/>
+                        </a:lnSpc>
+                        <a:spcBef>
+                          <a:spcPts val="0"/>
+                        </a:spcBef>
+                        <a:spcAft>
+                          <a:spcPts val="0"/>
+                        </a:spcAft>
+                        <a:buClrTx/>
+                        <a:buSzTx/>
+                        <a:buFontTx/>
+                        <a:buNone/>
+                        <a:tabLst/>
+                        <a:defRPr/>
+                      </a:pPr>
+                      <a:r>
+                        <a:rPr lang="en-US" sz="1100" dirty="0">
+                          <a:latin typeface="Consolas" panose="020B0609020204030204" pitchFamily="49" charset="0"/>
+                        </a:rPr>
+                        <a:t>+ </a:t>
+                      </a:r>
+                      <a:r>
+                        <a:rPr lang="en-US" sz="1100" dirty="0" err="1">
+                          <a:latin typeface="Consolas" panose="020B0609020204030204" pitchFamily="49" charset="0"/>
+                        </a:rPr>
+                        <a:t>getSalary</a:t>
+                      </a:r>
+                      <a:r>
+                        <a:rPr lang="en-US" sz="1100" dirty="0">
+                          <a:latin typeface="Consolas" panose="020B0609020204030204" pitchFamily="49" charset="0"/>
+                        </a:rPr>
+                        <a:t>() : double</a:t>
+                      </a:r>
+                    </a:p>
+                    <a:p>
+                      <a:r>
+                        <a:rPr lang="en-US" sz="1100" dirty="0">
+                          <a:latin typeface="Consolas" panose="020B0609020204030204" pitchFamily="49" charset="0"/>
+                        </a:rPr>
+                        <a:t>+ payments() : double</a:t>
+                      </a:r>
+                    </a:p>
+                    <a:p>
+                      <a:r>
+                        <a:rPr lang="en-US" sz="1100" dirty="0">
+                          <a:latin typeface="Consolas" panose="020B0609020204030204" pitchFamily="49" charset="0"/>
+                        </a:rPr>
+                        <a:t>+ payments(double) : double</a:t>
+                      </a:r>
+                    </a:p>
+                    <a:p>
+                      <a:r>
+                        <a:rPr lang="en-US" sz="1100" dirty="0">
+                          <a:latin typeface="Consolas" panose="020B0609020204030204" pitchFamily="49" charset="0"/>
+                        </a:rPr>
+                        <a:t>+ </a:t>
+                      </a:r>
+                      <a:r>
+                        <a:rPr lang="en-US" sz="1100" dirty="0" err="1">
+                          <a:latin typeface="Consolas" panose="020B0609020204030204" pitchFamily="49" charset="0"/>
+                        </a:rPr>
+                        <a:t>printStatus</a:t>
+                      </a:r>
+                      <a:r>
+                        <a:rPr lang="en-US" sz="1100" dirty="0">
+                          <a:latin typeface="Consolas" panose="020B0609020204030204" pitchFamily="49" charset="0"/>
+                        </a:rPr>
+                        <a:t>() : String  </a:t>
+                      </a:r>
+                      <a:r>
+                        <a:rPr kumimoji="0" lang="en-US" sz="1100" b="0" i="0" u="none" strike="noStrike" kern="1200" cap="none" spc="0" normalizeH="0" baseline="0" noProof="0" dirty="0">
+                          <a:ln>
+                            <a:noFill/>
+                          </a:ln>
+                          <a:solidFill>
+                            <a:srgbClr val="009900"/>
+                          </a:solidFill>
+                          <a:effectLst/>
+                          <a:uLnTx/>
+                          <a:uFillTx/>
+                          <a:latin typeface="Consolas" panose="020B0609020204030204" pitchFamily="49" charset="0"/>
+                          <a:ea typeface="+mn-ea"/>
+                          <a:cs typeface="+mn-cs"/>
+                        </a:rPr>
+                        <a:t>∆</a:t>
+                      </a:r>
+                      <a:endParaRPr lang="en-US" sz="1100" dirty="0">
+                        <a:latin typeface="Consolas" panose="020B0609020204030204" pitchFamily="49" charset="0"/>
+                      </a:endParaRPr>
+                    </a:p>
+                    <a:p>
+                      <a:r>
+                        <a:rPr lang="en-US" sz="1100" dirty="0">
+                          <a:latin typeface="Consolas" panose="020B0609020204030204" pitchFamily="49" charset="0"/>
+                        </a:rPr>
+                        <a:t>+ </a:t>
+                      </a:r>
+                      <a:r>
+                        <a:rPr lang="en-US" sz="1100" dirty="0" err="1">
+                          <a:latin typeface="Consolas" panose="020B0609020204030204" pitchFamily="49" charset="0"/>
+                        </a:rPr>
+                        <a:t>setOffice</a:t>
+                      </a:r>
+                      <a:r>
+                        <a:rPr lang="en-US" sz="1100" dirty="0">
+                          <a:latin typeface="Consolas" panose="020B0609020204030204" pitchFamily="49" charset="0"/>
+                        </a:rPr>
+                        <a:t>(String) : void</a:t>
+                      </a:r>
+                    </a:p>
+                    <a:p>
+                      <a:r>
+                        <a:rPr lang="en-US" sz="1100" dirty="0">
+                          <a:latin typeface="Consolas" panose="020B0609020204030204" pitchFamily="49" charset="0"/>
+                        </a:rPr>
+                        <a:t>+ </a:t>
+                      </a:r>
+                      <a:r>
+                        <a:rPr lang="en-US" sz="1100" dirty="0" err="1">
+                          <a:latin typeface="Consolas" panose="020B0609020204030204" pitchFamily="49" charset="0"/>
+                        </a:rPr>
+                        <a:t>setSalary</a:t>
+                      </a:r>
+                      <a:r>
+                        <a:rPr lang="en-US" sz="1100" dirty="0">
+                          <a:latin typeface="Consolas" panose="020B0609020204030204" pitchFamily="49" charset="0"/>
+                        </a:rPr>
+                        <a:t>(double) : void</a:t>
+                      </a:r>
+                    </a:p>
+                    <a:p>
+                      <a:r>
+                        <a:rPr lang="en-US" sz="1100" dirty="0">
+                          <a:latin typeface="Consolas" panose="020B0609020204030204" pitchFamily="49" charset="0"/>
+                        </a:rPr>
+                        <a:t>+ </a:t>
+                      </a:r>
+                      <a:r>
+                        <a:rPr lang="en-US" sz="1100" dirty="0" err="1">
+                          <a:latin typeface="Consolas" panose="020B0609020204030204" pitchFamily="49" charset="0"/>
+                        </a:rPr>
+                        <a:t>toFile</a:t>
+                      </a:r>
+                      <a:r>
+                        <a:rPr lang="en-US" sz="1100" dirty="0">
+                          <a:latin typeface="Consolas" panose="020B0609020204030204" pitchFamily="49" charset="0"/>
+                        </a:rPr>
+                        <a:t>() : String  </a:t>
+                      </a:r>
+                      <a:r>
+                        <a:rPr kumimoji="0" lang="en-US" sz="1100" b="0" i="0" u="none" strike="noStrike" kern="1200" cap="none" spc="0" normalizeH="0" baseline="0" noProof="0" dirty="0">
+                          <a:ln>
+                            <a:noFill/>
+                          </a:ln>
+                          <a:solidFill>
+                            <a:srgbClr val="009900"/>
+                          </a:solidFill>
+                          <a:effectLst/>
+                          <a:uLnTx/>
+                          <a:uFillTx/>
+                          <a:latin typeface="Consolas" panose="020B0609020204030204" pitchFamily="49" charset="0"/>
+                          <a:ea typeface="+mn-ea"/>
+                          <a:cs typeface="+mn-cs"/>
+                        </a:rPr>
+                        <a:t>∆</a:t>
+                      </a:r>
+                      <a:endParaRPr kumimoji="0" lang="en-US" sz="1100" b="0" i="0" u="none" strike="noStrike" kern="1200" cap="none" spc="0" normalizeH="0" baseline="0" noProof="0" dirty="0">
+                        <a:ln>
+                          <a:noFill/>
+                        </a:ln>
+                        <a:solidFill>
+                          <a:schemeClr val="tx1"/>
+                        </a:solidFill>
+                        <a:effectLst/>
+                        <a:uLnTx/>
+                        <a:uFillTx/>
+                        <a:latin typeface="Consolas" panose="020B0609020204030204" pitchFamily="49" charset="0"/>
+                        <a:ea typeface="+mn-ea"/>
+                        <a:cs typeface="+mn-cs"/>
+                      </a:endParaRPr>
+                    </a:p>
+                    <a:p>
+                      <a:r>
+                        <a:rPr kumimoji="0" lang="en-US" sz="1100" b="0" i="0" u="none" strike="noStrike" kern="1200" cap="none" spc="0" normalizeH="0" baseline="0" noProof="0" dirty="0">
+                          <a:ln>
+                            <a:noFill/>
+                          </a:ln>
+                          <a:solidFill>
+                            <a:schemeClr val="tx1"/>
+                          </a:solidFill>
+                          <a:effectLst/>
+                          <a:uLnTx/>
+                          <a:uFillTx/>
+                          <a:latin typeface="Consolas" panose="020B0609020204030204" pitchFamily="49" charset="0"/>
+                          <a:ea typeface="+mn-ea"/>
+                          <a:cs typeface="+mn-cs"/>
+                        </a:rPr>
+                        <a:t>+ </a:t>
+                      </a:r>
+                      <a:r>
+                        <a:rPr kumimoji="0" lang="en-US" sz="1100" b="0" i="0" u="none" strike="noStrike" kern="1200" cap="none" spc="0" normalizeH="0" baseline="0" noProof="0" dirty="0" err="1">
+                          <a:ln>
+                            <a:noFill/>
+                          </a:ln>
+                          <a:solidFill>
+                            <a:schemeClr val="tx1"/>
+                          </a:solidFill>
+                          <a:effectLst/>
+                          <a:uLnTx/>
+                          <a:uFillTx/>
+                          <a:latin typeface="Consolas" panose="020B0609020204030204" pitchFamily="49" charset="0"/>
+                          <a:ea typeface="+mn-ea"/>
+                          <a:cs typeface="+mn-cs"/>
+                        </a:rPr>
+                        <a:t>toString</a:t>
+                      </a:r>
+                      <a:r>
+                        <a:rPr kumimoji="0" lang="en-US" sz="1100" b="0" i="0" u="none" strike="noStrike" kern="1200" cap="none" spc="0" normalizeH="0" baseline="0" noProof="0" dirty="0">
+                          <a:ln>
+                            <a:noFill/>
+                          </a:ln>
+                          <a:solidFill>
+                            <a:schemeClr val="tx1"/>
+                          </a:solidFill>
+                          <a:effectLst/>
+                          <a:uLnTx/>
+                          <a:uFillTx/>
+                          <a:latin typeface="Consolas" panose="020B0609020204030204" pitchFamily="49" charset="0"/>
+                          <a:ea typeface="+mn-ea"/>
+                          <a:cs typeface="+mn-cs"/>
+                        </a:rPr>
+                        <a:t>() : String  </a:t>
+                      </a:r>
+                      <a:r>
+                        <a:rPr kumimoji="0" lang="en-US" sz="1100" b="0" i="0" u="none" strike="noStrike" kern="1200" cap="none" spc="0" normalizeH="0" baseline="0" noProof="0" dirty="0">
+                          <a:ln>
+                            <a:noFill/>
+                          </a:ln>
+                          <a:solidFill>
+                            <a:srgbClr val="009900"/>
+                          </a:solidFill>
+                          <a:effectLst/>
+                          <a:uLnTx/>
+                          <a:uFillTx/>
+                          <a:latin typeface="Consolas" panose="020B0609020204030204" pitchFamily="49" charset="0"/>
+                          <a:ea typeface="+mn-ea"/>
+                          <a:cs typeface="+mn-cs"/>
+                        </a:rPr>
+                        <a:t>∆</a:t>
+                      </a:r>
+                      <a:endParaRPr lang="en-US" sz="1100" b="0" dirty="0">
+                        <a:solidFill>
+                          <a:schemeClr val="tx1"/>
+                        </a:solidFill>
+                        <a:latin typeface="Consolas" panose="020B0609020204030204" pitchFamily="49" charset="0"/>
+                      </a:endParaRPr>
                     </a:p>
                   </a:txBody>
                   <a:tcPr/>
@@ -3552,14 +3972,14 @@
           <p:nvPr>
             <p:extLst>
               <p:ext uri="{D42A27DB-BD31-4B8C-83A1-F6EECF244321}">
-                <p14:modId xmlns:p14="http://schemas.microsoft.com/office/powerpoint/2010/main" val="3156320283"/>
+                <p14:modId xmlns:p14="http://schemas.microsoft.com/office/powerpoint/2010/main" val="2799143581"/>
               </p:ext>
             </p:extLst>
           </p:nvPr>
         </p:nvGraphicFramePr>
         <p:xfrm>
-          <a:off x="7167732" y="2472653"/>
-          <a:ext cx="2353569" cy="1442720"/>
+          <a:off x="6592824" y="616628"/>
+          <a:ext cx="3115815" cy="3398520"/>
         </p:xfrm>
         <a:graphic>
           <a:graphicData uri="http://schemas.openxmlformats.org/drawingml/2006/table">
@@ -3568,7 +3988,7 @@
                 <a:tableStyleId>{5C22544A-7EE6-4342-B048-85BDC9FD1C3A}</a:tableStyleId>
               </a:tblPr>
               <a:tblGrid>
-                <a:gridCol w="2353569">
+                <a:gridCol w="3115815">
                   <a:extLst>
                     <a:ext uri="{9D8B030D-6E8A-4147-A177-3AD203B41FA5}">
                       <a16:colId xmlns:a16="http://schemas.microsoft.com/office/drawing/2014/main" val="1362394583"/>
@@ -3712,7 +4132,34 @@
                     <a:bodyPr/>
                     <a:lstStyle/>
                     <a:p>
-                      <a:endParaRPr lang="en-US"/>
+                      <a:pPr marL="171450" indent="-171450">
+                        <a:buFontTx/>
+                        <a:buChar char="-"/>
+                      </a:pPr>
+                      <a:r>
+                        <a:rPr lang="en-US" sz="1100" dirty="0">
+                          <a:latin typeface="Consolas" panose="020B0609020204030204" pitchFamily="49" charset="0"/>
+                        </a:rPr>
+                        <a:t>GPA    : double</a:t>
+                      </a:r>
+                    </a:p>
+                    <a:p>
+                      <a:pPr marL="171450" indent="-171450">
+                        <a:buFontTx/>
+                        <a:buChar char="-"/>
+                      </a:pPr>
+                      <a:r>
+                        <a:rPr lang="en-US" sz="1100" dirty="0">
+                          <a:latin typeface="Consolas" panose="020B0609020204030204" pitchFamily="49" charset="0"/>
+                        </a:rPr>
+                        <a:t>status : </a:t>
+                      </a:r>
+                      <a:r>
+                        <a:rPr lang="en-US" sz="1100" i="1" dirty="0">
+                          <a:latin typeface="Consolas" panose="020B0609020204030204" pitchFamily="49" charset="0"/>
+                        </a:rPr>
+                        <a:t>Status</a:t>
+                      </a:r>
                     </a:p>
                   </a:txBody>
                   <a:tcPr/>
@@ -3729,7 +4176,410 @@
                     <a:bodyPr/>
                     <a:lstStyle/>
                     <a:p>
-                      <a:endParaRPr lang="en-US" dirty="0"/>
+                      <a:r>
+                        <a:rPr lang="en-US" sz="1100" dirty="0">
+                          <a:latin typeface="Consolas" panose="020B0609020204030204" pitchFamily="49" charset="0"/>
+                        </a:rPr>
+                        <a:t>+ Student()</a:t>
+                      </a:r>
+                    </a:p>
+                    <a:p>
+                      <a:pPr marL="0" marR="0" lvl="0" indent="0" algn="l" defTabSz="914400" rtl="0" eaLnBrk="1" fontAlgn="auto" latinLnBrk="0" hangingPunct="1">
+                        <a:lnSpc>
+                          <a:spcPct val="100000"/>
+                        </a:lnSpc>
+                        <a:spcBef>
+                          <a:spcPts val="0"/>
+                        </a:spcBef>
+                        <a:spcAft>
+                          <a:spcPts val="0"/>
+                        </a:spcAft>
+                        <a:buClrTx/>
+                        <a:buSzTx/>
+                        <a:buFontTx/>
+                        <a:buNone/>
+                        <a:tabLst/>
+                        <a:defRPr/>
+                      </a:pPr>
+                      <a:r>
+                        <a:rPr lang="en-US" sz="1100" dirty="0">
+                          <a:latin typeface="Consolas" panose="020B0609020204030204" pitchFamily="49" charset="0"/>
+                        </a:rPr>
+                        <a:t>+ Student(Person, </a:t>
+                      </a:r>
+                      <a:r>
+                        <a:rPr lang="en-US" sz="1100" i="1" dirty="0">
+                          <a:latin typeface="Consolas" panose="020B0609020204030204" pitchFamily="49" charset="0"/>
+                        </a:rPr>
+                        <a:t>Status</a:t>
+                      </a:r>
+                      <a:r>
+                        <a:rPr lang="en-US" sz="1100" dirty="0">
+                          <a:latin typeface="Consolas" panose="020B0609020204030204" pitchFamily="49" charset="0"/>
+                        </a:rPr>
+                        <a:t>, double)</a:t>
+                      </a:r>
+                    </a:p>
+                    <a:p>
+                      <a:pPr marL="0" marR="0" lvl="0" indent="0" algn="l" defTabSz="914400" rtl="0" eaLnBrk="1" fontAlgn="auto" latinLnBrk="0" hangingPunct="1">
+                        <a:lnSpc>
+                          <a:spcPct val="100000"/>
+                        </a:lnSpc>
+                        <a:spcBef>
+                          <a:spcPts val="0"/>
+                        </a:spcBef>
+                        <a:spcAft>
+                          <a:spcPts val="0"/>
+                        </a:spcAft>
+                        <a:buClrTx/>
+                        <a:buSzTx/>
+                        <a:buFontTx/>
+                        <a:buNone/>
+                        <a:tabLst/>
+                        <a:defRPr/>
+                      </a:pPr>
+                      <a:r>
+                        <a:rPr lang="en-US" sz="1100" dirty="0">
+                          <a:latin typeface="Consolas" panose="020B0609020204030204" pitchFamily="49" charset="0"/>
+                        </a:rPr>
+                        <a:t>+ Student</a:t>
+                      </a:r>
+                      <a:r>
+                        <a:rPr lang="en-US" sz="1100" i="1" dirty="0">
+                          <a:latin typeface="Consolas" panose="020B0609020204030204" pitchFamily="49" charset="0"/>
+                        </a:rPr>
+                        <a:t>(Status</a:t>
+                      </a:r>
+                      <a:r>
+                        <a:rPr lang="en-US" sz="1100" i="0" dirty="0">
+                          <a:latin typeface="Consolas" panose="020B0609020204030204" pitchFamily="49" charset="0"/>
+                        </a:rPr>
+                        <a:t>, double</a:t>
+                      </a:r>
+                      <a:r>
+                        <a:rPr lang="en-US" sz="1100" i="1" dirty="0">
+                          <a:latin typeface="Consolas" panose="020B0609020204030204" pitchFamily="49" charset="0"/>
+                        </a:rPr>
+                        <a:t>)</a:t>
+                      </a:r>
+                    </a:p>
+                    <a:p>
+                      <a:pPr marL="0" marR="0" lvl="0" indent="0" algn="l" defTabSz="914400" rtl="0" eaLnBrk="1" fontAlgn="auto" latinLnBrk="0" hangingPunct="1">
+                        <a:lnSpc>
+                          <a:spcPct val="100000"/>
+                        </a:lnSpc>
+                        <a:spcBef>
+                          <a:spcPts val="0"/>
+                        </a:spcBef>
+                        <a:spcAft>
+                          <a:spcPts val="0"/>
+                        </a:spcAft>
+                        <a:buClrTx/>
+                        <a:buSzTx/>
+                        <a:buFontTx/>
+                        <a:buNone/>
+                        <a:tabLst/>
+                        <a:defRPr/>
+                      </a:pPr>
+                      <a:r>
+                        <a:rPr lang="en-US" sz="1100" dirty="0">
+                          <a:latin typeface="Consolas" panose="020B0609020204030204" pitchFamily="49" charset="0"/>
+                        </a:rPr>
+                        <a:t>+ Student(String, int)</a:t>
+                      </a:r>
+                    </a:p>
+                    <a:p>
+                      <a:pPr marL="0" marR="0" lvl="0" indent="0" algn="l" defTabSz="914400" rtl="0" eaLnBrk="1" fontAlgn="auto" latinLnBrk="0" hangingPunct="1">
+                        <a:lnSpc>
+                          <a:spcPct val="100000"/>
+                        </a:lnSpc>
+                        <a:spcBef>
+                          <a:spcPts val="0"/>
+                        </a:spcBef>
+                        <a:spcAft>
+                          <a:spcPts val="0"/>
+                        </a:spcAft>
+                        <a:buClrTx/>
+                        <a:buSzTx/>
+                        <a:buFontTx/>
+                        <a:buNone/>
+                        <a:tabLst/>
+                        <a:defRPr/>
+                      </a:pPr>
+                      <a:r>
+                        <a:rPr lang="en-US" sz="1100" dirty="0">
+                          <a:latin typeface="Consolas" panose="020B0609020204030204" pitchFamily="49" charset="0"/>
+                        </a:rPr>
+                        <a:t>+ Student(String, int, </a:t>
+                      </a:r>
+                      <a:r>
+                        <a:rPr lang="en-US" sz="1100" i="1" dirty="0">
+                          <a:latin typeface="Consolas" panose="020B0609020204030204" pitchFamily="49" charset="0"/>
+                        </a:rPr>
+                        <a:t>Status</a:t>
+                      </a:r>
+                      <a:r>
+                        <a:rPr lang="en-US" sz="1100" i="0" dirty="0">
+                          <a:latin typeface="Consolas" panose="020B0609020204030204" pitchFamily="49" charset="0"/>
+                        </a:rPr>
+                        <a:t>, double</a:t>
+                      </a:r>
+                      <a:r>
+                        <a:rPr lang="en-US" sz="1100" dirty="0">
+                          <a:latin typeface="Consolas" panose="020B0609020204030204" pitchFamily="49" charset="0"/>
+                        </a:rPr>
+                        <a:t>)</a:t>
+                      </a:r>
+                    </a:p>
+                    <a:p>
+                      <a:r>
+                        <a:rPr lang="en-US" sz="1100" dirty="0">
+                          <a:latin typeface="Consolas" panose="020B0609020204030204" pitchFamily="49" charset="0"/>
+                        </a:rPr>
+                        <a:t>+ </a:t>
+                      </a:r>
+                      <a:r>
+                        <a:rPr lang="en-US" sz="1100" dirty="0" err="1">
+                          <a:latin typeface="Consolas" panose="020B0609020204030204" pitchFamily="49" charset="0"/>
+                        </a:rPr>
+                        <a:t>getGPA</a:t>
+                      </a:r>
+                      <a:r>
+                        <a:rPr lang="en-US" sz="1100" dirty="0">
+                          <a:latin typeface="Consolas" panose="020B0609020204030204" pitchFamily="49" charset="0"/>
+                        </a:rPr>
+                        <a:t>() : double</a:t>
+                      </a:r>
+                    </a:p>
+                    <a:p>
+                      <a:r>
+                        <a:rPr lang="en-US" sz="1100" dirty="0">
+                          <a:latin typeface="Consolas" panose="020B0609020204030204" pitchFamily="49" charset="0"/>
+                        </a:rPr>
+                        <a:t>+ </a:t>
+                      </a:r>
+                      <a:r>
+                        <a:rPr lang="en-US" sz="1100" dirty="0" err="1">
+                          <a:latin typeface="Consolas" panose="020B0609020204030204" pitchFamily="49" charset="0"/>
+                        </a:rPr>
+                        <a:t>getStatus</a:t>
+                      </a:r>
+                      <a:r>
+                        <a:rPr lang="en-US" sz="1100" dirty="0">
+                          <a:latin typeface="Consolas" panose="020B0609020204030204" pitchFamily="49" charset="0"/>
+                        </a:rPr>
+                        <a:t> : </a:t>
+                      </a:r>
+                      <a:r>
+                        <a:rPr lang="en-US" sz="1100" i="1" dirty="0">
+                          <a:latin typeface="Consolas" panose="020B0609020204030204" pitchFamily="49" charset="0"/>
+                        </a:rPr>
+                        <a:t>Status</a:t>
+                      </a:r>
+                      <a:endParaRPr lang="en-US" sz="1100" i="0" dirty="0">
+                        <a:latin typeface="Consolas" panose="020B0609020204030204" pitchFamily="49" charset="0"/>
+                      </a:endParaRPr>
+                    </a:p>
+                    <a:p>
+                      <a:r>
+                        <a:rPr lang="en-US" sz="1100" i="0" dirty="0">
+                          <a:latin typeface="Consolas" panose="020B0609020204030204" pitchFamily="49" charset="0"/>
+                        </a:rPr>
+                        <a:t>+ </a:t>
+                      </a:r>
+                      <a:r>
+                        <a:rPr lang="en-US" sz="1100" i="0" dirty="0" err="1">
+                          <a:latin typeface="Consolas" panose="020B0609020204030204" pitchFamily="49" charset="0"/>
+                        </a:rPr>
+                        <a:t>isOnProbation</a:t>
+                      </a:r>
+                      <a:r>
+                        <a:rPr lang="en-US" sz="1100" i="0" dirty="0">
+                          <a:latin typeface="Consolas" panose="020B0609020204030204" pitchFamily="49" charset="0"/>
+                        </a:rPr>
+                        <a:t>() : </a:t>
+                      </a:r>
+                      <a:r>
+                        <a:rPr lang="en-US" sz="1100" i="0" dirty="0" err="1">
+                          <a:latin typeface="Consolas" panose="020B0609020204030204" pitchFamily="49" charset="0"/>
+                        </a:rPr>
+                        <a:t>boolean</a:t>
+                      </a:r>
+                      <a:endParaRPr lang="en-US" sz="1100" i="0" dirty="0">
+                        <a:latin typeface="Consolas" panose="020B0609020204030204" pitchFamily="49" charset="0"/>
+                      </a:endParaRPr>
+                    </a:p>
+                    <a:p>
+                      <a:r>
+                        <a:rPr lang="en-US" sz="1100" dirty="0">
+                          <a:latin typeface="Consolas" panose="020B0609020204030204" pitchFamily="49" charset="0"/>
+                        </a:rPr>
+                        <a:t>+ </a:t>
+                      </a:r>
+                      <a:r>
+                        <a:rPr lang="en-US" sz="1100" dirty="0" err="1">
+                          <a:latin typeface="Consolas" panose="020B0609020204030204" pitchFamily="49" charset="0"/>
+                        </a:rPr>
+                        <a:t>printStatus</a:t>
+                      </a:r>
+                      <a:r>
+                        <a:rPr lang="en-US" sz="1100" dirty="0">
+                          <a:latin typeface="Consolas" panose="020B0609020204030204" pitchFamily="49" charset="0"/>
+                        </a:rPr>
+                        <a:t>() : String  </a:t>
+                      </a:r>
+                      <a:r>
+                        <a:rPr kumimoji="0" lang="en-US" sz="1100" b="0" i="0" u="none" strike="noStrike" kern="1200" cap="none" spc="0" normalizeH="0" baseline="0" noProof="0" dirty="0">
+                          <a:ln>
+                            <a:noFill/>
+                          </a:ln>
+                          <a:solidFill>
+                            <a:srgbClr val="009900"/>
+                          </a:solidFill>
+                          <a:effectLst/>
+                          <a:uLnTx/>
+                          <a:uFillTx/>
+                          <a:latin typeface="Consolas" panose="020B0609020204030204" pitchFamily="49" charset="0"/>
+                          <a:ea typeface="+mn-ea"/>
+                          <a:cs typeface="+mn-cs"/>
+                        </a:rPr>
+                        <a:t>∆</a:t>
+                      </a:r>
+                      <a:endParaRPr lang="en-US" sz="1100" dirty="0">
+                        <a:latin typeface="Consolas" panose="020B0609020204030204" pitchFamily="49" charset="0"/>
+                      </a:endParaRPr>
+                    </a:p>
+                    <a:p>
+                      <a:r>
+                        <a:rPr lang="en-US" sz="1100" dirty="0">
+                          <a:latin typeface="Consolas" panose="020B0609020204030204" pitchFamily="49" charset="0"/>
+                        </a:rPr>
+                        <a:t>+ </a:t>
+                      </a:r>
+                      <a:r>
+                        <a:rPr lang="en-US" sz="1100" dirty="0" err="1">
+                          <a:latin typeface="Consolas" panose="020B0609020204030204" pitchFamily="49" charset="0"/>
+                        </a:rPr>
+                        <a:t>setGPA</a:t>
+                      </a:r>
+                      <a:r>
+                        <a:rPr lang="en-US" sz="1100" dirty="0">
+                          <a:latin typeface="Consolas" panose="020B0609020204030204" pitchFamily="49" charset="0"/>
+                        </a:rPr>
+                        <a:t>(double) : void</a:t>
+                      </a:r>
+                    </a:p>
+                    <a:p>
+                      <a:r>
+                        <a:rPr lang="en-US" sz="1100" dirty="0">
+                          <a:latin typeface="Consolas" panose="020B0609020204030204" pitchFamily="49" charset="0"/>
+                        </a:rPr>
+                        <a:t>+ </a:t>
+                      </a:r>
+                      <a:r>
+                        <a:rPr lang="en-US" sz="1100" dirty="0" err="1">
+                          <a:latin typeface="Consolas" panose="020B0609020204030204" pitchFamily="49" charset="0"/>
+                        </a:rPr>
+                        <a:t>setStatus</a:t>
+                      </a:r>
+                      <a:r>
+                        <a:rPr lang="en-US" sz="1100" dirty="0">
+                          <a:latin typeface="Consolas" panose="020B0609020204030204" pitchFamily="49" charset="0"/>
+                        </a:rPr>
+                        <a:t>(</a:t>
+                      </a:r>
+                      <a:r>
+                        <a:rPr lang="en-US" sz="1100" i="1" dirty="0">
+                          <a:latin typeface="Consolas" panose="020B0609020204030204" pitchFamily="49" charset="0"/>
+                        </a:rPr>
+                        <a:t>Status</a:t>
+                      </a:r>
+                      <a:r>
+                        <a:rPr lang="en-US" sz="1100" i="0" dirty="0">
+                          <a:latin typeface="Consolas" panose="020B0609020204030204" pitchFamily="49" charset="0"/>
+                        </a:rPr>
+                        <a:t>) : void</a:t>
+                      </a:r>
+                    </a:p>
+                    <a:p>
+                      <a:r>
+                        <a:rPr lang="en-US" sz="1100" i="0" dirty="0">
+                          <a:latin typeface="Consolas" panose="020B0609020204030204" pitchFamily="49" charset="0"/>
+                        </a:rPr>
+                        <a:t>+ </a:t>
+                      </a:r>
+                      <a:r>
+                        <a:rPr lang="en-US" sz="1100" i="0" dirty="0" err="1">
+                          <a:latin typeface="Consolas" panose="020B0609020204030204" pitchFamily="49" charset="0"/>
+                        </a:rPr>
+                        <a:t>toFile</a:t>
+                      </a:r>
+                      <a:r>
+                        <a:rPr lang="en-US" sz="1100" i="0" dirty="0">
+                          <a:latin typeface="Consolas" panose="020B0609020204030204" pitchFamily="49" charset="0"/>
+                        </a:rPr>
+                        <a:t>() : String  </a:t>
+                      </a:r>
+                      <a:r>
+                        <a:rPr kumimoji="0" lang="en-US" sz="1100" b="0" i="0" u="none" strike="noStrike" kern="1200" cap="none" spc="0" normalizeH="0" baseline="0" noProof="0" dirty="0">
+                          <a:ln>
+                            <a:noFill/>
+                          </a:ln>
+                          <a:solidFill>
+                            <a:srgbClr val="009900"/>
+                          </a:solidFill>
+                          <a:effectLst/>
+                          <a:uLnTx/>
+                          <a:uFillTx/>
+                          <a:latin typeface="Consolas" panose="020B0609020204030204" pitchFamily="49" charset="0"/>
+                          <a:ea typeface="+mn-ea"/>
+                          <a:cs typeface="+mn-cs"/>
+                        </a:rPr>
+                        <a:t>∆</a:t>
+                      </a:r>
+                      <a:endParaRPr lang="en-US" sz="1100" i="0" dirty="0">
+                        <a:latin typeface="Consolas" panose="020B0609020204030204" pitchFamily="49" charset="0"/>
+                      </a:endParaRPr>
+                    </a:p>
+                    <a:p>
+                      <a:r>
+                        <a:rPr lang="en-US" sz="1100" i="0" dirty="0">
+                          <a:latin typeface="Consolas" panose="020B0609020204030204" pitchFamily="49" charset="0"/>
+                        </a:rPr>
+                        <a:t>+ </a:t>
+                      </a:r>
+                      <a:r>
+                        <a:rPr lang="en-US" sz="1100" i="0" dirty="0" err="1">
+                          <a:latin typeface="Consolas" panose="020B0609020204030204" pitchFamily="49" charset="0"/>
+                        </a:rPr>
+                        <a:t>toString</a:t>
+                      </a:r>
+                      <a:r>
+                        <a:rPr lang="en-US" sz="1100" i="0" dirty="0">
+                          <a:latin typeface="Consolas" panose="020B0609020204030204" pitchFamily="49" charset="0"/>
+                        </a:rPr>
+                        <a:t>() : String  </a:t>
+                      </a:r>
+                      <a:r>
+                        <a:rPr kumimoji="0" lang="en-US" sz="1100" b="0" i="0" u="none" strike="noStrike" kern="1200" cap="none" spc="0" normalizeH="0" baseline="0" noProof="0" dirty="0">
+                          <a:ln>
+                            <a:noFill/>
+                          </a:ln>
+                          <a:solidFill>
+                            <a:srgbClr val="009900"/>
+                          </a:solidFill>
+                          <a:effectLst/>
+                          <a:uLnTx/>
+                          <a:uFillTx/>
+                          <a:latin typeface="Consolas" panose="020B0609020204030204" pitchFamily="49" charset="0"/>
+                          <a:ea typeface="+mn-ea"/>
+                          <a:cs typeface="+mn-cs"/>
+                        </a:rPr>
+                        <a:t>∆</a:t>
+                      </a:r>
+                      <a:endParaRPr lang="en-US" sz="1100" dirty="0">
+                        <a:latin typeface="Consolas" panose="020B0609020204030204" pitchFamily="49" charset="0"/>
+                      </a:endParaRPr>
                     </a:p>
                   </a:txBody>
                   <a:tcPr/>
@@ -3759,14 +4609,14 @@
           <p:nvPr>
             <p:extLst>
               <p:ext uri="{D42A27DB-BD31-4B8C-83A1-F6EECF244321}">
-                <p14:modId xmlns:p14="http://schemas.microsoft.com/office/powerpoint/2010/main" val="390888733"/>
+                <p14:modId xmlns:p14="http://schemas.microsoft.com/office/powerpoint/2010/main" val="3097188269"/>
               </p:ext>
             </p:extLst>
           </p:nvPr>
         </p:nvGraphicFramePr>
         <p:xfrm>
-          <a:off x="4814163" y="616628"/>
-          <a:ext cx="2353569" cy="1498600"/>
+          <a:off x="3956900" y="616628"/>
+          <a:ext cx="2353569" cy="3063240"/>
         </p:xfrm>
         <a:graphic>
           <a:graphicData uri="http://schemas.openxmlformats.org/drawingml/2006/table">
@@ -3939,7 +4789,7 @@
                         <a:rPr lang="en-US" sz="1100" dirty="0">
                           <a:latin typeface="Consolas" panose="020B0609020204030204" pitchFamily="49" charset="0"/>
                         </a:rPr>
-                        <a:t>age : int</a:t>
+                        <a:t>age  : int</a:t>
                       </a:r>
                     </a:p>
                     <a:p>
@@ -3969,7 +4819,564 @@
                     <a:bodyPr/>
                     <a:lstStyle/>
                     <a:p>
-                      <a:endParaRPr lang="en-US" dirty="0"/>
+                      <a:r>
+                        <a:rPr lang="en-US" sz="1100" dirty="0">
+                          <a:latin typeface="Consolas" panose="020B0609020204030204" pitchFamily="49" charset="0"/>
+                        </a:rPr>
+                        <a:t>+ Person()</a:t>
+                      </a:r>
+                    </a:p>
+                    <a:p>
+                      <a:r>
+                        <a:rPr lang="en-US" sz="1100" dirty="0">
+                          <a:latin typeface="Consolas" panose="020B0609020204030204" pitchFamily="49" charset="0"/>
+                        </a:rPr>
+                        <a:t>+ Person(Person)</a:t>
+                      </a:r>
+                    </a:p>
+                    <a:p>
+                      <a:pPr marL="0" marR="0" lvl="0" indent="0" algn="l" defTabSz="914400" rtl="0" eaLnBrk="1" fontAlgn="auto" latinLnBrk="0" hangingPunct="1">
+                        <a:lnSpc>
+                          <a:spcPct val="100000"/>
+                        </a:lnSpc>
+                        <a:spcBef>
+                          <a:spcPts val="0"/>
+                        </a:spcBef>
+                        <a:spcAft>
+                          <a:spcPts val="0"/>
+                        </a:spcAft>
+                        <a:buClrTx/>
+                        <a:buSzTx/>
+                        <a:buFontTx/>
+                        <a:buNone/>
+                        <a:tabLst/>
+                        <a:defRPr/>
+                      </a:pPr>
+                      <a:r>
+                        <a:rPr lang="en-US" sz="1100" dirty="0">
+                          <a:latin typeface="Consolas" panose="020B0609020204030204" pitchFamily="49" charset="0"/>
+                        </a:rPr>
+                        <a:t>+ Person(String, int)</a:t>
+                      </a:r>
+                    </a:p>
+                    <a:p>
+                      <a:pPr marL="0" marR="0" lvl="0" indent="0" algn="l" defTabSz="914400" rtl="0" eaLnBrk="1" fontAlgn="auto" latinLnBrk="0" hangingPunct="1">
+                        <a:lnSpc>
+                          <a:spcPct val="100000"/>
+                        </a:lnSpc>
+                        <a:spcBef>
+                          <a:spcPts val="0"/>
+                        </a:spcBef>
+                        <a:spcAft>
+                          <a:spcPts val="0"/>
+                        </a:spcAft>
+                        <a:buClrTx/>
+                        <a:buSzTx/>
+                        <a:buFontTx/>
+                        <a:buNone/>
+                        <a:tabLst/>
+                        <a:defRPr/>
+                      </a:pPr>
+                      <a:r>
+                        <a:rPr lang="en-US" sz="1100" dirty="0">
+                          <a:latin typeface="Consolas" panose="020B0609020204030204" pitchFamily="49" charset="0"/>
+                        </a:rPr>
+                        <a:t>+ </a:t>
+                      </a:r>
+                      <a:r>
+                        <a:rPr lang="en-US" sz="1100" dirty="0" err="1">
+                          <a:latin typeface="Consolas" panose="020B0609020204030204" pitchFamily="49" charset="0"/>
+                        </a:rPr>
+                        <a:t>getAge</a:t>
+                      </a:r>
+                      <a:r>
+                        <a:rPr lang="en-US" sz="1100" dirty="0">
+                          <a:latin typeface="Consolas" panose="020B0609020204030204" pitchFamily="49" charset="0"/>
+                        </a:rPr>
+                        <a:t>() : int</a:t>
+                      </a:r>
+                    </a:p>
+                    <a:p>
+                      <a:pPr marL="0" marR="0" lvl="0" indent="0" algn="l" defTabSz="914400" rtl="0" eaLnBrk="1" fontAlgn="auto" latinLnBrk="0" hangingPunct="1">
+                        <a:lnSpc>
+                          <a:spcPct val="100000"/>
+                        </a:lnSpc>
+                        <a:spcBef>
+                          <a:spcPts val="0"/>
+                        </a:spcBef>
+                        <a:spcAft>
+                          <a:spcPts val="0"/>
+                        </a:spcAft>
+                        <a:buClrTx/>
+                        <a:buSzTx/>
+                        <a:buFontTx/>
+                        <a:buNone/>
+                        <a:tabLst/>
+                        <a:defRPr/>
+                      </a:pPr>
+                      <a:r>
+                        <a:rPr lang="en-US" sz="1100" dirty="0">
+                          <a:latin typeface="Consolas" panose="020B0609020204030204" pitchFamily="49" charset="0"/>
+                        </a:rPr>
+                        <a:t>+ </a:t>
+                      </a:r>
+                      <a:r>
+                        <a:rPr lang="en-US" sz="1100" dirty="0" err="1">
+                          <a:latin typeface="Consolas" panose="020B0609020204030204" pitchFamily="49" charset="0"/>
+                        </a:rPr>
+                        <a:t>getName</a:t>
+                      </a:r>
+                      <a:r>
+                        <a:rPr lang="en-US" sz="1100" dirty="0">
+                          <a:latin typeface="Consolas" panose="020B0609020204030204" pitchFamily="49" charset="0"/>
+                        </a:rPr>
+                        <a:t>() : String</a:t>
+                      </a:r>
+                    </a:p>
+                    <a:p>
+                      <a:pPr marL="0" marR="0" lvl="0" indent="0" algn="l" defTabSz="914400" rtl="0" eaLnBrk="1" fontAlgn="auto" latinLnBrk="0" hangingPunct="1">
+                        <a:lnSpc>
+                          <a:spcPct val="100000"/>
+                        </a:lnSpc>
+                        <a:spcBef>
+                          <a:spcPts val="0"/>
+                        </a:spcBef>
+                        <a:spcAft>
+                          <a:spcPts val="0"/>
+                        </a:spcAft>
+                        <a:buClrTx/>
+                        <a:buSzTx/>
+                        <a:buFontTx/>
+                        <a:buNone/>
+                        <a:tabLst/>
+                        <a:defRPr/>
+                      </a:pPr>
+                      <a:r>
+                        <a:rPr lang="en-US" sz="1100" dirty="0">
+                          <a:latin typeface="Consolas" panose="020B0609020204030204" pitchFamily="49" charset="0"/>
+                        </a:rPr>
+                        <a:t>+ hundredth(double) : double</a:t>
+                      </a:r>
+                    </a:p>
+                    <a:p>
+                      <a:pPr marL="0" marR="0" lvl="0" indent="0" algn="l" defTabSz="914400" rtl="0" eaLnBrk="1" fontAlgn="auto" latinLnBrk="0" hangingPunct="1">
+                        <a:lnSpc>
+                          <a:spcPct val="100000"/>
+                        </a:lnSpc>
+                        <a:spcBef>
+                          <a:spcPts val="0"/>
+                        </a:spcBef>
+                        <a:spcAft>
+                          <a:spcPts val="0"/>
+                        </a:spcAft>
+                        <a:buClrTx/>
+                        <a:buSzTx/>
+                        <a:buFontTx/>
+                        <a:buNone/>
+                        <a:tabLst/>
+                        <a:defRPr/>
+                      </a:pPr>
+                      <a:r>
+                        <a:rPr lang="en-US" sz="1100" dirty="0">
+                          <a:latin typeface="Consolas" panose="020B0609020204030204" pitchFamily="49" charset="0"/>
+                        </a:rPr>
+                        <a:t>+ </a:t>
+                      </a:r>
+                      <a:r>
+                        <a:rPr lang="en-US" sz="1100" dirty="0" err="1">
+                          <a:latin typeface="Consolas" panose="020B0609020204030204" pitchFamily="49" charset="0"/>
+                        </a:rPr>
+                        <a:t>printStatus</a:t>
+                      </a:r>
+                      <a:r>
+                        <a:rPr lang="en-US" sz="1100" dirty="0">
+                          <a:latin typeface="Consolas" panose="020B0609020204030204" pitchFamily="49" charset="0"/>
+                        </a:rPr>
+                        <a:t>() : String</a:t>
+                      </a:r>
+                    </a:p>
+                    <a:p>
+                      <a:pPr marL="0" marR="0" lvl="0" indent="0" algn="l" defTabSz="914400" rtl="0" eaLnBrk="1" fontAlgn="auto" latinLnBrk="0" hangingPunct="1">
+                        <a:lnSpc>
+                          <a:spcPct val="100000"/>
+                        </a:lnSpc>
+                        <a:spcBef>
+                          <a:spcPts val="0"/>
+                        </a:spcBef>
+                        <a:spcAft>
+                          <a:spcPts val="0"/>
+                        </a:spcAft>
+                        <a:buClrTx/>
+                        <a:buSzTx/>
+                        <a:buFontTx/>
+                        <a:buNone/>
+                        <a:tabLst/>
+                        <a:defRPr/>
+                      </a:pPr>
+                      <a:r>
+                        <a:rPr lang="en-US" sz="1100" dirty="0">
+                          <a:latin typeface="Consolas" panose="020B0609020204030204" pitchFamily="49" charset="0"/>
+                        </a:rPr>
+                        <a:t>+ </a:t>
+                      </a:r>
+                      <a:r>
+                        <a:rPr lang="en-US" sz="1100" dirty="0" err="1">
+                          <a:latin typeface="Consolas" panose="020B0609020204030204" pitchFamily="49" charset="0"/>
+                        </a:rPr>
+                        <a:t>setAge</a:t>
+                      </a:r>
+                      <a:r>
+                        <a:rPr lang="en-US" sz="1100" dirty="0">
+                          <a:latin typeface="Consolas" panose="020B0609020204030204" pitchFamily="49" charset="0"/>
+                        </a:rPr>
+                        <a:t>(int) : void</a:t>
+                      </a:r>
+                    </a:p>
+                    <a:p>
+                      <a:pPr marL="0" marR="0" lvl="0" indent="0" algn="l" defTabSz="914400" rtl="0" eaLnBrk="1" fontAlgn="auto" latinLnBrk="0" hangingPunct="1">
+                        <a:lnSpc>
+                          <a:spcPct val="100000"/>
+                        </a:lnSpc>
+                        <a:spcBef>
+                          <a:spcPts val="0"/>
+                        </a:spcBef>
+                        <a:spcAft>
+                          <a:spcPts val="0"/>
+                        </a:spcAft>
+                        <a:buClrTx/>
+                        <a:buSzTx/>
+                        <a:buFontTx/>
+                        <a:buNone/>
+                        <a:tabLst/>
+                        <a:defRPr/>
+                      </a:pPr>
+                      <a:r>
+                        <a:rPr lang="en-US" sz="1100" dirty="0">
+                          <a:latin typeface="Consolas" panose="020B0609020204030204" pitchFamily="49" charset="0"/>
+                        </a:rPr>
+                        <a:t>+ </a:t>
+                      </a:r>
+                      <a:r>
+                        <a:rPr lang="en-US" sz="1100" dirty="0" err="1">
+                          <a:latin typeface="Consolas" panose="020B0609020204030204" pitchFamily="49" charset="0"/>
+                        </a:rPr>
+                        <a:t>setName</a:t>
+                      </a:r>
+                      <a:r>
+                        <a:rPr lang="en-US" sz="1100" dirty="0">
+                          <a:latin typeface="Consolas" panose="020B0609020204030204" pitchFamily="49" charset="0"/>
+                        </a:rPr>
+                        <a:t>(String) : void</a:t>
+                      </a:r>
+                    </a:p>
+                    <a:p>
+                      <a:pPr marL="0" marR="0" lvl="0" indent="0" algn="l" defTabSz="914400" rtl="0" eaLnBrk="1" fontAlgn="auto" latinLnBrk="0" hangingPunct="1">
+                        <a:lnSpc>
+                          <a:spcPct val="100000"/>
+                        </a:lnSpc>
+                        <a:spcBef>
+                          <a:spcPts val="0"/>
+                        </a:spcBef>
+                        <a:spcAft>
+                          <a:spcPts val="0"/>
+                        </a:spcAft>
+                        <a:buClrTx/>
+                        <a:buSzTx/>
+                        <a:buFontTx/>
+                        <a:buNone/>
+                        <a:tabLst/>
+                        <a:defRPr/>
+                      </a:pPr>
+                      <a:r>
+                        <a:rPr lang="en-US" sz="1100" dirty="0">
+                          <a:latin typeface="Consolas" panose="020B0609020204030204" pitchFamily="49" charset="0"/>
+                        </a:rPr>
+                        <a:t>+ </a:t>
+                      </a:r>
+                      <a:r>
+                        <a:rPr lang="en-US" sz="1100" dirty="0" err="1">
+                          <a:latin typeface="Consolas" panose="020B0609020204030204" pitchFamily="49" charset="0"/>
+                        </a:rPr>
+                        <a:t>toFile</a:t>
+                      </a:r>
+                      <a:r>
+                        <a:rPr lang="en-US" sz="1100" dirty="0">
+                          <a:latin typeface="Consolas" panose="020B0609020204030204" pitchFamily="49" charset="0"/>
+                        </a:rPr>
+                        <a:t>() : String  </a:t>
+                      </a:r>
+                    </a:p>
+                    <a:p>
+                      <a:pPr marL="0" marR="0" lvl="0" indent="0" algn="l" defTabSz="914400" rtl="0" eaLnBrk="1" fontAlgn="auto" latinLnBrk="0" hangingPunct="1">
+                        <a:lnSpc>
+                          <a:spcPct val="100000"/>
+                        </a:lnSpc>
+                        <a:spcBef>
+                          <a:spcPts val="0"/>
+                        </a:spcBef>
+                        <a:spcAft>
+                          <a:spcPts val="0"/>
+                        </a:spcAft>
+                        <a:buClrTx/>
+                        <a:buSzTx/>
+                        <a:buFontTx/>
+                        <a:buNone/>
+                        <a:tabLst/>
+                        <a:defRPr/>
+                      </a:pPr>
+                      <a:r>
+                        <a:rPr lang="en-US" sz="1100" dirty="0">
+                          <a:latin typeface="Consolas" panose="020B0609020204030204" pitchFamily="49" charset="0"/>
+                        </a:rPr>
+                        <a:t>+ </a:t>
+                      </a:r>
+                      <a:r>
+                        <a:rPr lang="en-US" sz="1100" dirty="0" err="1">
+                          <a:latin typeface="Consolas" panose="020B0609020204030204" pitchFamily="49" charset="0"/>
+                        </a:rPr>
+                        <a:t>toString</a:t>
+                      </a:r>
+                      <a:r>
+                        <a:rPr lang="en-US" sz="1100" dirty="0">
+                          <a:latin typeface="Consolas" panose="020B0609020204030204" pitchFamily="49" charset="0"/>
+                        </a:rPr>
+                        <a:t>() : String  </a:t>
+                      </a:r>
+                      <a:r>
+                        <a:rPr kumimoji="0" lang="en-US" sz="1100" b="0" i="0" u="none" strike="noStrike" kern="1200" cap="none" spc="0" normalizeH="0" baseline="0" noProof="0" dirty="0">
+                          <a:ln>
+                            <a:noFill/>
+                          </a:ln>
+                          <a:solidFill>
+                            <a:srgbClr val="009900"/>
+                          </a:solidFill>
+                          <a:effectLst/>
+                          <a:uLnTx/>
+                          <a:uFillTx/>
+                          <a:latin typeface="Consolas" panose="020B0609020204030204" pitchFamily="49" charset="0"/>
+                          <a:ea typeface="+mn-ea"/>
+                          <a:cs typeface="+mn-cs"/>
+                        </a:rPr>
+                        <a:t>∆</a:t>
+                      </a:r>
+                      <a:endParaRPr lang="en-US" sz="1100" dirty="0">
+                        <a:latin typeface="Consolas" panose="020B0609020204030204" pitchFamily="49" charset="0"/>
+                      </a:endParaRPr>
+                    </a:p>
+                  </a:txBody>
+                  <a:tcPr/>
+                </a:tc>
+                <a:extLst>
+                  <a:ext uri="{0D108BD9-81ED-4DB2-BD59-A6C34878D82A}">
+                    <a16:rowId xmlns:a16="http://schemas.microsoft.com/office/drawing/2014/main" val="1912978106"/>
+                  </a:ext>
+                </a:extLst>
+              </a:tr>
+            </a:tbl>
+          </a:graphicData>
+        </a:graphic>
+      </p:graphicFrame>
+      <p:graphicFrame>
+        <p:nvGraphicFramePr>
+          <p:cNvPr id="7" name="Table 6">
+            <a:extLst>
+              <a:ext uri="{FF2B5EF4-FFF2-40B4-BE49-F238E27FC236}">
+                <a16:creationId xmlns:a16="http://schemas.microsoft.com/office/drawing/2014/main" id="{7BC21E81-1B3D-4E0C-97FD-A34119C39ACB}"/>
+              </a:ext>
+            </a:extLst>
+          </p:cNvPr>
+          <p:cNvGraphicFramePr>
+            <a:graphicFrameLocks noGrp="1"/>
+          </p:cNvGraphicFramePr>
+          <p:nvPr>
+            <p:extLst>
+              <p:ext uri="{D42A27DB-BD31-4B8C-83A1-F6EECF244321}">
+                <p14:modId xmlns:p14="http://schemas.microsoft.com/office/powerpoint/2010/main" val="2731867159"/>
+              </p:ext>
+            </p:extLst>
+          </p:nvPr>
+        </p:nvGraphicFramePr>
+        <p:xfrm>
+          <a:off x="9922954" y="616628"/>
+          <a:ext cx="2009066" cy="1833880"/>
+        </p:xfrm>
+        <a:graphic>
+          <a:graphicData uri="http://schemas.openxmlformats.org/drawingml/2006/table">
+            <a:tbl>
+              <a:tblPr firstRow="1" bandRow="1">
+                <a:tableStyleId>{F5AB1C69-6EDB-4FF4-983F-18BD219EF322}</a:tableStyleId>
+              </a:tblPr>
+              <a:tblGrid>
+                <a:gridCol w="2009066">
+                  <a:extLst>
+                    <a:ext uri="{9D8B030D-6E8A-4147-A177-3AD203B41FA5}">
+                      <a16:colId xmlns:a16="http://schemas.microsoft.com/office/drawing/2014/main" val="1362394583"/>
+                    </a:ext>
+                  </a:extLst>
+                </a:gridCol>
+              </a:tblGrid>
+              <a:tr h="370840">
+                <a:tc>
+                  <a:txBody>
+                    <a:bodyPr/>
+                    <a:lstStyle/>
+                    <a:p>
+                      <a:pPr algn="ctr"/>
+                      <a:r>
+                        <a:rPr lang="en-US" sz="1100" b="0" dirty="0">
+                          <a:latin typeface="Consolas" panose="020B0609020204030204" pitchFamily="49" charset="0"/>
+                        </a:rPr>
+                        <a:t>&lt;&lt;Java Enumeration&gt;&gt;</a:t>
+                      </a:r>
+                    </a:p>
+                    <a:p>
+                      <a:pPr algn="ctr"/>
+                      <a:r>
+                        <a:rPr lang="en-US" b="0" dirty="0">
+                          <a:latin typeface="Consolas" panose="020B0609020204030204" pitchFamily="49" charset="0"/>
+                        </a:rPr>
+                        <a:t>Status</a:t>
+                      </a:r>
+                    </a:p>
+                    <a:p>
+                      <a:pPr algn="ctr"/>
+                      <a:r>
+                        <a:rPr lang="en-US" sz="1100" b="0" dirty="0">
+                          <a:latin typeface="Consolas" panose="020B0609020204030204" pitchFamily="49" charset="0"/>
+                        </a:rPr>
+                        <a:t>people package</a:t>
+                      </a:r>
+                    </a:p>
+                  </a:txBody>
+                  <a:tcPr/>
+                </a:tc>
+                <a:extLst>
+                  <a:ext uri="{0D108BD9-81ED-4DB2-BD59-A6C34878D82A}">
+                    <a16:rowId xmlns:a16="http://schemas.microsoft.com/office/drawing/2014/main" val="2932950179"/>
+                  </a:ext>
+                </a:extLst>
+              </a:tr>
+              <a:tr h="370840">
+                <a:tc>
+                  <a:txBody>
+                    <a:bodyPr/>
+                    <a:lstStyle/>
+                    <a:p>
+                      <a:r>
+                        <a:rPr lang="en-US" sz="1100" dirty="0">
+                          <a:latin typeface="Consolas" panose="020B0609020204030204" pitchFamily="49" charset="0"/>
+                        </a:rPr>
+                        <a:t>+ FRESHMAN  : Status</a:t>
+                      </a:r>
+                    </a:p>
+                    <a:p>
+                      <a:pPr marL="0" marR="0" lvl="0" indent="0" algn="l" defTabSz="914400" rtl="0" eaLnBrk="1" fontAlgn="auto" latinLnBrk="0" hangingPunct="1">
+                        <a:lnSpc>
+                          <a:spcPct val="100000"/>
+                        </a:lnSpc>
+                        <a:spcBef>
+                          <a:spcPts val="0"/>
+                        </a:spcBef>
+                        <a:spcAft>
+                          <a:spcPts val="0"/>
+                        </a:spcAft>
+                        <a:buClrTx/>
+                        <a:buSzTx/>
+                        <a:buFontTx/>
+                        <a:buNone/>
+                        <a:tabLst/>
+                        <a:defRPr/>
+                      </a:pPr>
+                      <a:r>
+                        <a:rPr lang="en-US" sz="1100" dirty="0">
+                          <a:latin typeface="Consolas" panose="020B0609020204030204" pitchFamily="49" charset="0"/>
+                        </a:rPr>
+                        <a:t>+ SOPHOMORE : Status</a:t>
+                      </a:r>
+                    </a:p>
+                    <a:p>
+                      <a:pPr marL="0" marR="0" lvl="0" indent="0" algn="l" defTabSz="914400" rtl="0" eaLnBrk="1" fontAlgn="auto" latinLnBrk="0" hangingPunct="1">
+                        <a:lnSpc>
+                          <a:spcPct val="100000"/>
+                        </a:lnSpc>
+                        <a:spcBef>
+                          <a:spcPts val="0"/>
+                        </a:spcBef>
+                        <a:spcAft>
+                          <a:spcPts val="0"/>
+                        </a:spcAft>
+                        <a:buClrTx/>
+                        <a:buSzTx/>
+                        <a:buFontTx/>
+                        <a:buNone/>
+                        <a:tabLst/>
+                        <a:defRPr/>
+                      </a:pPr>
+                      <a:r>
+                        <a:rPr lang="en-US" sz="1100" dirty="0">
+                          <a:latin typeface="Consolas" panose="020B0609020204030204" pitchFamily="49" charset="0"/>
+                        </a:rPr>
+                        <a:t>+ JUNIOR    : Status</a:t>
+                      </a:r>
+                    </a:p>
+                    <a:p>
+                      <a:pPr marL="0" marR="0" lvl="0" indent="0" algn="l" defTabSz="914400" rtl="0" eaLnBrk="1" fontAlgn="auto" latinLnBrk="0" hangingPunct="1">
+                        <a:lnSpc>
+                          <a:spcPct val="100000"/>
+                        </a:lnSpc>
+                        <a:spcBef>
+                          <a:spcPts val="0"/>
+                        </a:spcBef>
+                        <a:spcAft>
+                          <a:spcPts val="0"/>
+                        </a:spcAft>
+                        <a:buClrTx/>
+                        <a:buSzTx/>
+                        <a:buFontTx/>
+                        <a:buNone/>
+                        <a:tabLst/>
+                        <a:defRPr/>
+                      </a:pPr>
+                      <a:r>
+                        <a:rPr lang="en-US" sz="1100" dirty="0">
+                          <a:latin typeface="Consolas" panose="020B0609020204030204" pitchFamily="49" charset="0"/>
+                        </a:rPr>
+                        <a:t>+ SENIOR    : Status</a:t>
+                      </a:r>
+                    </a:p>
+                  </a:txBody>
+                  <a:tcPr/>
+                </a:tc>
+                <a:extLst>
+                  <a:ext uri="{0D108BD9-81ED-4DB2-BD59-A6C34878D82A}">
+                    <a16:rowId xmlns:a16="http://schemas.microsoft.com/office/drawing/2014/main" val="2552365492"/>
+                  </a:ext>
+                </a:extLst>
+              </a:tr>
+              <a:tr h="370840">
+                <a:tc>
+                  <a:txBody>
+                    <a:bodyPr/>
+                    <a:lstStyle/>
+                    <a:p>
+                      <a:r>
+                        <a:rPr lang="en-US" sz="1100" dirty="0">
+                          <a:latin typeface="Consolas" panose="020B0609020204030204" pitchFamily="49" charset="0"/>
+                        </a:rPr>
+                        <a:t>+ </a:t>
+                      </a:r>
+                      <a:r>
+                        <a:rPr lang="en-US" sz="1100" dirty="0" err="1">
+                          <a:latin typeface="Consolas" panose="020B0609020204030204" pitchFamily="49" charset="0"/>
+                        </a:rPr>
+                        <a:t>PersonType</a:t>
+                      </a:r>
+                      <a:r>
+                        <a:rPr lang="en-US" sz="1100" dirty="0">
+                          <a:latin typeface="Consolas" panose="020B0609020204030204" pitchFamily="49" charset="0"/>
+                        </a:rPr>
+                        <a:t>()</a:t>
+                      </a:r>
                     </a:p>
                   </a:txBody>
                   <a:tcPr/>
@@ -4734,14 +6141,14 @@
           <p:nvPr>
             <p:extLst>
               <p:ext uri="{D42A27DB-BD31-4B8C-83A1-F6EECF244321}">
-                <p14:modId xmlns:p14="http://schemas.microsoft.com/office/powerpoint/2010/main" val="479683064"/>
+                <p14:modId xmlns:p14="http://schemas.microsoft.com/office/powerpoint/2010/main" val="2250718955"/>
               </p:ext>
             </p:extLst>
           </p:nvPr>
         </p:nvGraphicFramePr>
         <p:xfrm>
           <a:off x="129297" y="245641"/>
-          <a:ext cx="4671303" cy="6248400"/>
+          <a:ext cx="4671303" cy="5913120"/>
         </p:xfrm>
         <a:graphic>
           <a:graphicData uri="http://schemas.openxmlformats.org/drawingml/2006/table">
@@ -4962,60 +6369,6 @@
                       </a:r>
                     </a:p>
                     <a:p>
-                      <a:pPr marL="0" indent="0">
-                        <a:buFontTx/>
-                        <a:buNone/>
-                      </a:pPr>
-                      <a:r>
-                        <a:rPr lang="en-US" sz="1100" dirty="0">
-                          <a:latin typeface="Consolas" panose="020B0609020204030204" pitchFamily="49" charset="0"/>
-                        </a:rPr>
-                        <a:t>+ Operator : </a:t>
-                      </a:r>
-                      <a:r>
-                        <a:rPr lang="en-US" sz="1100" dirty="0" err="1">
-                          <a:latin typeface="Consolas" panose="020B0609020204030204" pitchFamily="49" charset="0"/>
-                        </a:rPr>
-                        <a:t>Enum</a:t>
-                      </a:r>
-                      <a:endParaRPr lang="en-US" sz="1100" dirty="0">
-                        <a:latin typeface="Consolas" panose="020B0609020204030204" pitchFamily="49" charset="0"/>
-                      </a:endParaRPr>
-                    </a:p>
-                    <a:p>
-                      <a:pPr marL="0" indent="0">
-                        <a:buFontTx/>
-                        <a:buNone/>
-                      </a:pPr>
-                      <a:r>
-                        <a:rPr lang="en-US" sz="1100" dirty="0">
-                          <a:latin typeface="Consolas" panose="020B0609020204030204" pitchFamily="49" charset="0"/>
-                        </a:rPr>
-                        <a:t>+ </a:t>
-                      </a:r>
-                      <a:r>
-                        <a:rPr lang="en-US" sz="1100" dirty="0" err="1">
-                          <a:latin typeface="Consolas" panose="020B0609020204030204" pitchFamily="49" charset="0"/>
-                        </a:rPr>
-                        <a:t>PersonType</a:t>
-                      </a:r>
-                      <a:r>
-                        <a:rPr lang="en-US" sz="1100" dirty="0">
-                          <a:latin typeface="Consolas" panose="020B0609020204030204" pitchFamily="49" charset="0"/>
-                        </a:rPr>
-                        <a:t> : </a:t>
-                      </a:r>
-                      <a:r>
-                        <a:rPr lang="en-US" sz="1100" dirty="0" err="1">
-                          <a:latin typeface="Consolas" panose="020B0609020204030204" pitchFamily="49" charset="0"/>
-                        </a:rPr>
-                        <a:t>Enum</a:t>
-                      </a:r>
-                      <a:endParaRPr lang="en-US" sz="1100" dirty="0">
-                        <a:latin typeface="Consolas" panose="020B0609020204030204" pitchFamily="49" charset="0"/>
-                      </a:endParaRPr>
-                    </a:p>
-                    <a:p>
                       <a:pPr marL="0" marR="0" lvl="0" indent="0" algn="l" defTabSz="914400" rtl="0" eaLnBrk="1" fontAlgn="auto" latinLnBrk="0" hangingPunct="1">
                         <a:lnSpc>
                           <a:spcPct val="100000"/>
@@ -6352,60 +7705,24 @@
                           <a:ea typeface="+mn-ea"/>
                           <a:cs typeface="+mn-cs"/>
                         </a:rPr>
-                        <a:t>+ search(String) : Person</a:t>
-                      </a:r>
-                    </a:p>
-                    <a:p>
-                      <a:pPr marL="0" marR="0" lvl="0" indent="0" algn="l" defTabSz="914400" rtl="0" eaLnBrk="1" fontAlgn="auto" latinLnBrk="0" hangingPunct="1">
-                        <a:lnSpc>
-                          <a:spcPct val="100000"/>
-                        </a:lnSpc>
-                        <a:spcBef>
-                          <a:spcPts val="0"/>
-                        </a:spcBef>
-                        <a:spcAft>
-                          <a:spcPts val="0"/>
-                        </a:spcAft>
-                        <a:buClrTx/>
-                        <a:buSzTx/>
-                        <a:buFontTx/>
-                        <a:buNone/>
-                        <a:tabLst/>
-                        <a:defRPr/>
-                      </a:pPr>
+                        <a:t>+ search(String) : Person  </a:t>
+                      </a:r>
                       <a:r>
                         <a:rPr kumimoji="0" lang="en-US" sz="1100" b="0" i="0" u="none" strike="noStrike" kern="1200" cap="none" spc="0" normalizeH="0" baseline="0" noProof="0" dirty="0">
                           <a:ln>
                             <a:noFill/>
                           </a:ln>
                           <a:solidFill>
-                            <a:schemeClr val="tx1"/>
-                          </a:solidFill>
-                          <a:effectLst/>
-                          <a:uLnTx/>
-                          <a:uFillTx/>
-                          <a:latin typeface="Consolas" panose="020B0609020204030204" pitchFamily="49" charset="0"/>
-                          <a:ea typeface="+mn-ea"/>
-                          <a:cs typeface="+mn-cs"/>
-                        </a:rPr>
-                        <a:t>+ separate(int) : </a:t>
-                      </a:r>
-                      <a:r>
-                        <a:rPr kumimoji="0" lang="en-US" sz="1100" b="0" i="0" u="none" strike="noStrike" kern="1200" cap="none" spc="0" normalizeH="0" baseline="0" noProof="0" dirty="0" err="1">
-                          <a:ln>
-                            <a:noFill/>
-                          </a:ln>
-                          <a:solidFill>
-                            <a:schemeClr val="tx1"/>
-                          </a:solidFill>
-                          <a:effectLst/>
-                          <a:uLnTx/>
-                          <a:uFillTx/>
-                          <a:latin typeface="Consolas" panose="020B0609020204030204" pitchFamily="49" charset="0"/>
-                          <a:ea typeface="+mn-ea"/>
-                          <a:cs typeface="+mn-cs"/>
-                        </a:rPr>
-                        <a:t>CollegeDatabase</a:t>
+                            <a:srgbClr val="009900"/>
+                          </a:solidFill>
+                          <a:effectLst/>
+                          <a:uLnTx/>
+                          <a:uFillTx/>
+                          <a:latin typeface="Consolas" panose="020B0609020204030204" pitchFamily="49" charset="0"/>
+                          <a:ea typeface="+mn-ea"/>
+                          <a:cs typeface="+mn-cs"/>
+                        </a:rPr>
+                        <a:t>∆</a:t>
                       </a:r>
                       <a:endParaRPr kumimoji="0" lang="en-US" sz="1100" b="0" i="0" u="none" strike="noStrike" kern="1200" cap="none" spc="0" normalizeH="0" baseline="0" noProof="0" dirty="0">
                         <a:ln>
@@ -6455,41 +7772,7 @@
                           <a:ea typeface="+mn-ea"/>
                           <a:cs typeface="+mn-cs"/>
                         </a:rPr>
-                        <a:t>+ separate(int, </a:t>
-                      </a:r>
-                      <a:r>
-                        <a:rPr kumimoji="0" lang="en-US" sz="1100" b="0" i="1" u="none" strike="noStrike" kern="1200" cap="none" spc="0" normalizeH="0" baseline="0" noProof="0" dirty="0">
-                          <a:ln>
-                            <a:noFill/>
-                          </a:ln>
-                          <a:solidFill>
-                            <a:schemeClr val="tx1"/>
-                          </a:solidFill>
-                          <a:effectLst/>
-                          <a:uLnTx/>
-                          <a:uFillTx/>
-                          <a:latin typeface="Consolas" panose="020B0609020204030204" pitchFamily="49" charset="0"/>
-                          <a:ea typeface="+mn-ea"/>
-                          <a:cs typeface="+mn-cs"/>
-                        </a:rPr>
-                        <a:t>Operator</a:t>
-                      </a:r>
-                      <a:r>
-                        <a:rPr kumimoji="0" lang="en-US" sz="1100" b="0" i="0" u="none" strike="noStrike" kern="1200" cap="none" spc="0" normalizeH="0" baseline="0" noProof="0" dirty="0">
-                          <a:ln>
-                            <a:noFill/>
-                          </a:ln>
-                          <a:solidFill>
-                            <a:schemeClr val="tx1"/>
-                          </a:solidFill>
-                          <a:effectLst/>
-                          <a:uLnTx/>
-                          <a:uFillTx/>
-                          <a:latin typeface="Consolas" panose="020B0609020204030204" pitchFamily="49" charset="0"/>
-                          <a:ea typeface="+mn-ea"/>
-                          <a:cs typeface="+mn-cs"/>
-                        </a:rPr>
-                        <a:t>) : </a:t>
+                        <a:t>+ separate(int) : </a:t>
                       </a:r>
                       <a:r>
                         <a:rPr kumimoji="0" lang="en-US" sz="1100" b="0" i="0" u="none" strike="noStrike" kern="1200" cap="none" spc="0" normalizeH="0" baseline="0" noProof="0" dirty="0" err="1">
@@ -6556,7 +7839,7 @@
                           <a:ea typeface="+mn-ea"/>
                           <a:cs typeface="+mn-cs"/>
                         </a:rPr>
-                        <a:t>+ separate</a:t>
+                        <a:t>+ separate(int, </a:t>
                       </a:r>
                       <a:r>
                         <a:rPr kumimoji="0" lang="en-US" sz="1100" b="0" i="1" u="none" strike="noStrike" kern="1200" cap="none" spc="0" normalizeH="0" baseline="0" noProof="0" dirty="0">
@@ -6573,10 +7856,10 @@
                           <a:ea typeface="+mn-ea"/>
                           <a:cs typeface="+mn-cs"/>
                         </a:rPr>
-                        <a:t>(</a:t>
-                      </a:r>
-                      <a:r>
-                        <a:rPr kumimoji="0" lang="en-US" sz="1100" b="0" i="1" u="none" strike="noStrike" kern="1200" cap="none" spc="0" normalizeH="0" baseline="0" noProof="0" dirty="0" err="1">
+                        <a:t>Operator</a:t>
+                      </a:r>
+                      <a:r>
+                        <a:rPr kumimoji="0" lang="en-US" sz="1100" b="0" i="0" u="none" strike="noStrike" kern="1200" cap="none" spc="0" normalizeH="0" baseline="0" noProof="0" dirty="0">
                           <a:ln>
                             <a:noFill/>
                           </a:ln>
@@ -6590,41 +7873,7 @@
                           <a:ea typeface="+mn-ea"/>
                           <a:cs typeface="+mn-cs"/>
                         </a:rPr>
-                        <a:t>PersonType</a:t>
-                      </a:r>
-                      <a:r>
-                        <a:rPr kumimoji="0" lang="en-US" sz="1100" b="0" i="1" u="none" strike="noStrike" kern="1200" cap="none" spc="0" normalizeH="0" baseline="0" noProof="0" dirty="0">
-                          <a:ln>
-                            <a:noFill/>
-                          </a:ln>
-                          <a:solidFill>
-                            <a:schemeClr val="tx1"/>
-                          </a:solidFill>
-                          <a:effectLst/>
-                          <a:uLnTx/>
-                          <a:uFillTx/>
-                          <a:latin typeface="Consolas" panose="020B0609020204030204" pitchFamily="49" charset="0"/>
-                          <a:ea typeface="+mn-ea"/>
-                          <a:cs typeface="+mn-cs"/>
-                        </a:rPr>
-                        <a:t>)</a:t>
-                      </a:r>
-                      <a:r>
-                        <a:rPr kumimoji="0" lang="en-US" sz="1100" b="0" i="0" u="none" strike="noStrike" kern="1200" cap="none" spc="0" normalizeH="0" baseline="0" noProof="0" dirty="0">
-                          <a:ln>
-                            <a:noFill/>
-                          </a:ln>
-                          <a:solidFill>
-                            <a:schemeClr val="tx1"/>
-                          </a:solidFill>
-                          <a:effectLst/>
-                          <a:uLnTx/>
-                          <a:uFillTx/>
-                          <a:latin typeface="Consolas" panose="020B0609020204030204" pitchFamily="49" charset="0"/>
-                          <a:ea typeface="+mn-ea"/>
-                          <a:cs typeface="+mn-cs"/>
-                        </a:rPr>
-                        <a:t> : </a:t>
+                        <a:t>) : </a:t>
                       </a:r>
                       <a:r>
                         <a:rPr kumimoji="0" lang="en-US" sz="1100" b="0" i="0" u="none" strike="noStrike" kern="1200" cap="none" spc="0" normalizeH="0" baseline="0" noProof="0" dirty="0" err="1">
@@ -6691,7 +7940,24 @@
                           <a:ea typeface="+mn-ea"/>
                           <a:cs typeface="+mn-cs"/>
                         </a:rPr>
-                        <a:t>+ separate(</a:t>
+                        <a:t>+ separate</a:t>
+                      </a:r>
+                      <a:r>
+                        <a:rPr kumimoji="0" lang="en-US" sz="1100" b="0" i="1" u="none" strike="noStrike" kern="1200" cap="none" spc="0" normalizeH="0" baseline="0" noProof="0" dirty="0">
+                          <a:ln>
+                            <a:noFill/>
+                          </a:ln>
+                          <a:solidFill>
+                            <a:schemeClr val="tx1"/>
+                          </a:solidFill>
+                          <a:effectLst/>
+                          <a:uLnTx/>
+                          <a:uFillTx/>
+                          <a:latin typeface="Consolas" panose="020B0609020204030204" pitchFamily="49" charset="0"/>
+                          <a:ea typeface="+mn-ea"/>
+                          <a:cs typeface="+mn-cs"/>
+                        </a:rPr>
+                        <a:t>(</a:t>
                       </a:r>
                       <a:r>
                         <a:rPr kumimoji="0" lang="en-US" sz="1100" b="0" i="1" u="none" strike="noStrike" kern="1200" cap="none" spc="0" normalizeH="0" baseline="0" noProof="0" dirty="0" err="1">
@@ -6711,6 +7977,23 @@
                         <a:t>PersonType</a:t>
                       </a:r>
                       <a:r>
+                        <a:rPr kumimoji="0" lang="en-US" sz="1100" b="0" i="1" u="none" strike="noStrike" kern="1200" cap="none" spc="0" normalizeH="0" baseline="0" noProof="0" dirty="0">
+                          <a:ln>
+                            <a:noFill/>
+                          </a:ln>
+                          <a:solidFill>
+                            <a:schemeClr val="tx1"/>
+                          </a:solidFill>
+                          <a:effectLst/>
+                          <a:uLnTx/>
+                          <a:uFillTx/>
+                          <a:latin typeface="Consolas" panose="020B0609020204030204" pitchFamily="49" charset="0"/>
+                          <a:ea typeface="+mn-ea"/>
+                          <a:cs typeface="+mn-cs"/>
+                        </a:rPr>
+                        <a:t>)</a:t>
+                      </a:r>
+                      <a:r>
                         <a:rPr kumimoji="0" lang="en-US" sz="1100" b="0" i="0" u="none" strike="noStrike" kern="1200" cap="none" spc="0" normalizeH="0" baseline="0" noProof="0" dirty="0">
                           <a:ln>
                             <a:noFill/>
@@ -6725,41 +8008,7 @@
                           <a:ea typeface="+mn-ea"/>
                           <a:cs typeface="+mn-cs"/>
                         </a:rPr>
-                        <a:t>, double, </a:t>
-                      </a:r>
-                      <a:r>
-                        <a:rPr kumimoji="0" lang="en-US" sz="1100" b="0" i="1" u="none" strike="noStrike" kern="1200" cap="none" spc="0" normalizeH="0" baseline="0" noProof="0" dirty="0">
-                          <a:ln>
-                            <a:noFill/>
-                          </a:ln>
-                          <a:solidFill>
-                            <a:schemeClr val="tx1"/>
-                          </a:solidFill>
-                          <a:effectLst/>
-                          <a:uLnTx/>
-                          <a:uFillTx/>
-                          <a:latin typeface="Consolas" panose="020B0609020204030204" pitchFamily="49" charset="0"/>
-                          <a:ea typeface="+mn-ea"/>
-                          <a:cs typeface="+mn-cs"/>
-                        </a:rPr>
-                        <a:t>Operator</a:t>
-                      </a:r>
-                      <a:r>
-                        <a:rPr kumimoji="0" lang="en-US" sz="1100" b="0" i="0" u="none" strike="noStrike" kern="1200" cap="none" spc="0" normalizeH="0" baseline="0" noProof="0" dirty="0">
-                          <a:ln>
-                            <a:noFill/>
-                          </a:ln>
-                          <a:solidFill>
-                            <a:schemeClr val="tx1"/>
-                          </a:solidFill>
-                          <a:effectLst/>
-                          <a:uLnTx/>
-                          <a:uFillTx/>
-                          <a:latin typeface="Consolas" panose="020B0609020204030204" pitchFamily="49" charset="0"/>
-                          <a:ea typeface="+mn-ea"/>
-                          <a:cs typeface="+mn-cs"/>
-                        </a:rPr>
-                        <a:t>) : </a:t>
+                        <a:t> : </a:t>
                       </a:r>
                       <a:r>
                         <a:rPr kumimoji="0" lang="en-US" sz="1100" b="0" i="0" u="none" strike="noStrike" kern="1200" cap="none" spc="0" normalizeH="0" baseline="0" noProof="0" dirty="0" err="1">
@@ -6826,7 +8075,75 @@
                           <a:ea typeface="+mn-ea"/>
                           <a:cs typeface="+mn-cs"/>
                         </a:rPr>
-                        <a:t>+ </a:t>
+                        <a:t>+ separate(</a:t>
+                      </a:r>
+                      <a:r>
+                        <a:rPr kumimoji="0" lang="en-US" sz="1100" b="0" i="1" u="none" strike="noStrike" kern="1200" cap="none" spc="0" normalizeH="0" baseline="0" noProof="0" dirty="0" err="1">
+                          <a:ln>
+                            <a:noFill/>
+                          </a:ln>
+                          <a:solidFill>
+                            <a:schemeClr val="tx1"/>
+                          </a:solidFill>
+                          <a:effectLst/>
+                          <a:uLnTx/>
+                          <a:uFillTx/>
+                          <a:latin typeface="Consolas" panose="020B0609020204030204" pitchFamily="49" charset="0"/>
+                          <a:ea typeface="+mn-ea"/>
+                          <a:cs typeface="+mn-cs"/>
+                        </a:rPr>
+                        <a:t>PersonType</a:t>
+                      </a:r>
+                      <a:r>
+                        <a:rPr kumimoji="0" lang="en-US" sz="1100" b="0" i="0" u="none" strike="noStrike" kern="1200" cap="none" spc="0" normalizeH="0" baseline="0" noProof="0" dirty="0">
+                          <a:ln>
+                            <a:noFill/>
+                          </a:ln>
+                          <a:solidFill>
+                            <a:schemeClr val="tx1"/>
+                          </a:solidFill>
+                          <a:effectLst/>
+                          <a:uLnTx/>
+                          <a:uFillTx/>
+                          <a:latin typeface="Consolas" panose="020B0609020204030204" pitchFamily="49" charset="0"/>
+                          <a:ea typeface="+mn-ea"/>
+                          <a:cs typeface="+mn-cs"/>
+                        </a:rPr>
+                        <a:t>, double, </a:t>
+                      </a:r>
+                      <a:r>
+                        <a:rPr kumimoji="0" lang="en-US" sz="1100" b="0" i="1" u="none" strike="noStrike" kern="1200" cap="none" spc="0" normalizeH="0" baseline="0" noProof="0" dirty="0">
+                          <a:ln>
+                            <a:noFill/>
+                          </a:ln>
+                          <a:solidFill>
+                            <a:schemeClr val="tx1"/>
+                          </a:solidFill>
+                          <a:effectLst/>
+                          <a:uLnTx/>
+                          <a:uFillTx/>
+                          <a:latin typeface="Consolas" panose="020B0609020204030204" pitchFamily="49" charset="0"/>
+                          <a:ea typeface="+mn-ea"/>
+                          <a:cs typeface="+mn-cs"/>
+                        </a:rPr>
+                        <a:t>Operator</a:t>
+                      </a:r>
+                      <a:r>
+                        <a:rPr kumimoji="0" lang="en-US" sz="1100" b="0" i="0" u="none" strike="noStrike" kern="1200" cap="none" spc="0" normalizeH="0" baseline="0" noProof="0" dirty="0">
+                          <a:ln>
+                            <a:noFill/>
+                          </a:ln>
+                          <a:solidFill>
+                            <a:schemeClr val="tx1"/>
+                          </a:solidFill>
+                          <a:effectLst/>
+                          <a:uLnTx/>
+                          <a:uFillTx/>
+                          <a:latin typeface="Consolas" panose="020B0609020204030204" pitchFamily="49" charset="0"/>
+                          <a:ea typeface="+mn-ea"/>
+                          <a:cs typeface="+mn-cs"/>
+                        </a:rPr>
+                        <a:t>) : </a:t>
                       </a:r>
                       <a:r>
                         <a:rPr kumimoji="0" lang="en-US" sz="1100" b="0" i="0" u="none" strike="noStrike" kern="1200" cap="none" spc="0" normalizeH="0" baseline="0" noProof="0" dirty="0" err="1">
@@ -6843,25 +8160,22 @@
                           <a:ea typeface="+mn-ea"/>
                           <a:cs typeface="+mn-cs"/>
                         </a:rPr>
-                        <a:t>toFile</a:t>
-                      </a:r>
-                      <a:r>
-                        <a:rPr kumimoji="0" lang="en-US" sz="1100" b="0" i="0" u="none" strike="noStrike" kern="1200" cap="none" spc="0" normalizeH="0" baseline="0" noProof="0" dirty="0">
-                          <a:ln>
-                            <a:noFill/>
-                          </a:ln>
-                          <a:solidFill>
-                            <a:schemeClr val="tx1"/>
-                          </a:solidFill>
-                          <a:effectLst/>
-                          <a:uLnTx/>
-                          <a:uFillTx/>
-                          <a:latin typeface="Consolas" panose="020B0609020204030204" pitchFamily="49" charset="0"/>
-                          <a:ea typeface="+mn-ea"/>
-                          <a:cs typeface="+mn-cs"/>
-                        </a:rPr>
-                        <a:t>() : String</a:t>
-                      </a:r>
+                        <a:t>CollegeDatabase</a:t>
+                      </a:r>
+                      <a:endParaRPr kumimoji="0" lang="en-US" sz="1100" b="0" i="0" u="none" strike="noStrike" kern="1200" cap="none" spc="0" normalizeH="0" baseline="0" noProof="0" dirty="0">
+                        <a:ln>
+                          <a:noFill/>
+                        </a:ln>
+                        <a:solidFill>
+                          <a:schemeClr val="tx1"/>
+                        </a:solidFill>
+                        <a:effectLst/>
+                        <a:uLnTx/>
+                        <a:uFillTx/>
+                        <a:latin typeface="Consolas" panose="020B0609020204030204" pitchFamily="49" charset="0"/>
+                        <a:ea typeface="+mn-ea"/>
+                        <a:cs typeface="+mn-cs"/>
+                      </a:endParaRPr>
                     </a:p>
                     <a:p>
                       <a:pPr marL="0" marR="0" lvl="0" indent="0" algn="l" defTabSz="914400" rtl="0" eaLnBrk="1" fontAlgn="auto" latinLnBrk="0" hangingPunct="1">
@@ -6913,6 +8227,76 @@
                           <a:ea typeface="+mn-ea"/>
                           <a:cs typeface="+mn-cs"/>
                         </a:rPr>
+                        <a:t>toFile</a:t>
+                      </a:r>
+                      <a:r>
+                        <a:rPr kumimoji="0" lang="en-US" sz="1100" b="0" i="0" u="none" strike="noStrike" kern="1200" cap="none" spc="0" normalizeH="0" baseline="0" noProof="0" dirty="0">
+                          <a:ln>
+                            <a:noFill/>
+                          </a:ln>
+                          <a:solidFill>
+                            <a:schemeClr val="tx1"/>
+                          </a:solidFill>
+                          <a:effectLst/>
+                          <a:uLnTx/>
+                          <a:uFillTx/>
+                          <a:latin typeface="Consolas" panose="020B0609020204030204" pitchFamily="49" charset="0"/>
+                          <a:ea typeface="+mn-ea"/>
+                          <a:cs typeface="+mn-cs"/>
+                        </a:rPr>
+                        <a:t>() : String</a:t>
+                      </a:r>
+                    </a:p>
+                    <a:p>
+                      <a:pPr marL="0" marR="0" lvl="0" indent="0" algn="l" defTabSz="914400" rtl="0" eaLnBrk="1" fontAlgn="auto" latinLnBrk="0" hangingPunct="1">
+                        <a:lnSpc>
+                          <a:spcPct val="100000"/>
+                        </a:lnSpc>
+                        <a:spcBef>
+                          <a:spcPts val="0"/>
+                        </a:spcBef>
+                        <a:spcAft>
+                          <a:spcPts val="0"/>
+                        </a:spcAft>
+                        <a:buClrTx/>
+                        <a:buSzTx/>
+                        <a:buFontTx/>
+                        <a:buNone/>
+                        <a:tabLst/>
+                        <a:defRPr/>
+                      </a:pPr>
+                      <a:r>
+                        <a:rPr kumimoji="0" lang="en-US" sz="1100" b="0" i="0" u="none" strike="noStrike" kern="1200" cap="none" spc="0" normalizeH="0" baseline="0" noProof="0" dirty="0">
+                          <a:ln>
+                            <a:noFill/>
+                          </a:ln>
+                          <a:solidFill>
+                            <a:schemeClr val="tx1"/>
+                          </a:solidFill>
+                          <a:effectLst/>
+                          <a:uLnTx/>
+                          <a:uFillTx/>
+                          <a:latin typeface="Consolas" panose="020B0609020204030204" pitchFamily="49" charset="0"/>
+                          <a:ea typeface="+mn-ea"/>
+                          <a:cs typeface="+mn-cs"/>
+                        </a:rPr>
+                        <a:t>+ </a:t>
+                      </a:r>
+                      <a:r>
+                        <a:rPr kumimoji="0" lang="en-US" sz="1100" b="0" i="0" u="none" strike="noStrike" kern="1200" cap="none" spc="0" normalizeH="0" baseline="0" noProof="0" dirty="0" err="1">
+                          <a:ln>
+                            <a:noFill/>
+                          </a:ln>
+                          <a:solidFill>
+                            <a:schemeClr val="tx1"/>
+                          </a:solidFill>
+                          <a:effectLst/>
+                          <a:uLnTx/>
+                          <a:uFillTx/>
+                          <a:latin typeface="Consolas" panose="020B0609020204030204" pitchFamily="49" charset="0"/>
+                          <a:ea typeface="+mn-ea"/>
+                          <a:cs typeface="+mn-cs"/>
+                        </a:rPr>
                         <a:t>toString</a:t>
                       </a:r>
                       <a:r>
@@ -6930,8 +8314,39 @@
                           <a:ea typeface="+mn-ea"/>
                           <a:cs typeface="+mn-cs"/>
                         </a:rPr>
-                        <a:t>() : String</a:t>
-                      </a:r>
+                        <a:t>() : String </a:t>
+                      </a:r>
+                      <a:r>
+                        <a:rPr kumimoji="0" lang="en-US" sz="1100" b="0" i="0" u="none" strike="noStrike" kern="1200" cap="none" spc="0" normalizeH="0" baseline="0" noProof="0" dirty="0">
+                          <a:ln>
+                            <a:noFill/>
+                          </a:ln>
+                          <a:solidFill>
+                            <a:srgbClr val="009900"/>
+                          </a:solidFill>
+                          <a:effectLst/>
+                          <a:uLnTx/>
+                          <a:uFillTx/>
+                          <a:latin typeface="Consolas" panose="020B0609020204030204" pitchFamily="49" charset="0"/>
+                          <a:ea typeface="+mn-ea"/>
+                          <a:cs typeface="+mn-cs"/>
+                        </a:rPr>
+                        <a:t> ∆</a:t>
+                      </a:r>
+                      <a:endParaRPr kumimoji="0" lang="en-US" sz="1100" b="0" i="0" u="none" strike="noStrike" kern="1200" cap="none" spc="0" normalizeH="0" baseline="0" noProof="0" dirty="0">
+                        <a:ln>
+                          <a:noFill/>
+                        </a:ln>
+                        <a:solidFill>
+                          <a:schemeClr val="tx1"/>
+                        </a:solidFill>
+                        <a:effectLst/>
+                        <a:uLnTx/>
+                        <a:uFillTx/>
+                        <a:latin typeface="Consolas" panose="020B0609020204030204" pitchFamily="49" charset="0"/>
+                        <a:ea typeface="+mn-ea"/>
+                        <a:cs typeface="+mn-cs"/>
+                      </a:endParaRPr>
                     </a:p>
                   </a:txBody>
                   <a:tcPr/>
@@ -7462,184 +8877,48 @@
           </a:graphicData>
         </a:graphic>
       </p:graphicFrame>
-      <p:sp>
-        <p:nvSpPr>
-          <p:cNvPr id="9" name="Flowchart: Summing Junction 8">
+      <p:cxnSp>
+        <p:nvCxnSpPr>
+          <p:cNvPr id="8" name="Straight Arrow Connector 7">
             <a:extLst>
               <a:ext uri="{FF2B5EF4-FFF2-40B4-BE49-F238E27FC236}">
-                <a16:creationId xmlns:a16="http://schemas.microsoft.com/office/drawing/2014/main" id="{BBF472CF-569C-45E0-8160-9C7DBCA6F4C3}"/>
-              </a:ext>
-            </a:extLst>
-          </p:cNvPr>
-          <p:cNvSpPr/>
-          <p:nvPr/>
-        </p:nvSpPr>
-        <p:spPr>
-          <a:xfrm>
-            <a:off x="4783216" y="1740137"/>
-            <a:ext cx="144262" cy="152862"/>
-          </a:xfrm>
-          <a:prstGeom prst="flowChartSummingJunction">
-            <a:avLst/>
-          </a:prstGeom>
-        </p:spPr>
-        <p:style>
-          <a:lnRef idx="2">
-            <a:schemeClr val="dk1"/>
-          </a:lnRef>
-          <a:fillRef idx="1">
-            <a:schemeClr val="lt1"/>
-          </a:fillRef>
-          <a:effectRef idx="0">
-            <a:schemeClr val="dk1"/>
-          </a:effectRef>
-          <a:fontRef idx="minor">
-            <a:schemeClr val="dk1"/>
-          </a:fontRef>
-        </p:style>
-        <p:txBody>
-          <a:bodyPr rtlCol="0" anchor="ctr"/>
-          <a:lstStyle/>
-          <a:p>
-            <a:pPr algn="ctr"/>
-            <a:endParaRPr lang="en-US">
-              <a:solidFill>
-                <a:schemeClr val="tx1"/>
-              </a:solidFill>
-            </a:endParaRPr>
-          </a:p>
-        </p:txBody>
-      </p:sp>
-      <p:sp>
-        <p:nvSpPr>
-          <p:cNvPr id="10" name="Flowchart: Summing Junction 9">
-            <a:extLst>
-              <a:ext uri="{FF2B5EF4-FFF2-40B4-BE49-F238E27FC236}">
-                <a16:creationId xmlns:a16="http://schemas.microsoft.com/office/drawing/2014/main" id="{CDC69D90-574F-4FFA-AB78-EFE63B5B5E02}"/>
-              </a:ext>
-            </a:extLst>
-          </p:cNvPr>
-          <p:cNvSpPr/>
-          <p:nvPr/>
-        </p:nvSpPr>
-        <p:spPr>
-          <a:xfrm>
-            <a:off x="4783216" y="1569519"/>
-            <a:ext cx="144262" cy="152862"/>
-          </a:xfrm>
-          <a:prstGeom prst="flowChartSummingJunction">
-            <a:avLst/>
-          </a:prstGeom>
-        </p:spPr>
-        <p:style>
-          <a:lnRef idx="2">
-            <a:schemeClr val="dk1"/>
-          </a:lnRef>
-          <a:fillRef idx="1">
-            <a:schemeClr val="lt1"/>
-          </a:fillRef>
-          <a:effectRef idx="0">
-            <a:schemeClr val="dk1"/>
-          </a:effectRef>
-          <a:fontRef idx="minor">
-            <a:schemeClr val="dk1"/>
-          </a:fontRef>
-        </p:style>
-        <p:txBody>
-          <a:bodyPr rtlCol="0" anchor="ctr"/>
-          <a:lstStyle/>
-          <a:p>
-            <a:pPr algn="ctr"/>
-            <a:endParaRPr lang="en-US">
-              <a:solidFill>
-                <a:schemeClr val="tx1"/>
-              </a:solidFill>
-            </a:endParaRPr>
-          </a:p>
-        </p:txBody>
-      </p:sp>
-      <p:sp>
-        <p:nvSpPr>
-          <p:cNvPr id="11" name="Isosceles Triangle 10">
-            <a:extLst>
-              <a:ext uri="{FF2B5EF4-FFF2-40B4-BE49-F238E27FC236}">
-                <a16:creationId xmlns:a16="http://schemas.microsoft.com/office/drawing/2014/main" id="{D75B0C41-0E69-4E9E-B7FA-EB0443B2DCD7}"/>
-              </a:ext>
-            </a:extLst>
-          </p:cNvPr>
-          <p:cNvSpPr/>
-          <p:nvPr/>
-        </p:nvSpPr>
-        <p:spPr>
-          <a:xfrm rot="5400000">
-            <a:off x="5320266" y="4820575"/>
-            <a:ext cx="144262" cy="152862"/>
-          </a:xfrm>
-          <a:prstGeom prst="triangle">
-            <a:avLst/>
-          </a:prstGeom>
-          <a:solidFill>
-            <a:schemeClr val="bg1"/>
-          </a:solidFill>
-        </p:spPr>
-        <p:style>
-          <a:lnRef idx="2">
-            <a:schemeClr val="accent1">
-              <a:shade val="50000"/>
-            </a:schemeClr>
-          </a:lnRef>
-          <a:fillRef idx="1">
-            <a:schemeClr val="accent1"/>
-          </a:fillRef>
-          <a:effectRef idx="0">
-            <a:schemeClr val="accent1"/>
-          </a:effectRef>
-          <a:fontRef idx="minor">
-            <a:schemeClr val="lt1"/>
-          </a:fontRef>
-        </p:style>
-        <p:txBody>
-          <a:bodyPr rtlCol="0" anchor="ctr"/>
-          <a:lstStyle/>
-          <a:p>
-            <a:pPr algn="ctr"/>
-            <a:endParaRPr lang="en-US"/>
-          </a:p>
-        </p:txBody>
-      </p:sp>
-      <p:cxnSp>
-        <p:nvCxnSpPr>
-          <p:cNvPr id="13" name="Straight Connector 12">
-            <a:extLst>
-              <a:ext uri="{FF2B5EF4-FFF2-40B4-BE49-F238E27FC236}">
-                <a16:creationId xmlns:a16="http://schemas.microsoft.com/office/drawing/2014/main" id="{98E4DC03-D345-43EF-9DAC-078E48992A2B}"/>
+                <a16:creationId xmlns:a16="http://schemas.microsoft.com/office/drawing/2014/main" id="{B55F0D99-6679-4BA0-B678-82C4DEE371CB}"/>
               </a:ext>
             </a:extLst>
           </p:cNvPr>
           <p:cNvCxnSpPr>
-            <a:stCxn id="10" idx="6"/>
+            <a:cxnSpLocks/>
             <a:endCxn id="6" idx="1"/>
           </p:cNvCxnSpPr>
           <p:nvPr/>
         </p:nvCxnSpPr>
         <p:spPr>
-          <a:xfrm flipV="1">
-            <a:off x="4927478" y="1352128"/>
-            <a:ext cx="647728" cy="293822"/>
+          <a:xfrm>
+            <a:off x="4800600" y="1352128"/>
+            <a:ext cx="774606" cy="0"/>
           </a:xfrm>
-          <a:prstGeom prst="line">
+          <a:prstGeom prst="straightConnector1">
             <a:avLst/>
           </a:prstGeom>
+          <a:ln w="9525" cap="flat" cmpd="sng" algn="ctr">
+            <a:solidFill>
+              <a:schemeClr val="dk1"/>
+            </a:solidFill>
+            <a:prstDash val="solid"/>
+            <a:round/>
+            <a:headEnd type="none" w="med" len="med"/>
+            <a:tailEnd type="arrow" w="med" len="med"/>
+          </a:ln>
         </p:spPr>
         <p:style>
-          <a:lnRef idx="1">
-            <a:schemeClr val="dk1"/>
+          <a:lnRef idx="0">
+            <a:scrgbClr r="0" g="0" b="0"/>
           </a:lnRef>
           <a:fillRef idx="0">
-            <a:schemeClr val="dk1"/>
+            <a:scrgbClr r="0" g="0" b="0"/>
           </a:fillRef>
           <a:effectRef idx="0">
-            <a:schemeClr val="dk1"/>
+            <a:scrgbClr r="0" g="0" b="0"/>
           </a:effectRef>
           <a:fontRef idx="minor">
             <a:schemeClr val="tx1"/>
@@ -7648,38 +8927,46 @@
       </p:cxnSp>
       <p:cxnSp>
         <p:nvCxnSpPr>
-          <p:cNvPr id="15" name="Straight Connector 14">
+          <p:cNvPr id="14" name="Straight Arrow Connector 13">
             <a:extLst>
               <a:ext uri="{FF2B5EF4-FFF2-40B4-BE49-F238E27FC236}">
-                <a16:creationId xmlns:a16="http://schemas.microsoft.com/office/drawing/2014/main" id="{FC2C0D28-8B73-48CA-BEC3-655AC65FB957}"/>
+                <a16:creationId xmlns:a16="http://schemas.microsoft.com/office/drawing/2014/main" id="{665D8252-DE5F-4085-85D2-3012978738C6}"/>
               </a:ext>
             </a:extLst>
           </p:cNvPr>
           <p:cNvCxnSpPr>
             <a:cxnSpLocks/>
-            <a:stCxn id="9" idx="5"/>
             <a:endCxn id="7" idx="1"/>
           </p:cNvCxnSpPr>
           <p:nvPr/>
         </p:nvCxnSpPr>
         <p:spPr>
           <a:xfrm>
-            <a:off x="4906351" y="1870613"/>
-            <a:ext cx="668855" cy="1415884"/>
+            <a:off x="4800600" y="3286497"/>
+            <a:ext cx="774606" cy="0"/>
           </a:xfrm>
-          <a:prstGeom prst="line">
+          <a:prstGeom prst="straightConnector1">
             <a:avLst/>
           </a:prstGeom>
+          <a:ln w="9525" cap="flat" cmpd="sng" algn="ctr">
+            <a:solidFill>
+              <a:schemeClr val="dk1"/>
+            </a:solidFill>
+            <a:prstDash val="solid"/>
+            <a:round/>
+            <a:headEnd type="none" w="med" len="med"/>
+            <a:tailEnd type="arrow" w="med" len="med"/>
+          </a:ln>
         </p:spPr>
         <p:style>
-          <a:lnRef idx="1">
-            <a:schemeClr val="dk1"/>
+          <a:lnRef idx="0">
+            <a:scrgbClr r="0" g="0" b="0"/>
           </a:lnRef>
           <a:fillRef idx="0">
-            <a:schemeClr val="dk1"/>
+            <a:scrgbClr r="0" g="0" b="0"/>
           </a:fillRef>
           <a:effectRef idx="0">
-            <a:schemeClr val="dk1"/>
+            <a:scrgbClr r="0" g="0" b="0"/>
           </a:effectRef>
           <a:fontRef idx="minor">
             <a:schemeClr val="tx1"/>
@@ -7688,36 +8975,40 @@
       </p:cxnSp>
       <p:cxnSp>
         <p:nvCxnSpPr>
-          <p:cNvPr id="18" name="Straight Connector 17">
+          <p:cNvPr id="25" name="Straight Arrow Connector 24">
             <a:extLst>
               <a:ext uri="{FF2B5EF4-FFF2-40B4-BE49-F238E27FC236}">
-                <a16:creationId xmlns:a16="http://schemas.microsoft.com/office/drawing/2014/main" id="{C4E5EBE5-D08E-46E0-919F-9B26544FE442}"/>
+                <a16:creationId xmlns:a16="http://schemas.microsoft.com/office/drawing/2014/main" id="{3CE13328-A737-4B58-AE27-91C8B4702A4E}"/>
               </a:ext>
             </a:extLst>
           </p:cNvPr>
           <p:cNvCxnSpPr>
-            <a:stCxn id="11" idx="3"/>
+            <a:cxnSpLocks/>
+            <a:endCxn id="5" idx="1"/>
           </p:cNvCxnSpPr>
           <p:nvPr/>
         </p:nvCxnSpPr>
         <p:spPr>
-          <a:xfrm flipH="1">
-            <a:off x="4800600" y="4897006"/>
-            <a:ext cx="515366" cy="0"/>
+          <a:xfrm>
+            <a:off x="4800600" y="5304686"/>
+            <a:ext cx="668228" cy="0"/>
           </a:xfrm>
-          <a:prstGeom prst="line">
+          <a:prstGeom prst="straightConnector1">
             <a:avLst/>
           </a:prstGeom>
+          <a:ln>
+            <a:tailEnd type="triangle"/>
+          </a:ln>
         </p:spPr>
         <p:style>
-          <a:lnRef idx="1">
-            <a:schemeClr val="accent1"/>
+          <a:lnRef idx="2">
+            <a:schemeClr val="dk1"/>
           </a:lnRef>
           <a:fillRef idx="0">
-            <a:schemeClr val="accent1"/>
+            <a:schemeClr val="dk1"/>
           </a:fillRef>
-          <a:effectRef idx="0">
-            <a:schemeClr val="accent1"/>
+          <a:effectRef idx="1">
+            <a:schemeClr val="dk1"/>
           </a:effectRef>
           <a:fontRef idx="minor">
             <a:schemeClr val="tx1"/>

</xml_diff>

<commit_message>
UML finalPRoject added to report, minor format edits
</commit_message>
<xml_diff>
--- a/FinalProject_UML.pptx
+++ b/FinalProject_UML.pptx
@@ -3342,13 +3342,13 @@
           <p:nvPr>
             <p:extLst>
               <p:ext uri="{D42A27DB-BD31-4B8C-83A1-F6EECF244321}">
-                <p14:modId xmlns:p14="http://schemas.microsoft.com/office/powerpoint/2010/main" val="1718159850"/>
+                <p14:modId xmlns:p14="http://schemas.microsoft.com/office/powerpoint/2010/main" val="858140183"/>
               </p:ext>
             </p:extLst>
           </p:nvPr>
         </p:nvGraphicFramePr>
         <p:xfrm>
-          <a:off x="344415" y="616628"/>
+          <a:off x="0" y="3122084"/>
           <a:ext cx="3398170" cy="3566160"/>
         </p:xfrm>
         <a:graphic>
@@ -3972,13 +3972,13 @@
           <p:nvPr>
             <p:extLst>
               <p:ext uri="{D42A27DB-BD31-4B8C-83A1-F6EECF244321}">
-                <p14:modId xmlns:p14="http://schemas.microsoft.com/office/powerpoint/2010/main" val="2799143581"/>
+                <p14:modId xmlns:p14="http://schemas.microsoft.com/office/powerpoint/2010/main" val="159062912"/>
               </p:ext>
             </p:extLst>
           </p:nvPr>
         </p:nvGraphicFramePr>
         <p:xfrm>
-          <a:off x="6592824" y="616628"/>
+          <a:off x="6741183" y="3122084"/>
           <a:ext cx="3115815" cy="3398520"/>
         </p:xfrm>
         <a:graphic>
@@ -4609,13 +4609,13 @@
           <p:nvPr>
             <p:extLst>
               <p:ext uri="{D42A27DB-BD31-4B8C-83A1-F6EECF244321}">
-                <p14:modId xmlns:p14="http://schemas.microsoft.com/office/powerpoint/2010/main" val="3097188269"/>
+                <p14:modId xmlns:p14="http://schemas.microsoft.com/office/powerpoint/2010/main" val="2439183033"/>
               </p:ext>
             </p:extLst>
           </p:nvPr>
         </p:nvGraphicFramePr>
         <p:xfrm>
-          <a:off x="3956900" y="616628"/>
+          <a:off x="3892892" y="1897380"/>
           <a:ext cx="2353569" cy="3063240"/>
         </p:xfrm>
         <a:graphic>
@@ -5191,13 +5191,13 @@
           <p:nvPr>
             <p:extLst>
               <p:ext uri="{D42A27DB-BD31-4B8C-83A1-F6EECF244321}">
-                <p14:modId xmlns:p14="http://schemas.microsoft.com/office/powerpoint/2010/main" val="2731867159"/>
+                <p14:modId xmlns:p14="http://schemas.microsoft.com/office/powerpoint/2010/main" val="1335891683"/>
               </p:ext>
             </p:extLst>
           </p:nvPr>
         </p:nvGraphicFramePr>
         <p:xfrm>
-          <a:off x="9922954" y="616628"/>
+          <a:off x="10182934" y="4648964"/>
           <a:ext cx="2009066" cy="1833880"/>
         </p:xfrm>
         <a:graphic>
@@ -5391,6 +5391,136 @@
           </a:graphicData>
         </a:graphic>
       </p:graphicFrame>
+      <p:cxnSp>
+        <p:nvCxnSpPr>
+          <p:cNvPr id="3" name="Straight Arrow Connector 2">
+            <a:extLst>
+              <a:ext uri="{FF2B5EF4-FFF2-40B4-BE49-F238E27FC236}">
+                <a16:creationId xmlns:a16="http://schemas.microsoft.com/office/drawing/2014/main" id="{C035B7BB-8552-4A7B-A4EB-92E73E1376F7}"/>
+              </a:ext>
+            </a:extLst>
+          </p:cNvPr>
+          <p:cNvCxnSpPr>
+            <a:endCxn id="9" idx="1"/>
+          </p:cNvCxnSpPr>
+          <p:nvPr/>
+        </p:nvCxnSpPr>
+        <p:spPr>
+          <a:xfrm>
+            <a:off x="3398170" y="3429000"/>
+            <a:ext cx="494722" cy="0"/>
+          </a:xfrm>
+          <a:prstGeom prst="straightConnector1">
+            <a:avLst/>
+          </a:prstGeom>
+          <a:ln>
+            <a:tailEnd type="triangle"/>
+          </a:ln>
+        </p:spPr>
+        <p:style>
+          <a:lnRef idx="2">
+            <a:schemeClr val="dk1"/>
+          </a:lnRef>
+          <a:fillRef idx="0">
+            <a:schemeClr val="dk1"/>
+          </a:fillRef>
+          <a:effectRef idx="1">
+            <a:schemeClr val="dk1"/>
+          </a:effectRef>
+          <a:fontRef idx="minor">
+            <a:schemeClr val="tx1"/>
+          </a:fontRef>
+        </p:style>
+      </p:cxnSp>
+      <p:cxnSp>
+        <p:nvCxnSpPr>
+          <p:cNvPr id="8" name="Straight Arrow Connector 7">
+            <a:extLst>
+              <a:ext uri="{FF2B5EF4-FFF2-40B4-BE49-F238E27FC236}">
+                <a16:creationId xmlns:a16="http://schemas.microsoft.com/office/drawing/2014/main" id="{93BC27F2-BFE5-4E62-A18A-D0063CECE821}"/>
+              </a:ext>
+            </a:extLst>
+          </p:cNvPr>
+          <p:cNvCxnSpPr>
+            <a:endCxn id="9" idx="3"/>
+          </p:cNvCxnSpPr>
+          <p:nvPr/>
+        </p:nvCxnSpPr>
+        <p:spPr>
+          <a:xfrm flipH="1">
+            <a:off x="6246461" y="3429000"/>
+            <a:ext cx="494722" cy="0"/>
+          </a:xfrm>
+          <a:prstGeom prst="straightConnector1">
+            <a:avLst/>
+          </a:prstGeom>
+          <a:ln>
+            <a:tailEnd type="triangle"/>
+          </a:ln>
+        </p:spPr>
+        <p:style>
+          <a:lnRef idx="2">
+            <a:schemeClr val="dk1"/>
+          </a:lnRef>
+          <a:fillRef idx="0">
+            <a:schemeClr val="dk1"/>
+          </a:fillRef>
+          <a:effectRef idx="1">
+            <a:schemeClr val="dk1"/>
+          </a:effectRef>
+          <a:fontRef idx="minor">
+            <a:schemeClr val="tx1"/>
+          </a:fontRef>
+        </p:style>
+      </p:cxnSp>
+      <p:cxnSp>
+        <p:nvCxnSpPr>
+          <p:cNvPr id="11" name="Straight Arrow Connector 10">
+            <a:extLst>
+              <a:ext uri="{FF2B5EF4-FFF2-40B4-BE49-F238E27FC236}">
+                <a16:creationId xmlns:a16="http://schemas.microsoft.com/office/drawing/2014/main" id="{4DDE1A42-2590-4375-8770-065B1173FD86}"/>
+              </a:ext>
+            </a:extLst>
+          </p:cNvPr>
+          <p:cNvCxnSpPr>
+            <a:cxnSpLocks/>
+            <a:endCxn id="7" idx="1"/>
+          </p:cNvCxnSpPr>
+          <p:nvPr/>
+        </p:nvCxnSpPr>
+        <p:spPr>
+          <a:xfrm>
+            <a:off x="9856998" y="5565904"/>
+            <a:ext cx="325936" cy="0"/>
+          </a:xfrm>
+          <a:prstGeom prst="straightConnector1">
+            <a:avLst/>
+          </a:prstGeom>
+          <a:ln w="9525" cap="flat" cmpd="sng" algn="ctr">
+            <a:solidFill>
+              <a:schemeClr val="dk1"/>
+            </a:solidFill>
+            <a:prstDash val="solid"/>
+            <a:round/>
+            <a:headEnd type="none" w="med" len="med"/>
+            <a:tailEnd type="arrow" w="med" len="med"/>
+          </a:ln>
+        </p:spPr>
+        <p:style>
+          <a:lnRef idx="0">
+            <a:scrgbClr r="0" g="0" b="0"/>
+          </a:lnRef>
+          <a:fillRef idx="0">
+            <a:scrgbClr r="0" g="0" b="0"/>
+          </a:fillRef>
+          <a:effectRef idx="0">
+            <a:scrgbClr r="0" g="0" b="0"/>
+          </a:effectRef>
+          <a:fontRef idx="minor">
+            <a:schemeClr val="tx1"/>
+          </a:fontRef>
+        </p:style>
+      </p:cxnSp>
     </p:spTree>
     <p:extLst>
       <p:ext uri="{BB962C8B-B14F-4D97-AF65-F5344CB8AC3E}">
@@ -8877,102 +9007,6 @@
           </a:graphicData>
         </a:graphic>
       </p:graphicFrame>
-      <p:cxnSp>
-        <p:nvCxnSpPr>
-          <p:cNvPr id="8" name="Straight Arrow Connector 7">
-            <a:extLst>
-              <a:ext uri="{FF2B5EF4-FFF2-40B4-BE49-F238E27FC236}">
-                <a16:creationId xmlns:a16="http://schemas.microsoft.com/office/drawing/2014/main" id="{B55F0D99-6679-4BA0-B678-82C4DEE371CB}"/>
-              </a:ext>
-            </a:extLst>
-          </p:cNvPr>
-          <p:cNvCxnSpPr>
-            <a:cxnSpLocks/>
-            <a:endCxn id="6" idx="1"/>
-          </p:cNvCxnSpPr>
-          <p:nvPr/>
-        </p:nvCxnSpPr>
-        <p:spPr>
-          <a:xfrm>
-            <a:off x="4800600" y="1352128"/>
-            <a:ext cx="774606" cy="0"/>
-          </a:xfrm>
-          <a:prstGeom prst="straightConnector1">
-            <a:avLst/>
-          </a:prstGeom>
-          <a:ln w="9525" cap="flat" cmpd="sng" algn="ctr">
-            <a:solidFill>
-              <a:schemeClr val="dk1"/>
-            </a:solidFill>
-            <a:prstDash val="solid"/>
-            <a:round/>
-            <a:headEnd type="none" w="med" len="med"/>
-            <a:tailEnd type="arrow" w="med" len="med"/>
-          </a:ln>
-        </p:spPr>
-        <p:style>
-          <a:lnRef idx="0">
-            <a:scrgbClr r="0" g="0" b="0"/>
-          </a:lnRef>
-          <a:fillRef idx="0">
-            <a:scrgbClr r="0" g="0" b="0"/>
-          </a:fillRef>
-          <a:effectRef idx="0">
-            <a:scrgbClr r="0" g="0" b="0"/>
-          </a:effectRef>
-          <a:fontRef idx="minor">
-            <a:schemeClr val="tx1"/>
-          </a:fontRef>
-        </p:style>
-      </p:cxnSp>
-      <p:cxnSp>
-        <p:nvCxnSpPr>
-          <p:cNvPr id="14" name="Straight Arrow Connector 13">
-            <a:extLst>
-              <a:ext uri="{FF2B5EF4-FFF2-40B4-BE49-F238E27FC236}">
-                <a16:creationId xmlns:a16="http://schemas.microsoft.com/office/drawing/2014/main" id="{665D8252-DE5F-4085-85D2-3012978738C6}"/>
-              </a:ext>
-            </a:extLst>
-          </p:cNvPr>
-          <p:cNvCxnSpPr>
-            <a:cxnSpLocks/>
-            <a:endCxn id="7" idx="1"/>
-          </p:cNvCxnSpPr>
-          <p:nvPr/>
-        </p:nvCxnSpPr>
-        <p:spPr>
-          <a:xfrm>
-            <a:off x="4800600" y="3286497"/>
-            <a:ext cx="774606" cy="0"/>
-          </a:xfrm>
-          <a:prstGeom prst="straightConnector1">
-            <a:avLst/>
-          </a:prstGeom>
-          <a:ln w="9525" cap="flat" cmpd="sng" algn="ctr">
-            <a:solidFill>
-              <a:schemeClr val="dk1"/>
-            </a:solidFill>
-            <a:prstDash val="solid"/>
-            <a:round/>
-            <a:headEnd type="none" w="med" len="med"/>
-            <a:tailEnd type="arrow" w="med" len="med"/>
-          </a:ln>
-        </p:spPr>
-        <p:style>
-          <a:lnRef idx="0">
-            <a:scrgbClr r="0" g="0" b="0"/>
-          </a:lnRef>
-          <a:fillRef idx="0">
-            <a:scrgbClr r="0" g="0" b="0"/>
-          </a:fillRef>
-          <a:effectRef idx="0">
-            <a:scrgbClr r="0" g="0" b="0"/>
-          </a:effectRef>
-          <a:fontRef idx="minor">
-            <a:schemeClr val="tx1"/>
-          </a:fontRef>
-        </p:style>
-      </p:cxnSp>
       <p:cxnSp>
         <p:nvCxnSpPr>
           <p:cNvPr id="25" name="Straight Arrow Connector 24">

</xml_diff>

<commit_message>
UML corrections, formatting fileLocations in DatabaseClient
</commit_message>
<xml_diff>
--- a/FinalProject_UML.pptx
+++ b/FinalProject_UML.pptx
@@ -260,7 +260,7 @@
           <a:p>
             <a:fld id="{CF5B8BCA-6421-4047-A4EF-B405053E76C5}" type="datetimeFigureOut">
               <a:rPr lang="en-US" smtClean="0"/>
-              <a:t>12/12/2018</a:t>
+              <a:t>12/14/2018</a:t>
             </a:fld>
             <a:endParaRPr lang="en-US"/>
           </a:p>
@@ -458,7 +458,7 @@
           <a:p>
             <a:fld id="{CF5B8BCA-6421-4047-A4EF-B405053E76C5}" type="datetimeFigureOut">
               <a:rPr lang="en-US" smtClean="0"/>
-              <a:t>12/12/2018</a:t>
+              <a:t>12/14/2018</a:t>
             </a:fld>
             <a:endParaRPr lang="en-US"/>
           </a:p>
@@ -666,7 +666,7 @@
           <a:p>
             <a:fld id="{CF5B8BCA-6421-4047-A4EF-B405053E76C5}" type="datetimeFigureOut">
               <a:rPr lang="en-US" smtClean="0"/>
-              <a:t>12/12/2018</a:t>
+              <a:t>12/14/2018</a:t>
             </a:fld>
             <a:endParaRPr lang="en-US"/>
           </a:p>
@@ -864,7 +864,7 @@
           <a:p>
             <a:fld id="{CF5B8BCA-6421-4047-A4EF-B405053E76C5}" type="datetimeFigureOut">
               <a:rPr lang="en-US" smtClean="0"/>
-              <a:t>12/12/2018</a:t>
+              <a:t>12/14/2018</a:t>
             </a:fld>
             <a:endParaRPr lang="en-US"/>
           </a:p>
@@ -1139,7 +1139,7 @@
           <a:p>
             <a:fld id="{CF5B8BCA-6421-4047-A4EF-B405053E76C5}" type="datetimeFigureOut">
               <a:rPr lang="en-US" smtClean="0"/>
-              <a:t>12/12/2018</a:t>
+              <a:t>12/14/2018</a:t>
             </a:fld>
             <a:endParaRPr lang="en-US"/>
           </a:p>
@@ -1404,7 +1404,7 @@
           <a:p>
             <a:fld id="{CF5B8BCA-6421-4047-A4EF-B405053E76C5}" type="datetimeFigureOut">
               <a:rPr lang="en-US" smtClean="0"/>
-              <a:t>12/12/2018</a:t>
+              <a:t>12/14/2018</a:t>
             </a:fld>
             <a:endParaRPr lang="en-US"/>
           </a:p>
@@ -1816,7 +1816,7 @@
           <a:p>
             <a:fld id="{CF5B8BCA-6421-4047-A4EF-B405053E76C5}" type="datetimeFigureOut">
               <a:rPr lang="en-US" smtClean="0"/>
-              <a:t>12/12/2018</a:t>
+              <a:t>12/14/2018</a:t>
             </a:fld>
             <a:endParaRPr lang="en-US"/>
           </a:p>
@@ -1957,7 +1957,7 @@
           <a:p>
             <a:fld id="{CF5B8BCA-6421-4047-A4EF-B405053E76C5}" type="datetimeFigureOut">
               <a:rPr lang="en-US" smtClean="0"/>
-              <a:t>12/12/2018</a:t>
+              <a:t>12/14/2018</a:t>
             </a:fld>
             <a:endParaRPr lang="en-US"/>
           </a:p>
@@ -2070,7 +2070,7 @@
           <a:p>
             <a:fld id="{CF5B8BCA-6421-4047-A4EF-B405053E76C5}" type="datetimeFigureOut">
               <a:rPr lang="en-US" smtClean="0"/>
-              <a:t>12/12/2018</a:t>
+              <a:t>12/14/2018</a:t>
             </a:fld>
             <a:endParaRPr lang="en-US"/>
           </a:p>
@@ -2381,7 +2381,7 @@
           <a:p>
             <a:fld id="{CF5B8BCA-6421-4047-A4EF-B405053E76C5}" type="datetimeFigureOut">
               <a:rPr lang="en-US" smtClean="0"/>
-              <a:t>12/12/2018</a:t>
+              <a:t>12/14/2018</a:t>
             </a:fld>
             <a:endParaRPr lang="en-US"/>
           </a:p>
@@ -2669,7 +2669,7 @@
           <a:p>
             <a:fld id="{CF5B8BCA-6421-4047-A4EF-B405053E76C5}" type="datetimeFigureOut">
               <a:rPr lang="en-US" smtClean="0"/>
-              <a:t>12/12/2018</a:t>
+              <a:t>12/14/2018</a:t>
             </a:fld>
             <a:endParaRPr lang="en-US"/>
           </a:p>
@@ -2910,7 +2910,7 @@
           <a:p>
             <a:fld id="{CF5B8BCA-6421-4047-A4EF-B405053E76C5}" type="datetimeFigureOut">
               <a:rPr lang="en-US" smtClean="0"/>
-              <a:t>12/12/2018</a:t>
+              <a:t>12/14/2018</a:t>
             </a:fld>
             <a:endParaRPr lang="en-US"/>
           </a:p>
@@ -6271,7 +6271,7 @@
           <p:nvPr>
             <p:extLst>
               <p:ext uri="{D42A27DB-BD31-4B8C-83A1-F6EECF244321}">
-                <p14:modId xmlns:p14="http://schemas.microsoft.com/office/powerpoint/2010/main" val="2250718955"/>
+                <p14:modId xmlns:p14="http://schemas.microsoft.com/office/powerpoint/2010/main" val="2524552051"/>
               </p:ext>
             </p:extLst>
           </p:nvPr>
@@ -6459,7 +6459,7 @@
                         <a:rPr lang="en-US" sz="1100" dirty="0">
                           <a:latin typeface="Consolas" panose="020B0609020204030204" pitchFamily="49" charset="0"/>
                         </a:rPr>
-                        <a:t>+ DEFAULT_SIZE : int</a:t>
+                        <a:t>- DEFAULT_SIZE : int</a:t>
                       </a:r>
                     </a:p>
                     <a:p>
@@ -6495,7 +6495,19 @@
                         <a:rPr lang="en-US" sz="1100" dirty="0">
                           <a:latin typeface="Consolas" panose="020B0609020204030204" pitchFamily="49" charset="0"/>
                         </a:rPr>
-                        <a:t>+ NOT_FOUND : int</a:t>
+                        <a:t>- NOT_FOUND : int</a:t>
+                      </a:r>
+                    </a:p>
+                    <a:p>
+                      <a:pPr marL="0" indent="0">
+                        <a:buFontTx/>
+                        <a:buNone/>
+                      </a:pPr>
+                      <a:r>
+                        <a:rPr lang="en-US" sz="1100" dirty="0">
+                          <a:latin typeface="Consolas" panose="020B0609020204030204" pitchFamily="49" charset="0"/>
+                        </a:rPr>
+                        <a:t>- PERSON_NOT_FOUND : Person</a:t>
                       </a:r>
                     </a:p>
                     <a:p>
@@ -6710,76 +6722,6 @@
                           <a:ea typeface="+mn-ea"/>
                           <a:cs typeface="+mn-cs"/>
                         </a:rPr>
-                        <a:t>+ </a:t>
-                      </a:r>
-                      <a:r>
-                        <a:rPr kumimoji="0" lang="en-US" sz="1100" b="0" i="0" u="none" strike="noStrike" kern="1200" cap="none" spc="0" normalizeH="0" baseline="0" noProof="0" dirty="0" err="1">
-                          <a:ln>
-                            <a:noFill/>
-                          </a:ln>
-                          <a:solidFill>
-                            <a:prstClr val="black"/>
-                          </a:solidFill>
-                          <a:effectLst/>
-                          <a:uLnTx/>
-                          <a:uFillTx/>
-                          <a:latin typeface="Consolas" panose="020B0609020204030204" pitchFamily="49" charset="0"/>
-                          <a:ea typeface="+mn-ea"/>
-                          <a:cs typeface="+mn-cs"/>
-                        </a:rPr>
-                        <a:t>CollegeDatabase</a:t>
-                      </a:r>
-                      <a:r>
-                        <a:rPr kumimoji="0" lang="en-US" sz="1100" b="0" i="0" u="none" strike="noStrike" kern="1200" cap="none" spc="0" normalizeH="0" baseline="0" noProof="0" dirty="0">
-                          <a:ln>
-                            <a:noFill/>
-                          </a:ln>
-                          <a:solidFill>
-                            <a:prstClr val="black"/>
-                          </a:solidFill>
-                          <a:effectLst/>
-                          <a:uLnTx/>
-                          <a:uFillTx/>
-                          <a:latin typeface="Consolas" panose="020B0609020204030204" pitchFamily="49" charset="0"/>
-                          <a:ea typeface="+mn-ea"/>
-                          <a:cs typeface="+mn-cs"/>
-                        </a:rPr>
-                        <a:t>(Person[], int)</a:t>
-                      </a:r>
-                    </a:p>
-                    <a:p>
-                      <a:pPr marL="0" marR="0" lvl="0" indent="0" algn="l" defTabSz="914400" rtl="0" eaLnBrk="1" fontAlgn="auto" latinLnBrk="0" hangingPunct="1">
-                        <a:lnSpc>
-                          <a:spcPct val="100000"/>
-                        </a:lnSpc>
-                        <a:spcBef>
-                          <a:spcPts val="0"/>
-                        </a:spcBef>
-                        <a:spcAft>
-                          <a:spcPts val="0"/>
-                        </a:spcAft>
-                        <a:buClrTx/>
-                        <a:buSzTx/>
-                        <a:buFontTx/>
-                        <a:buNone/>
-                        <a:tabLst/>
-                        <a:defRPr/>
-                      </a:pPr>
-                      <a:r>
-                        <a:rPr kumimoji="0" lang="en-US" sz="1100" b="0" i="0" u="none" strike="noStrike" kern="1200" cap="none" spc="0" normalizeH="0" baseline="0" noProof="0" dirty="0">
-                          <a:ln>
-                            <a:noFill/>
-                          </a:ln>
-                          <a:solidFill>
-                            <a:prstClr val="black"/>
-                          </a:solidFill>
-                          <a:effectLst/>
-                          <a:uLnTx/>
-                          <a:uFillTx/>
-                          <a:latin typeface="Consolas" panose="020B0609020204030204" pitchFamily="49" charset="0"/>
-                          <a:ea typeface="+mn-ea"/>
-                          <a:cs typeface="+mn-cs"/>
-                        </a:rPr>
                         <a:t>+ add(</a:t>
                       </a:r>
                       <a:r>
@@ -7411,7 +7353,7 @@
                           <a:ea typeface="+mn-ea"/>
                           <a:cs typeface="+mn-cs"/>
                         </a:rPr>
-                        <a:t>+ expand() : void</a:t>
+                        <a:t>- expand() : void</a:t>
                       </a:r>
                     </a:p>
                     <a:p>
@@ -7447,7 +7389,7 @@
                           <a:ea typeface="+mn-ea"/>
                           <a:cs typeface="+mn-cs"/>
                         </a:rPr>
-                        <a:t>+ </a:t>
+                        <a:t>- </a:t>
                       </a:r>
                       <a:r>
                         <a:rPr kumimoji="0" lang="en-US" sz="1100" b="0" i="0" u="none" strike="noStrike" kern="1200" cap="none" spc="0" normalizeH="0" baseline="0" noProof="0" dirty="0" err="1">
@@ -7693,7 +7635,41 @@
                           <a:ea typeface="+mn-ea"/>
                           <a:cs typeface="+mn-cs"/>
                         </a:rPr>
-                        <a:t>+ pop(String) : Person</a:t>
+                        <a:t>+ pop</a:t>
+                      </a:r>
+                      <a:r>
+                        <a:rPr kumimoji="0" lang="en-US" sz="1100" b="0" i="0" u="none" strike="noStrike" kern="1200" cap="none" spc="0" normalizeH="0" baseline="0" noProof="0">
+                          <a:ln>
+                            <a:noFill/>
+                          </a:ln>
+                          <a:solidFill>
+                            <a:schemeClr val="tx1"/>
+                          </a:solidFill>
+                          <a:effectLst/>
+                          <a:uLnTx/>
+                          <a:uFillTx/>
+                          <a:latin typeface="Consolas" panose="020B0609020204030204" pitchFamily="49" charset="0"/>
+                          <a:ea typeface="+mn-ea"/>
+                          <a:cs typeface="+mn-cs"/>
+                        </a:rPr>
+                        <a:t>(int) </a:t>
+                      </a:r>
+                      <a:r>
+                        <a:rPr kumimoji="0" lang="en-US" sz="1100" b="0" i="0" u="none" strike="noStrike" kern="1200" cap="none" spc="0" normalizeH="0" baseline="0" noProof="0" dirty="0">
+                          <a:ln>
+                            <a:noFill/>
+                          </a:ln>
+                          <a:solidFill>
+                            <a:schemeClr val="tx1"/>
+                          </a:solidFill>
+                          <a:effectLst/>
+                          <a:uLnTx/>
+                          <a:uFillTx/>
+                          <a:latin typeface="Consolas" panose="020B0609020204030204" pitchFamily="49" charset="0"/>
+                          <a:ea typeface="+mn-ea"/>
+                          <a:cs typeface="+mn-cs"/>
+                        </a:rPr>
+                        <a:t>: Person</a:t>
                       </a:r>
                     </a:p>
                     <a:p>

</xml_diff>